<commit_message>
北京：2022-12-28 19:39:01 纽约：2022-12-28 06:39:01 加州：2022-12-28 03:39:01 伦敦：2022-12-28 11:39:01 瑞士：2022-12-28 12:39:01 悉尼：2022-12-28 22:39:01
</commit_message>
<xml_diff>
--- a/self-info/Teacher LM English.pptx
+++ b/self-info/Teacher LM English.pptx
@@ -11861,7 +11861,7 @@
         </p:nvSpPr>
         <p:spPr>
           <a:xfrm>
-            <a:off x="251520" y="1157468"/>
+            <a:off x="251520" y="1326649"/>
             <a:ext cx="8487746" cy="4530813"/>
           </a:xfrm>
           <a:prstGeom prst="rect">
@@ -12028,18 +12028,8 @@
             </a:lvl9pPr>
           </a:lstStyle>
           <a:p>
-            <a:pPr marL="0" indent="0">
-              <a:buNone/>
-            </a:pPr>
-            <a:endParaRPr lang="en-US" altLang="zh-CN" sz="1400" b="0" i="0" dirty="0">
-              <a:effectLst/>
-              <a:latin typeface="Times New Roman" panose="02020603050405020304" pitchFamily="18" charset="0"/>
-              <a:cs typeface="Times New Roman" panose="02020603050405020304" pitchFamily="18" charset="0"/>
-            </a:endParaRPr>
-          </a:p>
-          <a:p>
-            <a:r>
-              <a:rPr lang="en-US" altLang="zh-CN" sz="1400" b="0" i="0" dirty="0">
+            <a:r>
+              <a:rPr lang="en-US" altLang="zh-CN" sz="1500" b="0" i="0" dirty="0">
                 <a:effectLst/>
                 <a:latin typeface="Times New Roman" panose="02020603050405020304" pitchFamily="18" charset="0"/>
                 <a:cs typeface="Times New Roman" panose="02020603050405020304" pitchFamily="18" charset="0"/>
@@ -12047,7 +12037,7 @@
               <a:t>Following the release of the GPT-3 model, researchers have demonstrated that In-Context Learning with fixed parameters can unlock the reasoning</a:t>
             </a:r>
             <a:r>
-              <a:rPr lang="zh-CN" altLang="en-US" sz="1400" b="0" i="0" dirty="0">
+              <a:rPr lang="zh-CN" altLang="en-US" sz="1500" b="0" i="0" dirty="0">
                 <a:effectLst/>
                 <a:latin typeface="Times New Roman" panose="02020603050405020304" pitchFamily="18" charset="0"/>
                 <a:cs typeface="Times New Roman" panose="02020603050405020304" pitchFamily="18" charset="0"/>
@@ -12055,7 +12045,7 @@
               <a:t> </a:t>
             </a:r>
             <a:r>
-              <a:rPr lang="en-US" altLang="zh-CN" sz="1400" b="0" i="0" dirty="0">
+              <a:rPr lang="en-US" altLang="zh-CN" sz="1500" b="0" i="0" dirty="0">
                 <a:effectLst/>
                 <a:latin typeface="Times New Roman" panose="02020603050405020304" pitchFamily="18" charset="0"/>
                 <a:cs typeface="Times New Roman" panose="02020603050405020304" pitchFamily="18" charset="0"/>
@@ -12063,7 +12053,7 @@
               <a:t>capability of large-scale language models. However, small-scale language models have difficulty using prompts to perform complex</a:t>
             </a:r>
             <a:r>
-              <a:rPr lang="zh-CN" altLang="en-US" sz="1400" b="0" i="0" dirty="0">
+              <a:rPr lang="zh-CN" altLang="en-US" sz="1500" b="0" i="0" dirty="0">
                 <a:effectLst/>
                 <a:latin typeface="Times New Roman" panose="02020603050405020304" pitchFamily="18" charset="0"/>
                 <a:cs typeface="Times New Roman" panose="02020603050405020304" pitchFamily="18" charset="0"/>
@@ -12071,7 +12061,7 @@
               <a:t> </a:t>
             </a:r>
             <a:r>
-              <a:rPr lang="en-US" altLang="zh-CN" sz="1400" b="0" i="0" dirty="0">
+              <a:rPr lang="en-US" altLang="zh-CN" sz="1500" b="0" i="0" dirty="0">
                 <a:effectLst/>
                 <a:latin typeface="Times New Roman" panose="02020603050405020304" pitchFamily="18" charset="0"/>
                 <a:cs typeface="Times New Roman" panose="02020603050405020304" pitchFamily="18" charset="0"/>
@@ -12081,7 +12071,7 @@
           </a:p>
           <a:p>
             <a:r>
-              <a:rPr lang="en-US" altLang="zh-CN" sz="1400" b="0" i="0" dirty="0" err="1">
+              <a:rPr lang="en-US" altLang="zh-CN" sz="1500" b="0" i="0" dirty="0" err="1">
                 <a:effectLst/>
                 <a:latin typeface="Times New Roman" panose="02020603050405020304" pitchFamily="18" charset="0"/>
                 <a:cs typeface="Times New Roman" panose="02020603050405020304" pitchFamily="18" charset="0"/>
@@ -12089,7 +12079,7 @@
               <a:t>CoT</a:t>
             </a:r>
             <a:r>
-              <a:rPr lang="en-US" altLang="zh-CN" sz="1400" b="0" i="0" dirty="0">
+              <a:rPr lang="en-US" altLang="zh-CN" sz="1500" b="0" i="0" dirty="0">
                 <a:effectLst/>
                 <a:latin typeface="Times New Roman" panose="02020603050405020304" pitchFamily="18" charset="0"/>
                 <a:cs typeface="Times New Roman" panose="02020603050405020304" pitchFamily="18" charset="0"/>
@@ -12097,7 +12087,7 @@
               <a:t> Instruction Finetuning with reasonings has also been shown to improve the reasoning</a:t>
             </a:r>
             <a:r>
-              <a:rPr lang="zh-CN" altLang="en-US" sz="1400" b="0" i="0" dirty="0">
+              <a:rPr lang="zh-CN" altLang="en-US" sz="1500" b="0" i="0" dirty="0">
                 <a:effectLst/>
                 <a:latin typeface="Times New Roman" panose="02020603050405020304" pitchFamily="18" charset="0"/>
                 <a:cs typeface="Times New Roman" panose="02020603050405020304" pitchFamily="18" charset="0"/>
@@ -12105,15 +12095,15 @@
               <a:t> </a:t>
             </a:r>
             <a:r>
-              <a:rPr lang="en-US" altLang="zh-CN" sz="1400" b="0" i="0" dirty="0">
+              <a:rPr lang="en-US" altLang="zh-CN" sz="1500" b="0" i="0" dirty="0">
                 <a:effectLst/>
                 <a:latin typeface="Times New Roman" panose="02020603050405020304" pitchFamily="18" charset="0"/>
                 <a:cs typeface="Times New Roman" panose="02020603050405020304" pitchFamily="18" charset="0"/>
               </a:rPr>
-              <a:t>ability of large-scale language models by relaxing the condition to allow parameter updates but requires a large amount of data with finetune</a:t>
-            </a:r>
-            <a:r>
-              <a:rPr lang="zh-CN" altLang="en-US" sz="1400" b="0" i="0" dirty="0">
+              <a:t>ability of large-scale language models by relaxing the condition to allow parameter updates but requires a large amount of data with finetuning</a:t>
+            </a:r>
+            <a:r>
+              <a:rPr lang="zh-CN" altLang="en-US" sz="1500" b="0" i="0" dirty="0">
                 <a:effectLst/>
                 <a:latin typeface="Times New Roman" panose="02020603050405020304" pitchFamily="18" charset="0"/>
                 <a:cs typeface="Times New Roman" panose="02020603050405020304" pitchFamily="18" charset="0"/>
@@ -12121,7 +12111,7 @@
               <a:t> </a:t>
             </a:r>
             <a:r>
-              <a:rPr lang="en-US" altLang="zh-CN" sz="1400" b="0" i="0" dirty="0">
+              <a:rPr lang="en-US" altLang="zh-CN" sz="1500" b="0" i="0" dirty="0">
                 <a:effectLst/>
                 <a:latin typeface="Times New Roman" panose="02020603050405020304" pitchFamily="18" charset="0"/>
                 <a:cs typeface="Times New Roman" panose="02020603050405020304" pitchFamily="18" charset="0"/>
@@ -12129,7 +12119,7 @@
               <a:t>processes to improve the reasoning</a:t>
             </a:r>
             <a:r>
-              <a:rPr lang="zh-CN" altLang="en-US" sz="1400" b="0" i="0" dirty="0">
+              <a:rPr lang="zh-CN" altLang="en-US" sz="1500" b="0" i="0" dirty="0">
                 <a:effectLst/>
                 <a:latin typeface="Times New Roman" panose="02020603050405020304" pitchFamily="18" charset="0"/>
                 <a:cs typeface="Times New Roman" panose="02020603050405020304" pitchFamily="18" charset="0"/>
@@ -12137,17 +12127,23 @@
               <a:t> </a:t>
             </a:r>
             <a:r>
-              <a:rPr lang="en-US" altLang="zh-CN" sz="1400" b="0" i="0" dirty="0">
+              <a:rPr lang="en-US" altLang="zh-CN" sz="1500" b="0" i="0" dirty="0">
                 <a:effectLst/>
                 <a:latin typeface="Times New Roman" panose="02020603050405020304" pitchFamily="18" charset="0"/>
                 <a:cs typeface="Times New Roman" panose="02020603050405020304" pitchFamily="18" charset="0"/>
               </a:rPr>
               <a:t>ability of small-scale models.</a:t>
             </a:r>
-          </a:p>
-          <a:p>
-            <a:r>
-              <a:rPr lang="en-US" altLang="zh-CN" sz="1400" b="0" i="0" dirty="0">
+            <a:r>
+              <a:rPr lang="zh-CN" altLang="en-US" sz="1500" b="0" i="0" dirty="0">
+                <a:effectLst/>
+                <a:latin typeface="Times New Roman" panose="02020603050405020304" pitchFamily="18" charset="0"/>
+                <a:cs typeface="Times New Roman" panose="02020603050405020304" pitchFamily="18" charset="0"/>
+              </a:rPr>
+              <a:t> </a:t>
+            </a:r>
+            <a:r>
+              <a:rPr lang="en-US" altLang="zh-CN" sz="1500" b="0" i="0" dirty="0">
                 <a:effectLst/>
                 <a:latin typeface="Times New Roman" panose="02020603050405020304" pitchFamily="18" charset="0"/>
                 <a:cs typeface="Times New Roman" panose="02020603050405020304" pitchFamily="18" charset="0"/>
@@ -12155,7 +12151,7 @@
               <a:t>Even so, the models still perform poorly after using </a:t>
             </a:r>
             <a:r>
-              <a:rPr lang="en-US" altLang="zh-CN" sz="1400" b="0" i="0" dirty="0" err="1">
+              <a:rPr lang="en-US" altLang="zh-CN" sz="1500" b="0" i="0" dirty="0" err="1">
                 <a:effectLst/>
                 <a:latin typeface="Times New Roman" panose="02020603050405020304" pitchFamily="18" charset="0"/>
                 <a:cs typeface="Times New Roman" panose="02020603050405020304" pitchFamily="18" charset="0"/>
@@ -12163,7 +12159,7 @@
               <a:t>CoT</a:t>
             </a:r>
             <a:r>
-              <a:rPr lang="en-US" altLang="zh-CN" sz="1400" b="0" i="0" dirty="0">
+              <a:rPr lang="en-US" altLang="zh-CN" sz="1500" b="0" i="0" dirty="0">
                 <a:effectLst/>
                 <a:latin typeface="Times New Roman" panose="02020603050405020304" pitchFamily="18" charset="0"/>
                 <a:cs typeface="Times New Roman" panose="02020603050405020304" pitchFamily="18" charset="0"/>
@@ -12171,7 +12167,7 @@
               <a:t> Instruction Finetuning to improve their inference; even </a:t>
             </a:r>
             <a:r>
-              <a:rPr lang="en-US" altLang="zh-CN" sz="1400" b="0" i="0" dirty="0" err="1">
+              <a:rPr lang="en-US" altLang="zh-CN" sz="1500" b="0" i="0" dirty="0" err="1">
                 <a:effectLst/>
                 <a:latin typeface="Times New Roman" panose="02020603050405020304" pitchFamily="18" charset="0"/>
                 <a:cs typeface="Times New Roman" panose="02020603050405020304" pitchFamily="18" charset="0"/>
@@ -12179,7 +12175,7 @@
               <a:t>CoT</a:t>
             </a:r>
             <a:r>
-              <a:rPr lang="en-US" altLang="zh-CN" sz="1400" b="0" i="0" dirty="0">
+              <a:rPr lang="en-US" altLang="zh-CN" sz="1500" b="0" i="0" dirty="0">
                 <a:effectLst/>
                 <a:latin typeface="Times New Roman" panose="02020603050405020304" pitchFamily="18" charset="0"/>
                 <a:cs typeface="Times New Roman" panose="02020603050405020304" pitchFamily="18" charset="0"/>
@@ -12187,7 +12183,7 @@
               <a:t> Instruction Finetuning is often less effective than simply using Instruction Finetune without adding </a:t>
             </a:r>
             <a:r>
-              <a:rPr lang="en-US" altLang="zh-CN" sz="1400" b="0" i="0" dirty="0" err="1">
+              <a:rPr lang="en-US" altLang="zh-CN" sz="1500" b="0" i="0" dirty="0" err="1">
                 <a:effectLst/>
                 <a:latin typeface="Times New Roman" panose="02020603050405020304" pitchFamily="18" charset="0"/>
                 <a:cs typeface="Times New Roman" panose="02020603050405020304" pitchFamily="18" charset="0"/>
@@ -12195,7 +12191,7 @@
               <a:t>CoT</a:t>
             </a:r>
             <a:r>
-              <a:rPr lang="en-US" altLang="zh-CN" sz="1400" b="0" i="0" dirty="0">
+              <a:rPr lang="en-US" altLang="zh-CN" sz="1500" b="0" i="0" dirty="0">
                 <a:effectLst/>
                 <a:latin typeface="Times New Roman" panose="02020603050405020304" pitchFamily="18" charset="0"/>
                 <a:cs typeface="Times New Roman" panose="02020603050405020304" pitchFamily="18" charset="0"/>
@@ -12205,7 +12201,7 @@
           </a:p>
           <a:p>
             <a:r>
-              <a:rPr lang="en-US" altLang="zh-CN" sz="1400" b="0" i="0" dirty="0">
+              <a:rPr lang="en-US" altLang="zh-CN" sz="1500" b="0" i="0" dirty="0">
                 <a:effectLst/>
                 <a:latin typeface="Times New Roman" panose="02020603050405020304" pitchFamily="18" charset="0"/>
                 <a:cs typeface="Times New Roman" panose="02020603050405020304" pitchFamily="18" charset="0"/>
@@ -12213,7 +12209,7 @@
               <a:t>Therefore, we would like to propose a new language model, the Teacher LM, dedicated to generating reasoning processes that provide model-generated high-quality reasoning for existing QA</a:t>
             </a:r>
             <a:r>
-              <a:rPr lang="zh-CN" altLang="en-US" sz="1400" b="0" i="0" dirty="0">
+              <a:rPr lang="zh-CN" altLang="en-US" sz="1500" b="0" i="0" dirty="0">
                 <a:effectLst/>
                 <a:latin typeface="Times New Roman" panose="02020603050405020304" pitchFamily="18" charset="0"/>
                 <a:cs typeface="Times New Roman" panose="02020603050405020304" pitchFamily="18" charset="0"/>
@@ -12221,7 +12217,7 @@
               <a:t> </a:t>
             </a:r>
             <a:r>
-              <a:rPr lang="en-US" altLang="zh-CN" sz="1400" b="0" i="0" dirty="0">
+              <a:rPr lang="en-US" altLang="zh-CN" sz="1500" b="0" i="0" dirty="0">
                 <a:effectLst/>
                 <a:latin typeface="Times New Roman" panose="02020603050405020304" pitchFamily="18" charset="0"/>
                 <a:cs typeface="Times New Roman" panose="02020603050405020304" pitchFamily="18" charset="0"/>
@@ -12229,7 +12225,7 @@
               <a:t>tasks, replacing manually annotated</a:t>
             </a:r>
             <a:r>
-              <a:rPr lang="zh-CN" altLang="en-US" sz="1400" b="0" i="0" dirty="0">
+              <a:rPr lang="zh-CN" altLang="en-US" sz="1500" b="0" i="0" dirty="0">
                 <a:effectLst/>
                 <a:latin typeface="Times New Roman" panose="02020603050405020304" pitchFamily="18" charset="0"/>
                 <a:cs typeface="Times New Roman" panose="02020603050405020304" pitchFamily="18" charset="0"/>
@@ -12237,7 +12233,7 @@
               <a:t> </a:t>
             </a:r>
             <a:r>
-              <a:rPr lang="en-US" altLang="zh-CN" sz="1400" b="0" i="0" dirty="0" err="1">
+              <a:rPr lang="en-US" altLang="zh-CN" sz="1500" b="0" i="0" dirty="0" err="1">
                 <a:effectLst/>
                 <a:latin typeface="Times New Roman" panose="02020603050405020304" pitchFamily="18" charset="0"/>
                 <a:cs typeface="Times New Roman" panose="02020603050405020304" pitchFamily="18" charset="0"/>
@@ -12245,22 +12241,22 @@
               <a:t>Co</a:t>
             </a:r>
             <a:r>
-              <a:rPr lang="en-US" altLang="zh-CN" sz="1400" dirty="0" err="1">
+              <a:rPr lang="en-US" altLang="zh-CN" sz="1500" dirty="0" err="1">
                 <a:latin typeface="Times New Roman" panose="02020603050405020304" pitchFamily="18" charset="0"/>
                 <a:cs typeface="Times New Roman" panose="02020603050405020304" pitchFamily="18" charset="0"/>
               </a:rPr>
               <a:t>T</a:t>
             </a:r>
             <a:r>
-              <a:rPr lang="en-US" altLang="zh-CN" sz="1400" b="0" i="0" dirty="0">
+              <a:rPr lang="en-US" altLang="zh-CN" sz="1500" b="0" i="0" dirty="0">
                 <a:effectLst/>
                 <a:latin typeface="Times New Roman" panose="02020603050405020304" pitchFamily="18" charset="0"/>
                 <a:cs typeface="Times New Roman" panose="02020603050405020304" pitchFamily="18" charset="0"/>
               </a:rPr>
-              <a:t>. Ultimately, our reasoning </a:t>
-            </a:r>
-            <a:r>
-              <a:rPr lang="zh-CN" altLang="en-US" sz="1400" b="0" i="0" dirty="0">
+              <a:t>. Ultimately, our reasoning</a:t>
+            </a:r>
+            <a:r>
+              <a:rPr lang="zh-CN" altLang="en-US" sz="1500" b="0" i="0" dirty="0">
                 <a:effectLst/>
                 <a:latin typeface="Times New Roman" panose="02020603050405020304" pitchFamily="18" charset="0"/>
                 <a:cs typeface="Times New Roman" panose="02020603050405020304" pitchFamily="18" charset="0"/>
@@ -12268,15 +12264,15 @@
               <a:t> </a:t>
             </a:r>
             <a:r>
-              <a:rPr lang="en-US" altLang="zh-CN" sz="1400" b="0" i="0" dirty="0">
+              <a:rPr lang="en-US" altLang="zh-CN" sz="1500" b="0" i="0" dirty="0">
                 <a:effectLst/>
                 <a:latin typeface="Times New Roman" panose="02020603050405020304" pitchFamily="18" charset="0"/>
                 <a:cs typeface="Times New Roman" panose="02020603050405020304" pitchFamily="18" charset="0"/>
               </a:rPr>
-              <a:t>are used to perform </a:t>
-            </a:r>
-            <a:r>
-              <a:rPr lang="en-US" altLang="zh-CN" sz="1400" b="0" i="0" dirty="0" err="1">
+              <a:t>is used to perform </a:t>
+            </a:r>
+            <a:r>
+              <a:rPr lang="en-US" altLang="zh-CN" sz="1500" b="0" i="0" dirty="0" err="1">
                 <a:effectLst/>
                 <a:latin typeface="Times New Roman" panose="02020603050405020304" pitchFamily="18" charset="0"/>
                 <a:cs typeface="Times New Roman" panose="02020603050405020304" pitchFamily="18" charset="0"/>
@@ -12284,15 +12280,15 @@
               <a:t>CoT</a:t>
             </a:r>
             <a:r>
-              <a:rPr lang="en-US" altLang="zh-CN" sz="1400" b="0" i="0" dirty="0">
+              <a:rPr lang="en-US" altLang="zh-CN" sz="1500" b="0" i="0" dirty="0">
                 <a:effectLst/>
                 <a:latin typeface="Times New Roman" panose="02020603050405020304" pitchFamily="18" charset="0"/>
                 <a:cs typeface="Times New Roman" panose="02020603050405020304" pitchFamily="18" charset="0"/>
               </a:rPr>
-              <a:t> Instruction Finetune, improving small-scale language models' reasoning</a:t>
-            </a:r>
-            <a:r>
-              <a:rPr lang="zh-CN" altLang="en-US" sz="1400" b="0" i="0" dirty="0">
+              <a:t> Instruction Finetune, improving small-scale language models’ reasoning</a:t>
+            </a:r>
+            <a:r>
+              <a:rPr lang="zh-CN" altLang="en-US" sz="1500" b="0" i="0" dirty="0">
                 <a:effectLst/>
                 <a:latin typeface="Times New Roman" panose="02020603050405020304" pitchFamily="18" charset="0"/>
                 <a:cs typeface="Times New Roman" panose="02020603050405020304" pitchFamily="18" charset="0"/>
@@ -12300,21 +12296,23 @@
               <a:t> </a:t>
             </a:r>
             <a:r>
-              <a:rPr lang="en-US" altLang="zh-CN" sz="1400" b="0" i="0" dirty="0" err="1">
+              <a:rPr lang="en-US" altLang="zh-CN" sz="1500" b="0" i="0" dirty="0">
                 <a:effectLst/>
                 <a:latin typeface="Times New Roman" panose="02020603050405020304" pitchFamily="18" charset="0"/>
                 <a:cs typeface="Times New Roman" panose="02020603050405020304" pitchFamily="18" charset="0"/>
               </a:rPr>
-              <a:t>aility</a:t>
-            </a:r>
-            <a:r>
-              <a:rPr lang="en-US" altLang="zh-CN" sz="1400" b="0" i="0" dirty="0">
-                <a:effectLst/>
-                <a:latin typeface="Times New Roman" panose="02020603050405020304" pitchFamily="18" charset="0"/>
-                <a:cs typeface="Times New Roman" panose="02020603050405020304" pitchFamily="18" charset="0"/>
-              </a:rPr>
-              <a:t>.</a:t>
-            </a:r>
+              <a:t>ability.</a:t>
+            </a:r>
+          </a:p>
+          <a:p>
+            <a:pPr marL="0" indent="0">
+              <a:buNone/>
+            </a:pPr>
+            <a:endParaRPr lang="en-US" altLang="zh-CN" sz="1500" b="0" i="0" dirty="0">
+              <a:effectLst/>
+              <a:latin typeface="Times New Roman" panose="02020603050405020304" pitchFamily="18" charset="0"/>
+              <a:cs typeface="Times New Roman" panose="02020603050405020304" pitchFamily="18" charset="0"/>
+            </a:endParaRPr>
           </a:p>
         </p:txBody>
       </p:sp>

</xml_diff>

<commit_message>
北京：2022-12-28 19:42:10 纽约：2022-12-28 06:42:10 加州：2022-12-28 03:42:10 伦敦：2022-12-28 11:42:10 瑞士：2022-12-28 12:42:10 悉尼：2022-12-28 22:42:10
</commit_message>
<xml_diff>
--- a/self-info/Teacher LM English.pptx
+++ b/self-info/Teacher LM English.pptx
@@ -1581,14 +1581,14 @@
           <a:effectLst/>
           <a:extLst>
             <a:ext uri="{909E8E84-426E-40dd-AFC4-6F175D3DCCD1}">
-              <a14:hiddenFill xmlns:a14="http://schemas.microsoft.com/office/drawing/2010/main" xmlns="">
+              <a14:hiddenFill xmlns="" xmlns:a14="http://schemas.microsoft.com/office/drawing/2010/main">
                 <a:solidFill>
                   <a:schemeClr val="accent1"/>
                 </a:solidFill>
               </a14:hiddenFill>
             </a:ext>
             <a:ext uri="{91240B29-F687-4f45-9708-019B960494DF}">
-              <a14:hiddenLine xmlns:a14="http://schemas.microsoft.com/office/drawing/2010/main" xmlns="" w="9525">
+              <a14:hiddenLine xmlns="" xmlns:a14="http://schemas.microsoft.com/office/drawing/2010/main" w="9525">
                 <a:solidFill>
                   <a:schemeClr val="tx1"/>
                 </a:solidFill>
@@ -1598,7 +1598,7 @@
               </a14:hiddenLine>
             </a:ext>
             <a:ext uri="{AF507438-7753-43e0-B8FC-AC1667EBCBE1}">
-              <a14:hiddenEffects xmlns:a14="http://schemas.microsoft.com/office/drawing/2010/main" xmlns="">
+              <a14:hiddenEffects xmlns="" xmlns:a14="http://schemas.microsoft.com/office/drawing/2010/main">
                 <a:effectLst>
                   <a:outerShdw dist="35921" dir="2700000" algn="ctr" rotWithShape="0">
                     <a:schemeClr val="bg2"/>
@@ -1645,14 +1645,14 @@
           <a:effectLst/>
           <a:extLst>
             <a:ext uri="{909E8E84-426E-40dd-AFC4-6F175D3DCCD1}">
-              <a14:hiddenFill xmlns:a14="http://schemas.microsoft.com/office/drawing/2010/main" xmlns="">
+              <a14:hiddenFill xmlns="" xmlns:a14="http://schemas.microsoft.com/office/drawing/2010/main">
                 <a:solidFill>
                   <a:schemeClr val="accent1"/>
                 </a:solidFill>
               </a14:hiddenFill>
             </a:ext>
             <a:ext uri="{91240B29-F687-4f45-9708-019B960494DF}">
-              <a14:hiddenLine xmlns:a14="http://schemas.microsoft.com/office/drawing/2010/main" xmlns="" w="9525">
+              <a14:hiddenLine xmlns="" xmlns:a14="http://schemas.microsoft.com/office/drawing/2010/main" w="9525">
                 <a:solidFill>
                   <a:schemeClr val="tx1"/>
                 </a:solidFill>
@@ -1662,7 +1662,7 @@
               </a14:hiddenLine>
             </a:ext>
             <a:ext uri="{AF507438-7753-43e0-B8FC-AC1667EBCBE1}">
-              <a14:hiddenEffects xmlns:a14="http://schemas.microsoft.com/office/drawing/2010/main" xmlns="">
+              <a14:hiddenEffects xmlns="" xmlns:a14="http://schemas.microsoft.com/office/drawing/2010/main">
                 <a:effectLst>
                   <a:outerShdw dist="35921" dir="2700000" algn="ctr" rotWithShape="0">
                     <a:schemeClr val="bg2"/>
@@ -2175,14 +2175,14 @@
           <a:effectLst/>
           <a:extLst>
             <a:ext uri="{909E8E84-426E-40dd-AFC4-6F175D3DCCD1}">
-              <a14:hiddenFill xmlns:a14="http://schemas.microsoft.com/office/drawing/2010/main" xmlns="">
+              <a14:hiddenFill xmlns="" xmlns:a14="http://schemas.microsoft.com/office/drawing/2010/main">
                 <a:solidFill>
                   <a:schemeClr val="accent1"/>
                 </a:solidFill>
               </a14:hiddenFill>
             </a:ext>
             <a:ext uri="{91240B29-F687-4f45-9708-019B960494DF}">
-              <a14:hiddenLine xmlns:a14="http://schemas.microsoft.com/office/drawing/2010/main" xmlns="" w="9525">
+              <a14:hiddenLine xmlns="" xmlns:a14="http://schemas.microsoft.com/office/drawing/2010/main" w="9525">
                 <a:solidFill>
                   <a:schemeClr val="tx1"/>
                 </a:solidFill>
@@ -2192,7 +2192,7 @@
               </a14:hiddenLine>
             </a:ext>
             <a:ext uri="{AF507438-7753-43e0-B8FC-AC1667EBCBE1}">
-              <a14:hiddenEffects xmlns:a14="http://schemas.microsoft.com/office/drawing/2010/main" xmlns="">
+              <a14:hiddenEffects xmlns="" xmlns:a14="http://schemas.microsoft.com/office/drawing/2010/main">
                 <a:effectLst>
                   <a:outerShdw dist="35921" dir="2700000" algn="ctr" rotWithShape="0">
                     <a:schemeClr val="bg2"/>
@@ -2247,12 +2247,12 @@
             <a:effectLst/>
             <a:extLst>
               <a:ext uri="{909E8E84-426E-40dd-AFC4-6F175D3DCCD1}">
-                <a14:hiddenFill xmlns:a14="http://schemas.microsoft.com/office/drawing/2010/main" xmlns="">
+                <a14:hiddenFill xmlns="" xmlns:a14="http://schemas.microsoft.com/office/drawing/2010/main">
                   <a:noFill/>
                 </a14:hiddenFill>
               </a:ext>
               <a:ext uri="{AF507438-7753-43e0-B8FC-AC1667EBCBE1}">
-                <a14:hiddenEffects xmlns:a14="http://schemas.microsoft.com/office/drawing/2010/main" xmlns="">
+                <a14:hiddenEffects xmlns="" xmlns:a14="http://schemas.microsoft.com/office/drawing/2010/main">
                   <a:effectLst>
                     <a:outerShdw dist="35921" dir="2700000" algn="ctr" rotWithShape="0">
                       <a:schemeClr val="bg2"/>
@@ -2298,12 +2298,12 @@
             <a:effectLst/>
             <a:extLst>
               <a:ext uri="{909E8E84-426E-40dd-AFC4-6F175D3DCCD1}">
-                <a14:hiddenFill xmlns:a14="http://schemas.microsoft.com/office/drawing/2010/main" xmlns="">
+                <a14:hiddenFill xmlns="" xmlns:a14="http://schemas.microsoft.com/office/drawing/2010/main">
                   <a:noFill/>
                 </a14:hiddenFill>
               </a:ext>
               <a:ext uri="{AF507438-7753-43e0-B8FC-AC1667EBCBE1}">
-                <a14:hiddenEffects xmlns:a14="http://schemas.microsoft.com/office/drawing/2010/main" xmlns="">
+                <a14:hiddenEffects xmlns="" xmlns:a14="http://schemas.microsoft.com/office/drawing/2010/main">
                   <a:effectLst>
                     <a:outerShdw dist="35921" dir="2700000" algn="ctr" rotWithShape="0">
                       <a:schemeClr val="bg2"/>
@@ -2349,12 +2349,12 @@
             <a:effectLst/>
             <a:extLst>
               <a:ext uri="{909E8E84-426E-40dd-AFC4-6F175D3DCCD1}">
-                <a14:hiddenFill xmlns:a14="http://schemas.microsoft.com/office/drawing/2010/main" xmlns="">
+                <a14:hiddenFill xmlns="" xmlns:a14="http://schemas.microsoft.com/office/drawing/2010/main">
                   <a:noFill/>
                 </a14:hiddenFill>
               </a:ext>
               <a:ext uri="{AF507438-7753-43e0-B8FC-AC1667EBCBE1}">
-                <a14:hiddenEffects xmlns:a14="http://schemas.microsoft.com/office/drawing/2010/main" xmlns="">
+                <a14:hiddenEffects xmlns="" xmlns:a14="http://schemas.microsoft.com/office/drawing/2010/main">
                   <a:effectLst>
                     <a:outerShdw dist="35921" dir="2700000" algn="ctr" rotWithShape="0">
                       <a:schemeClr val="bg2"/>
@@ -2400,12 +2400,12 @@
             <a:effectLst/>
             <a:extLst>
               <a:ext uri="{909E8E84-426E-40dd-AFC4-6F175D3DCCD1}">
-                <a14:hiddenFill xmlns:a14="http://schemas.microsoft.com/office/drawing/2010/main" xmlns="">
+                <a14:hiddenFill xmlns="" xmlns:a14="http://schemas.microsoft.com/office/drawing/2010/main">
                   <a:noFill/>
                 </a14:hiddenFill>
               </a:ext>
               <a:ext uri="{AF507438-7753-43e0-B8FC-AC1667EBCBE1}">
-                <a14:hiddenEffects xmlns:a14="http://schemas.microsoft.com/office/drawing/2010/main" xmlns="">
+                <a14:hiddenEffects xmlns="" xmlns:a14="http://schemas.microsoft.com/office/drawing/2010/main">
                   <a:effectLst>
                     <a:outerShdw dist="35921" dir="2700000" algn="ctr" rotWithShape="0">
                       <a:schemeClr val="bg2"/>
@@ -2517,14 +2517,14 @@
               <a:effectLst/>
               <a:extLst>
                 <a:ext uri="{909E8E84-426E-40dd-AFC4-6F175D3DCCD1}">
-                  <a14:hiddenFill xmlns:a14="http://schemas.microsoft.com/office/drawing/2010/main" xmlns="">
+                  <a14:hiddenFill xmlns="" xmlns:a14="http://schemas.microsoft.com/office/drawing/2010/main">
                     <a:solidFill>
                       <a:srgbClr val="FFFF00"/>
                     </a:solidFill>
                   </a14:hiddenFill>
                 </a:ext>
                 <a:ext uri="{AF507438-7753-43e0-B8FC-AC1667EBCBE1}">
-                  <a14:hiddenEffects xmlns:a14="http://schemas.microsoft.com/office/drawing/2010/main" xmlns="">
+                  <a14:hiddenEffects xmlns="" xmlns:a14="http://schemas.microsoft.com/office/drawing/2010/main">
                     <a:effectLst>
                       <a:outerShdw dist="35921" dir="2700000" algn="ctr" rotWithShape="0">
                         <a:schemeClr val="bg2"/>
@@ -2620,14 +2620,14 @@
               <a:effectLst/>
               <a:extLst>
                 <a:ext uri="{909E8E84-426E-40dd-AFC4-6F175D3DCCD1}">
-                  <a14:hiddenFill xmlns:a14="http://schemas.microsoft.com/office/drawing/2010/main" xmlns="">
+                  <a14:hiddenFill xmlns="" xmlns:a14="http://schemas.microsoft.com/office/drawing/2010/main">
                     <a:solidFill>
                       <a:srgbClr val="FFFF00"/>
                     </a:solidFill>
                   </a14:hiddenFill>
                 </a:ext>
                 <a:ext uri="{AF507438-7753-43e0-B8FC-AC1667EBCBE1}">
-                  <a14:hiddenEffects xmlns:a14="http://schemas.microsoft.com/office/drawing/2010/main" xmlns="">
+                  <a14:hiddenEffects xmlns="" xmlns:a14="http://schemas.microsoft.com/office/drawing/2010/main">
                     <a:effectLst>
                       <a:outerShdw dist="35921" dir="2700000" algn="ctr" rotWithShape="0">
                         <a:schemeClr val="bg2"/>
@@ -2674,12 +2674,12 @@
             <a:effectLst/>
             <a:extLst>
               <a:ext uri="{909E8E84-426E-40dd-AFC4-6F175D3DCCD1}">
-                <a14:hiddenFill xmlns:a14="http://schemas.microsoft.com/office/drawing/2010/main" xmlns="">
+                <a14:hiddenFill xmlns="" xmlns:a14="http://schemas.microsoft.com/office/drawing/2010/main">
                   <a:noFill/>
                 </a14:hiddenFill>
               </a:ext>
               <a:ext uri="{AF507438-7753-43e0-B8FC-AC1667EBCBE1}">
-                <a14:hiddenEffects xmlns:a14="http://schemas.microsoft.com/office/drawing/2010/main" xmlns="">
+                <a14:hiddenEffects xmlns="" xmlns:a14="http://schemas.microsoft.com/office/drawing/2010/main">
                   <a:effectLst>
                     <a:outerShdw dist="35921" dir="2700000" algn="ctr" rotWithShape="0">
                       <a:schemeClr val="bg2"/>
@@ -2725,12 +2725,12 @@
             <a:effectLst/>
             <a:extLst>
               <a:ext uri="{909E8E84-426E-40dd-AFC4-6F175D3DCCD1}">
-                <a14:hiddenFill xmlns:a14="http://schemas.microsoft.com/office/drawing/2010/main" xmlns="">
+                <a14:hiddenFill xmlns="" xmlns:a14="http://schemas.microsoft.com/office/drawing/2010/main">
                   <a:noFill/>
                 </a14:hiddenFill>
               </a:ext>
               <a:ext uri="{AF507438-7753-43e0-B8FC-AC1667EBCBE1}">
-                <a14:hiddenEffects xmlns:a14="http://schemas.microsoft.com/office/drawing/2010/main" xmlns="">
+                <a14:hiddenEffects xmlns="" xmlns:a14="http://schemas.microsoft.com/office/drawing/2010/main">
                   <a:effectLst>
                     <a:outerShdw dist="35921" dir="2700000" algn="ctr" rotWithShape="0">
                       <a:schemeClr val="bg2"/>
@@ -2776,12 +2776,12 @@
             <a:effectLst/>
             <a:extLst>
               <a:ext uri="{909E8E84-426E-40dd-AFC4-6F175D3DCCD1}">
-                <a14:hiddenFill xmlns:a14="http://schemas.microsoft.com/office/drawing/2010/main" xmlns="">
+                <a14:hiddenFill xmlns="" xmlns:a14="http://schemas.microsoft.com/office/drawing/2010/main">
                   <a:noFill/>
                 </a14:hiddenFill>
               </a:ext>
               <a:ext uri="{AF507438-7753-43e0-B8FC-AC1667EBCBE1}">
-                <a14:hiddenEffects xmlns:a14="http://schemas.microsoft.com/office/drawing/2010/main" xmlns="">
+                <a14:hiddenEffects xmlns="" xmlns:a14="http://schemas.microsoft.com/office/drawing/2010/main">
                   <a:effectLst>
                     <a:outerShdw dist="35921" dir="2700000" algn="ctr" rotWithShape="0">
                       <a:schemeClr val="bg2"/>
@@ -2827,12 +2827,12 @@
             <a:effectLst/>
             <a:extLst>
               <a:ext uri="{909E8E84-426E-40dd-AFC4-6F175D3DCCD1}">
-                <a14:hiddenFill xmlns:a14="http://schemas.microsoft.com/office/drawing/2010/main" xmlns="">
+                <a14:hiddenFill xmlns="" xmlns:a14="http://schemas.microsoft.com/office/drawing/2010/main">
                   <a:noFill/>
                 </a14:hiddenFill>
               </a:ext>
               <a:ext uri="{AF507438-7753-43e0-B8FC-AC1667EBCBE1}">
-                <a14:hiddenEffects xmlns:a14="http://schemas.microsoft.com/office/drawing/2010/main" xmlns="">
+                <a14:hiddenEffects xmlns="" xmlns:a14="http://schemas.microsoft.com/office/drawing/2010/main">
                   <a:effectLst>
                     <a:outerShdw dist="35921" dir="2700000" algn="ctr" rotWithShape="0">
                       <a:schemeClr val="bg2"/>
@@ -2878,12 +2878,12 @@
             <a:effectLst/>
             <a:extLst>
               <a:ext uri="{909E8E84-426E-40dd-AFC4-6F175D3DCCD1}">
-                <a14:hiddenFill xmlns:a14="http://schemas.microsoft.com/office/drawing/2010/main" xmlns="">
+                <a14:hiddenFill xmlns="" xmlns:a14="http://schemas.microsoft.com/office/drawing/2010/main">
                   <a:noFill/>
                 </a14:hiddenFill>
               </a:ext>
               <a:ext uri="{AF507438-7753-43e0-B8FC-AC1667EBCBE1}">
-                <a14:hiddenEffects xmlns:a14="http://schemas.microsoft.com/office/drawing/2010/main" xmlns="">
+                <a14:hiddenEffects xmlns="" xmlns:a14="http://schemas.microsoft.com/office/drawing/2010/main">
                   <a:effectLst>
                     <a:outerShdw dist="35921" dir="2700000" algn="ctr" rotWithShape="0">
                       <a:schemeClr val="bg2"/>
@@ -2929,12 +2929,12 @@
             <a:effectLst/>
             <a:extLst>
               <a:ext uri="{909E8E84-426E-40dd-AFC4-6F175D3DCCD1}">
-                <a14:hiddenFill xmlns:a14="http://schemas.microsoft.com/office/drawing/2010/main" xmlns="">
+                <a14:hiddenFill xmlns="" xmlns:a14="http://schemas.microsoft.com/office/drawing/2010/main">
                   <a:noFill/>
                 </a14:hiddenFill>
               </a:ext>
               <a:ext uri="{AF507438-7753-43e0-B8FC-AC1667EBCBE1}">
-                <a14:hiddenEffects xmlns:a14="http://schemas.microsoft.com/office/drawing/2010/main" xmlns="">
+                <a14:hiddenEffects xmlns="" xmlns:a14="http://schemas.microsoft.com/office/drawing/2010/main">
                   <a:effectLst>
                     <a:outerShdw dist="35921" dir="2700000" algn="ctr" rotWithShape="0">
                       <a:schemeClr val="bg2"/>
@@ -2980,12 +2980,12 @@
             <a:effectLst/>
             <a:extLst>
               <a:ext uri="{909E8E84-426E-40dd-AFC4-6F175D3DCCD1}">
-                <a14:hiddenFill xmlns:a14="http://schemas.microsoft.com/office/drawing/2010/main" xmlns="">
+                <a14:hiddenFill xmlns="" xmlns:a14="http://schemas.microsoft.com/office/drawing/2010/main">
                   <a:noFill/>
                 </a14:hiddenFill>
               </a:ext>
               <a:ext uri="{AF507438-7753-43e0-B8FC-AC1667EBCBE1}">
-                <a14:hiddenEffects xmlns:a14="http://schemas.microsoft.com/office/drawing/2010/main" xmlns="">
+                <a14:hiddenEffects xmlns="" xmlns:a14="http://schemas.microsoft.com/office/drawing/2010/main">
                   <a:effectLst>
                     <a:outerShdw dist="35921" dir="2700000" algn="ctr" rotWithShape="0">
                       <a:schemeClr val="bg2"/>
@@ -3031,12 +3031,12 @@
             <a:effectLst/>
             <a:extLst>
               <a:ext uri="{909E8E84-426E-40dd-AFC4-6F175D3DCCD1}">
-                <a14:hiddenFill xmlns:a14="http://schemas.microsoft.com/office/drawing/2010/main" xmlns="">
+                <a14:hiddenFill xmlns="" xmlns:a14="http://schemas.microsoft.com/office/drawing/2010/main">
                   <a:noFill/>
                 </a14:hiddenFill>
               </a:ext>
               <a:ext uri="{AF507438-7753-43e0-B8FC-AC1667EBCBE1}">
-                <a14:hiddenEffects xmlns:a14="http://schemas.microsoft.com/office/drawing/2010/main" xmlns="">
+                <a14:hiddenEffects xmlns="" xmlns:a14="http://schemas.microsoft.com/office/drawing/2010/main">
                   <a:effectLst>
                     <a:outerShdw dist="35921" dir="2700000" algn="ctr" rotWithShape="0">
                       <a:schemeClr val="bg2"/>
@@ -3082,12 +3082,12 @@
             <a:effectLst/>
             <a:extLst>
               <a:ext uri="{909E8E84-426E-40dd-AFC4-6F175D3DCCD1}">
-                <a14:hiddenFill xmlns:a14="http://schemas.microsoft.com/office/drawing/2010/main" xmlns="">
+                <a14:hiddenFill xmlns="" xmlns:a14="http://schemas.microsoft.com/office/drawing/2010/main">
                   <a:noFill/>
                 </a14:hiddenFill>
               </a:ext>
               <a:ext uri="{AF507438-7753-43e0-B8FC-AC1667EBCBE1}">
-                <a14:hiddenEffects xmlns:a14="http://schemas.microsoft.com/office/drawing/2010/main" xmlns="">
+                <a14:hiddenEffects xmlns="" xmlns:a14="http://schemas.microsoft.com/office/drawing/2010/main">
                   <a:effectLst>
                     <a:outerShdw dist="35921" dir="2700000" algn="ctr" rotWithShape="0">
                       <a:schemeClr val="bg2"/>
@@ -3133,12 +3133,12 @@
             <a:effectLst/>
             <a:extLst>
               <a:ext uri="{909E8E84-426E-40dd-AFC4-6F175D3DCCD1}">
-                <a14:hiddenFill xmlns:a14="http://schemas.microsoft.com/office/drawing/2010/main" xmlns="">
+                <a14:hiddenFill xmlns="" xmlns:a14="http://schemas.microsoft.com/office/drawing/2010/main">
                   <a:noFill/>
                 </a14:hiddenFill>
               </a:ext>
               <a:ext uri="{AF507438-7753-43e0-B8FC-AC1667EBCBE1}">
-                <a14:hiddenEffects xmlns:a14="http://schemas.microsoft.com/office/drawing/2010/main" xmlns="">
+                <a14:hiddenEffects xmlns="" xmlns:a14="http://schemas.microsoft.com/office/drawing/2010/main">
                   <a:effectLst>
                     <a:outerShdw dist="35921" dir="2700000" algn="ctr" rotWithShape="0">
                       <a:schemeClr val="bg2"/>
@@ -3184,12 +3184,12 @@
             <a:effectLst/>
             <a:extLst>
               <a:ext uri="{909E8E84-426E-40dd-AFC4-6F175D3DCCD1}">
-                <a14:hiddenFill xmlns:a14="http://schemas.microsoft.com/office/drawing/2010/main" xmlns="">
+                <a14:hiddenFill xmlns="" xmlns:a14="http://schemas.microsoft.com/office/drawing/2010/main">
                   <a:noFill/>
                 </a14:hiddenFill>
               </a:ext>
               <a:ext uri="{AF507438-7753-43e0-B8FC-AC1667EBCBE1}">
-                <a14:hiddenEffects xmlns:a14="http://schemas.microsoft.com/office/drawing/2010/main" xmlns="">
+                <a14:hiddenEffects xmlns="" xmlns:a14="http://schemas.microsoft.com/office/drawing/2010/main">
                   <a:effectLst>
                     <a:outerShdw dist="35921" dir="2700000" algn="ctr" rotWithShape="0">
                       <a:schemeClr val="bg2"/>
@@ -3235,12 +3235,12 @@
             <a:effectLst/>
             <a:extLst>
               <a:ext uri="{909E8E84-426E-40dd-AFC4-6F175D3DCCD1}">
-                <a14:hiddenFill xmlns:a14="http://schemas.microsoft.com/office/drawing/2010/main" xmlns="">
+                <a14:hiddenFill xmlns="" xmlns:a14="http://schemas.microsoft.com/office/drawing/2010/main">
                   <a:noFill/>
                 </a14:hiddenFill>
               </a:ext>
               <a:ext uri="{AF507438-7753-43e0-B8FC-AC1667EBCBE1}">
-                <a14:hiddenEffects xmlns:a14="http://schemas.microsoft.com/office/drawing/2010/main" xmlns="">
+                <a14:hiddenEffects xmlns="" xmlns:a14="http://schemas.microsoft.com/office/drawing/2010/main">
                   <a:effectLst>
                     <a:outerShdw dist="35921" dir="2700000" algn="ctr" rotWithShape="0">
                       <a:schemeClr val="bg2"/>
@@ -3352,14 +3352,14 @@
               <a:effectLst/>
               <a:extLst>
                 <a:ext uri="{909E8E84-426E-40dd-AFC4-6F175D3DCCD1}">
-                  <a14:hiddenFill xmlns:a14="http://schemas.microsoft.com/office/drawing/2010/main" xmlns="">
+                  <a14:hiddenFill xmlns="" xmlns:a14="http://schemas.microsoft.com/office/drawing/2010/main">
                     <a:solidFill>
                       <a:srgbClr val="FFFF00"/>
                     </a:solidFill>
                   </a14:hiddenFill>
                 </a:ext>
                 <a:ext uri="{AF507438-7753-43e0-B8FC-AC1667EBCBE1}">
-                  <a14:hiddenEffects xmlns:a14="http://schemas.microsoft.com/office/drawing/2010/main" xmlns="">
+                  <a14:hiddenEffects xmlns="" xmlns:a14="http://schemas.microsoft.com/office/drawing/2010/main">
                     <a:effectLst>
                       <a:outerShdw dist="35921" dir="2700000" algn="ctr" rotWithShape="0">
                         <a:schemeClr val="bg2"/>
@@ -3455,14 +3455,14 @@
               <a:effectLst/>
               <a:extLst>
                 <a:ext uri="{909E8E84-426E-40dd-AFC4-6F175D3DCCD1}">
-                  <a14:hiddenFill xmlns:a14="http://schemas.microsoft.com/office/drawing/2010/main" xmlns="">
+                  <a14:hiddenFill xmlns="" xmlns:a14="http://schemas.microsoft.com/office/drawing/2010/main">
                     <a:solidFill>
                       <a:srgbClr val="FFFF00"/>
                     </a:solidFill>
                   </a14:hiddenFill>
                 </a:ext>
                 <a:ext uri="{AF507438-7753-43e0-B8FC-AC1667EBCBE1}">
-                  <a14:hiddenEffects xmlns:a14="http://schemas.microsoft.com/office/drawing/2010/main" xmlns="">
+                  <a14:hiddenEffects xmlns="" xmlns:a14="http://schemas.microsoft.com/office/drawing/2010/main">
                     <a:effectLst>
                       <a:outerShdw dist="35921" dir="2700000" algn="ctr" rotWithShape="0">
                         <a:schemeClr val="bg2"/>
@@ -3509,12 +3509,12 @@
             <a:effectLst/>
             <a:extLst>
               <a:ext uri="{909E8E84-426E-40dd-AFC4-6F175D3DCCD1}">
-                <a14:hiddenFill xmlns:a14="http://schemas.microsoft.com/office/drawing/2010/main" xmlns="">
+                <a14:hiddenFill xmlns="" xmlns:a14="http://schemas.microsoft.com/office/drawing/2010/main">
                   <a:noFill/>
                 </a14:hiddenFill>
               </a:ext>
               <a:ext uri="{AF507438-7753-43e0-B8FC-AC1667EBCBE1}">
-                <a14:hiddenEffects xmlns:a14="http://schemas.microsoft.com/office/drawing/2010/main" xmlns="">
+                <a14:hiddenEffects xmlns="" xmlns:a14="http://schemas.microsoft.com/office/drawing/2010/main">
                   <a:effectLst>
                     <a:outerShdw dist="35921" dir="2700000" algn="ctr" rotWithShape="0">
                       <a:schemeClr val="bg2"/>
@@ -3560,12 +3560,12 @@
             <a:effectLst/>
             <a:extLst>
               <a:ext uri="{909E8E84-426E-40dd-AFC4-6F175D3DCCD1}">
-                <a14:hiddenFill xmlns:a14="http://schemas.microsoft.com/office/drawing/2010/main" xmlns="">
+                <a14:hiddenFill xmlns="" xmlns:a14="http://schemas.microsoft.com/office/drawing/2010/main">
                   <a:noFill/>
                 </a14:hiddenFill>
               </a:ext>
               <a:ext uri="{AF507438-7753-43e0-B8FC-AC1667EBCBE1}">
-                <a14:hiddenEffects xmlns:a14="http://schemas.microsoft.com/office/drawing/2010/main" xmlns="">
+                <a14:hiddenEffects xmlns="" xmlns:a14="http://schemas.microsoft.com/office/drawing/2010/main">
                   <a:effectLst>
                     <a:outerShdw dist="35921" dir="2700000" algn="ctr" rotWithShape="0">
                       <a:schemeClr val="bg2"/>
@@ -3611,12 +3611,12 @@
             <a:effectLst/>
             <a:extLst>
               <a:ext uri="{909E8E84-426E-40dd-AFC4-6F175D3DCCD1}">
-                <a14:hiddenFill xmlns:a14="http://schemas.microsoft.com/office/drawing/2010/main" xmlns="">
+                <a14:hiddenFill xmlns="" xmlns:a14="http://schemas.microsoft.com/office/drawing/2010/main">
                   <a:noFill/>
                 </a14:hiddenFill>
               </a:ext>
               <a:ext uri="{AF507438-7753-43e0-B8FC-AC1667EBCBE1}">
-                <a14:hiddenEffects xmlns:a14="http://schemas.microsoft.com/office/drawing/2010/main" xmlns="">
+                <a14:hiddenEffects xmlns="" xmlns:a14="http://schemas.microsoft.com/office/drawing/2010/main">
                   <a:effectLst>
                     <a:outerShdw dist="35921" dir="2700000" algn="ctr" rotWithShape="0">
                       <a:schemeClr val="bg2"/>
@@ -3662,12 +3662,12 @@
             <a:effectLst/>
             <a:extLst>
               <a:ext uri="{909E8E84-426E-40dd-AFC4-6F175D3DCCD1}">
-                <a14:hiddenFill xmlns:a14="http://schemas.microsoft.com/office/drawing/2010/main" xmlns="">
+                <a14:hiddenFill xmlns="" xmlns:a14="http://schemas.microsoft.com/office/drawing/2010/main">
                   <a:noFill/>
                 </a14:hiddenFill>
               </a:ext>
               <a:ext uri="{AF507438-7753-43e0-B8FC-AC1667EBCBE1}">
-                <a14:hiddenEffects xmlns:a14="http://schemas.microsoft.com/office/drawing/2010/main" xmlns="">
+                <a14:hiddenEffects xmlns="" xmlns:a14="http://schemas.microsoft.com/office/drawing/2010/main">
                   <a:effectLst>
                     <a:outerShdw dist="35921" dir="2700000" algn="ctr" rotWithShape="0">
                       <a:schemeClr val="bg2"/>
@@ -3713,12 +3713,12 @@
             <a:effectLst/>
             <a:extLst>
               <a:ext uri="{909E8E84-426E-40dd-AFC4-6F175D3DCCD1}">
-                <a14:hiddenFill xmlns:a14="http://schemas.microsoft.com/office/drawing/2010/main" xmlns="">
+                <a14:hiddenFill xmlns="" xmlns:a14="http://schemas.microsoft.com/office/drawing/2010/main">
                   <a:noFill/>
                 </a14:hiddenFill>
               </a:ext>
               <a:ext uri="{AF507438-7753-43e0-B8FC-AC1667EBCBE1}">
-                <a14:hiddenEffects xmlns:a14="http://schemas.microsoft.com/office/drawing/2010/main" xmlns="">
+                <a14:hiddenEffects xmlns="" xmlns:a14="http://schemas.microsoft.com/office/drawing/2010/main">
                   <a:effectLst>
                     <a:outerShdw dist="35921" dir="2700000" algn="ctr" rotWithShape="0">
                       <a:schemeClr val="bg2"/>
@@ -3764,12 +3764,12 @@
             <a:effectLst/>
             <a:extLst>
               <a:ext uri="{909E8E84-426E-40dd-AFC4-6F175D3DCCD1}">
-                <a14:hiddenFill xmlns:a14="http://schemas.microsoft.com/office/drawing/2010/main" xmlns="">
+                <a14:hiddenFill xmlns="" xmlns:a14="http://schemas.microsoft.com/office/drawing/2010/main">
                   <a:noFill/>
                 </a14:hiddenFill>
               </a:ext>
               <a:ext uri="{AF507438-7753-43e0-B8FC-AC1667EBCBE1}">
-                <a14:hiddenEffects xmlns:a14="http://schemas.microsoft.com/office/drawing/2010/main" xmlns="">
+                <a14:hiddenEffects xmlns="" xmlns:a14="http://schemas.microsoft.com/office/drawing/2010/main">
                   <a:effectLst>
                     <a:outerShdw dist="35921" dir="2700000" algn="ctr" rotWithShape="0">
                       <a:schemeClr val="bg2"/>
@@ -3815,12 +3815,12 @@
             <a:effectLst/>
             <a:extLst>
               <a:ext uri="{909E8E84-426E-40dd-AFC4-6F175D3DCCD1}">
-                <a14:hiddenFill xmlns:a14="http://schemas.microsoft.com/office/drawing/2010/main" xmlns="">
+                <a14:hiddenFill xmlns="" xmlns:a14="http://schemas.microsoft.com/office/drawing/2010/main">
                   <a:noFill/>
                 </a14:hiddenFill>
               </a:ext>
               <a:ext uri="{AF507438-7753-43e0-B8FC-AC1667EBCBE1}">
-                <a14:hiddenEffects xmlns:a14="http://schemas.microsoft.com/office/drawing/2010/main" xmlns="">
+                <a14:hiddenEffects xmlns="" xmlns:a14="http://schemas.microsoft.com/office/drawing/2010/main">
                   <a:effectLst>
                     <a:outerShdw dist="35921" dir="2700000" algn="ctr" rotWithShape="0">
                       <a:schemeClr val="bg2"/>
@@ -3866,12 +3866,12 @@
             <a:effectLst/>
             <a:extLst>
               <a:ext uri="{909E8E84-426E-40dd-AFC4-6F175D3DCCD1}">
-                <a14:hiddenFill xmlns:a14="http://schemas.microsoft.com/office/drawing/2010/main" xmlns="">
+                <a14:hiddenFill xmlns="" xmlns:a14="http://schemas.microsoft.com/office/drawing/2010/main">
                   <a:noFill/>
                 </a14:hiddenFill>
               </a:ext>
               <a:ext uri="{AF507438-7753-43e0-B8FC-AC1667EBCBE1}">
-                <a14:hiddenEffects xmlns:a14="http://schemas.microsoft.com/office/drawing/2010/main" xmlns="">
+                <a14:hiddenEffects xmlns="" xmlns:a14="http://schemas.microsoft.com/office/drawing/2010/main">
                   <a:effectLst>
                     <a:outerShdw dist="35921" dir="2700000" algn="ctr" rotWithShape="0">
                       <a:schemeClr val="bg2"/>
@@ -3917,12 +3917,12 @@
             <a:effectLst/>
             <a:extLst>
               <a:ext uri="{909E8E84-426E-40dd-AFC4-6F175D3DCCD1}">
-                <a14:hiddenFill xmlns:a14="http://schemas.microsoft.com/office/drawing/2010/main" xmlns="">
+                <a14:hiddenFill xmlns="" xmlns:a14="http://schemas.microsoft.com/office/drawing/2010/main">
                   <a:noFill/>
                 </a14:hiddenFill>
               </a:ext>
               <a:ext uri="{AF507438-7753-43e0-B8FC-AC1667EBCBE1}">
-                <a14:hiddenEffects xmlns:a14="http://schemas.microsoft.com/office/drawing/2010/main" xmlns="">
+                <a14:hiddenEffects xmlns="" xmlns:a14="http://schemas.microsoft.com/office/drawing/2010/main">
                   <a:effectLst>
                     <a:outerShdw dist="35921" dir="2700000" algn="ctr" rotWithShape="0">
                       <a:schemeClr val="bg2"/>
@@ -3968,12 +3968,12 @@
             <a:effectLst/>
             <a:extLst>
               <a:ext uri="{909E8E84-426E-40dd-AFC4-6F175D3DCCD1}">
-                <a14:hiddenFill xmlns:a14="http://schemas.microsoft.com/office/drawing/2010/main" xmlns="">
+                <a14:hiddenFill xmlns="" xmlns:a14="http://schemas.microsoft.com/office/drawing/2010/main">
                   <a:noFill/>
                 </a14:hiddenFill>
               </a:ext>
               <a:ext uri="{AF507438-7753-43e0-B8FC-AC1667EBCBE1}">
-                <a14:hiddenEffects xmlns:a14="http://schemas.microsoft.com/office/drawing/2010/main" xmlns="">
+                <a14:hiddenEffects xmlns="" xmlns:a14="http://schemas.microsoft.com/office/drawing/2010/main">
                   <a:effectLst>
                     <a:outerShdw dist="35921" dir="2700000" algn="ctr" rotWithShape="0">
                       <a:schemeClr val="bg2"/>
@@ -4019,12 +4019,12 @@
             <a:effectLst/>
             <a:extLst>
               <a:ext uri="{909E8E84-426E-40dd-AFC4-6F175D3DCCD1}">
-                <a14:hiddenFill xmlns:a14="http://schemas.microsoft.com/office/drawing/2010/main" xmlns="">
+                <a14:hiddenFill xmlns="" xmlns:a14="http://schemas.microsoft.com/office/drawing/2010/main">
                   <a:noFill/>
                 </a14:hiddenFill>
               </a:ext>
               <a:ext uri="{AF507438-7753-43e0-B8FC-AC1667EBCBE1}">
-                <a14:hiddenEffects xmlns:a14="http://schemas.microsoft.com/office/drawing/2010/main" xmlns="">
+                <a14:hiddenEffects xmlns="" xmlns:a14="http://schemas.microsoft.com/office/drawing/2010/main">
                   <a:effectLst>
                     <a:outerShdw dist="35921" dir="2700000" algn="ctr" rotWithShape="0">
                       <a:schemeClr val="bg2"/>
@@ -4070,12 +4070,12 @@
             <a:effectLst/>
             <a:extLst>
               <a:ext uri="{909E8E84-426E-40dd-AFC4-6F175D3DCCD1}">
-                <a14:hiddenFill xmlns:a14="http://schemas.microsoft.com/office/drawing/2010/main" xmlns="">
+                <a14:hiddenFill xmlns="" xmlns:a14="http://schemas.microsoft.com/office/drawing/2010/main">
                   <a:noFill/>
                 </a14:hiddenFill>
               </a:ext>
               <a:ext uri="{AF507438-7753-43e0-B8FC-AC1667EBCBE1}">
-                <a14:hiddenEffects xmlns:a14="http://schemas.microsoft.com/office/drawing/2010/main" xmlns="">
+                <a14:hiddenEffects xmlns="" xmlns:a14="http://schemas.microsoft.com/office/drawing/2010/main">
                   <a:effectLst>
                     <a:outerShdw dist="35921" dir="2700000" algn="ctr" rotWithShape="0">
                       <a:schemeClr val="bg2"/>
@@ -4121,12 +4121,12 @@
             <a:effectLst/>
             <a:extLst>
               <a:ext uri="{909E8E84-426E-40dd-AFC4-6F175D3DCCD1}">
-                <a14:hiddenFill xmlns:a14="http://schemas.microsoft.com/office/drawing/2010/main" xmlns="">
+                <a14:hiddenFill xmlns="" xmlns:a14="http://schemas.microsoft.com/office/drawing/2010/main">
                   <a:noFill/>
                 </a14:hiddenFill>
               </a:ext>
               <a:ext uri="{AF507438-7753-43e0-B8FC-AC1667EBCBE1}">
-                <a14:hiddenEffects xmlns:a14="http://schemas.microsoft.com/office/drawing/2010/main" xmlns="">
+                <a14:hiddenEffects xmlns="" xmlns:a14="http://schemas.microsoft.com/office/drawing/2010/main">
                   <a:effectLst>
                     <a:outerShdw dist="35921" dir="2700000" algn="ctr" rotWithShape="0">
                       <a:schemeClr val="bg2"/>
@@ -4172,12 +4172,12 @@
             <a:effectLst/>
             <a:extLst>
               <a:ext uri="{909E8E84-426E-40dd-AFC4-6F175D3DCCD1}">
-                <a14:hiddenFill xmlns:a14="http://schemas.microsoft.com/office/drawing/2010/main" xmlns="">
+                <a14:hiddenFill xmlns="" xmlns:a14="http://schemas.microsoft.com/office/drawing/2010/main">
                   <a:noFill/>
                 </a14:hiddenFill>
               </a:ext>
               <a:ext uri="{AF507438-7753-43e0-B8FC-AC1667EBCBE1}">
-                <a14:hiddenEffects xmlns:a14="http://schemas.microsoft.com/office/drawing/2010/main" xmlns="">
+                <a14:hiddenEffects xmlns="" xmlns:a14="http://schemas.microsoft.com/office/drawing/2010/main">
                   <a:effectLst>
                     <a:outerShdw dist="35921" dir="2700000" algn="ctr" rotWithShape="0">
                       <a:schemeClr val="bg2"/>
@@ -4239,12 +4239,12 @@
               <a:effectLst/>
               <a:extLst>
                 <a:ext uri="{909E8E84-426E-40dd-AFC4-6F175D3DCCD1}">
-                  <a14:hiddenFill xmlns:a14="http://schemas.microsoft.com/office/drawing/2010/main" xmlns="">
+                  <a14:hiddenFill xmlns="" xmlns:a14="http://schemas.microsoft.com/office/drawing/2010/main">
                     <a:noFill/>
                   </a14:hiddenFill>
                 </a:ext>
                 <a:ext uri="{AF507438-7753-43e0-B8FC-AC1667EBCBE1}">
-                  <a14:hiddenEffects xmlns:a14="http://schemas.microsoft.com/office/drawing/2010/main" xmlns="">
+                  <a14:hiddenEffects xmlns="" xmlns:a14="http://schemas.microsoft.com/office/drawing/2010/main">
                     <a:effectLst>
                       <a:outerShdw dist="35921" dir="2700000" algn="ctr" rotWithShape="0">
                         <a:schemeClr val="bg2"/>
@@ -4290,12 +4290,12 @@
               <a:effectLst/>
               <a:extLst>
                 <a:ext uri="{909E8E84-426E-40dd-AFC4-6F175D3DCCD1}">
-                  <a14:hiddenFill xmlns:a14="http://schemas.microsoft.com/office/drawing/2010/main" xmlns="">
+                  <a14:hiddenFill xmlns="" xmlns:a14="http://schemas.microsoft.com/office/drawing/2010/main">
                     <a:noFill/>
                   </a14:hiddenFill>
                 </a:ext>
                 <a:ext uri="{AF507438-7753-43e0-B8FC-AC1667EBCBE1}">
-                  <a14:hiddenEffects xmlns:a14="http://schemas.microsoft.com/office/drawing/2010/main" xmlns="">
+                  <a14:hiddenEffects xmlns="" xmlns:a14="http://schemas.microsoft.com/office/drawing/2010/main">
                     <a:effectLst>
                       <a:outerShdw dist="35921" dir="2700000" algn="ctr" rotWithShape="0">
                         <a:schemeClr val="bg2"/>
@@ -4341,12 +4341,12 @@
               <a:effectLst/>
               <a:extLst>
                 <a:ext uri="{909E8E84-426E-40dd-AFC4-6F175D3DCCD1}">
-                  <a14:hiddenFill xmlns:a14="http://schemas.microsoft.com/office/drawing/2010/main" xmlns="">
+                  <a14:hiddenFill xmlns="" xmlns:a14="http://schemas.microsoft.com/office/drawing/2010/main">
                     <a:noFill/>
                   </a14:hiddenFill>
                 </a:ext>
                 <a:ext uri="{AF507438-7753-43e0-B8FC-AC1667EBCBE1}">
-                  <a14:hiddenEffects xmlns:a14="http://schemas.microsoft.com/office/drawing/2010/main" xmlns="">
+                  <a14:hiddenEffects xmlns="" xmlns:a14="http://schemas.microsoft.com/office/drawing/2010/main">
                     <a:effectLst>
                       <a:outerShdw dist="35921" dir="2700000" algn="ctr" rotWithShape="0">
                         <a:schemeClr val="bg2"/>
@@ -4392,12 +4392,12 @@
               <a:effectLst/>
               <a:extLst>
                 <a:ext uri="{909E8E84-426E-40dd-AFC4-6F175D3DCCD1}">
-                  <a14:hiddenFill xmlns:a14="http://schemas.microsoft.com/office/drawing/2010/main" xmlns="">
+                  <a14:hiddenFill xmlns="" xmlns:a14="http://schemas.microsoft.com/office/drawing/2010/main">
                     <a:noFill/>
                   </a14:hiddenFill>
                 </a:ext>
                 <a:ext uri="{AF507438-7753-43e0-B8FC-AC1667EBCBE1}">
-                  <a14:hiddenEffects xmlns:a14="http://schemas.microsoft.com/office/drawing/2010/main" xmlns="">
+                  <a14:hiddenEffects xmlns="" xmlns:a14="http://schemas.microsoft.com/office/drawing/2010/main">
                     <a:effectLst>
                       <a:outerShdw dist="35921" dir="2700000" algn="ctr" rotWithShape="0">
                         <a:schemeClr val="bg2"/>
@@ -4460,12 +4460,12 @@
               <a:effectLst/>
               <a:extLst>
                 <a:ext uri="{909E8E84-426E-40dd-AFC4-6F175D3DCCD1}">
-                  <a14:hiddenFill xmlns:a14="http://schemas.microsoft.com/office/drawing/2010/main" xmlns="">
+                  <a14:hiddenFill xmlns="" xmlns:a14="http://schemas.microsoft.com/office/drawing/2010/main">
                     <a:noFill/>
                   </a14:hiddenFill>
                 </a:ext>
                 <a:ext uri="{AF507438-7753-43e0-B8FC-AC1667EBCBE1}">
-                  <a14:hiddenEffects xmlns:a14="http://schemas.microsoft.com/office/drawing/2010/main" xmlns="">
+                  <a14:hiddenEffects xmlns="" xmlns:a14="http://schemas.microsoft.com/office/drawing/2010/main">
                     <a:effectLst>
                       <a:outerShdw dist="35921" dir="2700000" algn="ctr" rotWithShape="0">
                         <a:schemeClr val="bg2"/>
@@ -4511,12 +4511,12 @@
               <a:effectLst/>
               <a:extLst>
                 <a:ext uri="{909E8E84-426E-40dd-AFC4-6F175D3DCCD1}">
-                  <a14:hiddenFill xmlns:a14="http://schemas.microsoft.com/office/drawing/2010/main" xmlns="">
+                  <a14:hiddenFill xmlns="" xmlns:a14="http://schemas.microsoft.com/office/drawing/2010/main">
                     <a:noFill/>
                   </a14:hiddenFill>
                 </a:ext>
                 <a:ext uri="{AF507438-7753-43e0-B8FC-AC1667EBCBE1}">
-                  <a14:hiddenEffects xmlns:a14="http://schemas.microsoft.com/office/drawing/2010/main" xmlns="">
+                  <a14:hiddenEffects xmlns="" xmlns:a14="http://schemas.microsoft.com/office/drawing/2010/main">
                     <a:effectLst>
                       <a:outerShdw dist="35921" dir="2700000" algn="ctr" rotWithShape="0">
                         <a:schemeClr val="bg2"/>
@@ -4562,12 +4562,12 @@
               <a:effectLst/>
               <a:extLst>
                 <a:ext uri="{909E8E84-426E-40dd-AFC4-6F175D3DCCD1}">
-                  <a14:hiddenFill xmlns:a14="http://schemas.microsoft.com/office/drawing/2010/main" xmlns="">
+                  <a14:hiddenFill xmlns="" xmlns:a14="http://schemas.microsoft.com/office/drawing/2010/main">
                     <a:noFill/>
                   </a14:hiddenFill>
                 </a:ext>
                 <a:ext uri="{AF507438-7753-43e0-B8FC-AC1667EBCBE1}">
-                  <a14:hiddenEffects xmlns:a14="http://schemas.microsoft.com/office/drawing/2010/main" xmlns="">
+                  <a14:hiddenEffects xmlns="" xmlns:a14="http://schemas.microsoft.com/office/drawing/2010/main">
                     <a:effectLst>
                       <a:outerShdw dist="35921" dir="2700000" algn="ctr" rotWithShape="0">
                         <a:schemeClr val="bg2"/>
@@ -4613,12 +4613,12 @@
               <a:effectLst/>
               <a:extLst>
                 <a:ext uri="{909E8E84-426E-40dd-AFC4-6F175D3DCCD1}">
-                  <a14:hiddenFill xmlns:a14="http://schemas.microsoft.com/office/drawing/2010/main" xmlns="">
+                  <a14:hiddenFill xmlns="" xmlns:a14="http://schemas.microsoft.com/office/drawing/2010/main">
                     <a:noFill/>
                   </a14:hiddenFill>
                 </a:ext>
                 <a:ext uri="{AF507438-7753-43e0-B8FC-AC1667EBCBE1}">
-                  <a14:hiddenEffects xmlns:a14="http://schemas.microsoft.com/office/drawing/2010/main" xmlns="">
+                  <a14:hiddenEffects xmlns="" xmlns:a14="http://schemas.microsoft.com/office/drawing/2010/main">
                     <a:effectLst>
                       <a:outerShdw dist="35921" dir="2700000" algn="ctr" rotWithShape="0">
                         <a:schemeClr val="bg2"/>
@@ -4665,12 +4665,12 @@
             <a:effectLst/>
             <a:extLst>
               <a:ext uri="{909E8E84-426E-40dd-AFC4-6F175D3DCCD1}">
-                <a14:hiddenFill xmlns:a14="http://schemas.microsoft.com/office/drawing/2010/main" xmlns="">
+                <a14:hiddenFill xmlns="" xmlns:a14="http://schemas.microsoft.com/office/drawing/2010/main">
                   <a:noFill/>
                 </a14:hiddenFill>
               </a:ext>
               <a:ext uri="{AF507438-7753-43e0-B8FC-AC1667EBCBE1}">
-                <a14:hiddenEffects xmlns:a14="http://schemas.microsoft.com/office/drawing/2010/main" xmlns="">
+                <a14:hiddenEffects xmlns="" xmlns:a14="http://schemas.microsoft.com/office/drawing/2010/main">
                   <a:effectLst>
                     <a:outerShdw dist="35921" dir="2700000" algn="ctr" rotWithShape="0">
                       <a:schemeClr val="bg2"/>
@@ -4716,12 +4716,12 @@
             <a:effectLst/>
             <a:extLst>
               <a:ext uri="{909E8E84-426E-40dd-AFC4-6F175D3DCCD1}">
-                <a14:hiddenFill xmlns:a14="http://schemas.microsoft.com/office/drawing/2010/main" xmlns="">
+                <a14:hiddenFill xmlns="" xmlns:a14="http://schemas.microsoft.com/office/drawing/2010/main">
                   <a:noFill/>
                 </a14:hiddenFill>
               </a:ext>
               <a:ext uri="{AF507438-7753-43e0-B8FC-AC1667EBCBE1}">
-                <a14:hiddenEffects xmlns:a14="http://schemas.microsoft.com/office/drawing/2010/main" xmlns="">
+                <a14:hiddenEffects xmlns="" xmlns:a14="http://schemas.microsoft.com/office/drawing/2010/main">
                   <a:effectLst>
                     <a:outerShdw dist="35921" dir="2700000" algn="ctr" rotWithShape="0">
                       <a:schemeClr val="bg2"/>
@@ -4833,14 +4833,14 @@
               <a:effectLst/>
               <a:extLst>
                 <a:ext uri="{909E8E84-426E-40dd-AFC4-6F175D3DCCD1}">
-                  <a14:hiddenFill xmlns:a14="http://schemas.microsoft.com/office/drawing/2010/main" xmlns="">
+                  <a14:hiddenFill xmlns="" xmlns:a14="http://schemas.microsoft.com/office/drawing/2010/main">
                     <a:solidFill>
                       <a:srgbClr val="FFFF00"/>
                     </a:solidFill>
                   </a14:hiddenFill>
                 </a:ext>
                 <a:ext uri="{AF507438-7753-43e0-B8FC-AC1667EBCBE1}">
-                  <a14:hiddenEffects xmlns:a14="http://schemas.microsoft.com/office/drawing/2010/main" xmlns="">
+                  <a14:hiddenEffects xmlns="" xmlns:a14="http://schemas.microsoft.com/office/drawing/2010/main">
                     <a:effectLst>
                       <a:outerShdw dist="35921" dir="2700000" algn="ctr" rotWithShape="0">
                         <a:schemeClr val="bg2"/>
@@ -4936,14 +4936,14 @@
               <a:effectLst/>
               <a:extLst>
                 <a:ext uri="{909E8E84-426E-40dd-AFC4-6F175D3DCCD1}">
-                  <a14:hiddenFill xmlns:a14="http://schemas.microsoft.com/office/drawing/2010/main" xmlns="">
+                  <a14:hiddenFill xmlns="" xmlns:a14="http://schemas.microsoft.com/office/drawing/2010/main">
                     <a:solidFill>
                       <a:srgbClr val="FFFF00"/>
                     </a:solidFill>
                   </a14:hiddenFill>
                 </a:ext>
                 <a:ext uri="{AF507438-7753-43e0-B8FC-AC1667EBCBE1}">
-                  <a14:hiddenEffects xmlns:a14="http://schemas.microsoft.com/office/drawing/2010/main" xmlns="">
+                  <a14:hiddenEffects xmlns="" xmlns:a14="http://schemas.microsoft.com/office/drawing/2010/main">
                     <a:effectLst>
                       <a:outerShdw dist="35921" dir="2700000" algn="ctr" rotWithShape="0">
                         <a:schemeClr val="bg2"/>
@@ -4990,12 +4990,12 @@
             <a:effectLst/>
             <a:extLst>
               <a:ext uri="{909E8E84-426E-40dd-AFC4-6F175D3DCCD1}">
-                <a14:hiddenFill xmlns:a14="http://schemas.microsoft.com/office/drawing/2010/main" xmlns="">
+                <a14:hiddenFill xmlns="" xmlns:a14="http://schemas.microsoft.com/office/drawing/2010/main">
                   <a:noFill/>
                 </a14:hiddenFill>
               </a:ext>
               <a:ext uri="{AF507438-7753-43e0-B8FC-AC1667EBCBE1}">
-                <a14:hiddenEffects xmlns:a14="http://schemas.microsoft.com/office/drawing/2010/main" xmlns="">
+                <a14:hiddenEffects xmlns="" xmlns:a14="http://schemas.microsoft.com/office/drawing/2010/main">
                   <a:effectLst>
                     <a:outerShdw dist="35921" dir="2700000" algn="ctr" rotWithShape="0">
                       <a:schemeClr val="bg2"/>
@@ -5041,12 +5041,12 @@
             <a:effectLst/>
             <a:extLst>
               <a:ext uri="{909E8E84-426E-40dd-AFC4-6F175D3DCCD1}">
-                <a14:hiddenFill xmlns:a14="http://schemas.microsoft.com/office/drawing/2010/main" xmlns="">
+                <a14:hiddenFill xmlns="" xmlns:a14="http://schemas.microsoft.com/office/drawing/2010/main">
                   <a:noFill/>
                 </a14:hiddenFill>
               </a:ext>
               <a:ext uri="{AF507438-7753-43e0-B8FC-AC1667EBCBE1}">
-                <a14:hiddenEffects xmlns:a14="http://schemas.microsoft.com/office/drawing/2010/main" xmlns="">
+                <a14:hiddenEffects xmlns="" xmlns:a14="http://schemas.microsoft.com/office/drawing/2010/main">
                   <a:effectLst>
                     <a:outerShdw dist="35921" dir="2700000" algn="ctr" rotWithShape="0">
                       <a:schemeClr val="bg2"/>
@@ -5092,12 +5092,12 @@
             <a:effectLst/>
             <a:extLst>
               <a:ext uri="{909E8E84-426E-40dd-AFC4-6F175D3DCCD1}">
-                <a14:hiddenFill xmlns:a14="http://schemas.microsoft.com/office/drawing/2010/main" xmlns="">
+                <a14:hiddenFill xmlns="" xmlns:a14="http://schemas.microsoft.com/office/drawing/2010/main">
                   <a:noFill/>
                 </a14:hiddenFill>
               </a:ext>
               <a:ext uri="{AF507438-7753-43e0-B8FC-AC1667EBCBE1}">
-                <a14:hiddenEffects xmlns:a14="http://schemas.microsoft.com/office/drawing/2010/main" xmlns="">
+                <a14:hiddenEffects xmlns="" xmlns:a14="http://schemas.microsoft.com/office/drawing/2010/main">
                   <a:effectLst>
                     <a:outerShdw dist="35921" dir="2700000" algn="ctr" rotWithShape="0">
                       <a:schemeClr val="bg2"/>
@@ -5143,12 +5143,12 @@
             <a:effectLst/>
             <a:extLst>
               <a:ext uri="{909E8E84-426E-40dd-AFC4-6F175D3DCCD1}">
-                <a14:hiddenFill xmlns:a14="http://schemas.microsoft.com/office/drawing/2010/main" xmlns="">
+                <a14:hiddenFill xmlns="" xmlns:a14="http://schemas.microsoft.com/office/drawing/2010/main">
                   <a:noFill/>
                 </a14:hiddenFill>
               </a:ext>
               <a:ext uri="{AF507438-7753-43e0-B8FC-AC1667EBCBE1}">
-                <a14:hiddenEffects xmlns:a14="http://schemas.microsoft.com/office/drawing/2010/main" xmlns="">
+                <a14:hiddenEffects xmlns="" xmlns:a14="http://schemas.microsoft.com/office/drawing/2010/main">
                   <a:effectLst>
                     <a:outerShdw dist="35921" dir="2700000" algn="ctr" rotWithShape="0">
                       <a:schemeClr val="bg2"/>
@@ -5194,12 +5194,12 @@
             <a:effectLst/>
             <a:extLst>
               <a:ext uri="{909E8E84-426E-40dd-AFC4-6F175D3DCCD1}">
-                <a14:hiddenFill xmlns:a14="http://schemas.microsoft.com/office/drawing/2010/main" xmlns="">
+                <a14:hiddenFill xmlns="" xmlns:a14="http://schemas.microsoft.com/office/drawing/2010/main">
                   <a:noFill/>
                 </a14:hiddenFill>
               </a:ext>
               <a:ext uri="{AF507438-7753-43e0-B8FC-AC1667EBCBE1}">
-                <a14:hiddenEffects xmlns:a14="http://schemas.microsoft.com/office/drawing/2010/main" xmlns="">
+                <a14:hiddenEffects xmlns="" xmlns:a14="http://schemas.microsoft.com/office/drawing/2010/main">
                   <a:effectLst>
                     <a:outerShdw dist="35921" dir="2700000" algn="ctr" rotWithShape="0">
                       <a:schemeClr val="bg2"/>
@@ -5245,12 +5245,12 @@
             <a:effectLst/>
             <a:extLst>
               <a:ext uri="{909E8E84-426E-40dd-AFC4-6F175D3DCCD1}">
-                <a14:hiddenFill xmlns:a14="http://schemas.microsoft.com/office/drawing/2010/main" xmlns="">
+                <a14:hiddenFill xmlns="" xmlns:a14="http://schemas.microsoft.com/office/drawing/2010/main">
                   <a:noFill/>
                 </a14:hiddenFill>
               </a:ext>
               <a:ext uri="{AF507438-7753-43e0-B8FC-AC1667EBCBE1}">
-                <a14:hiddenEffects xmlns:a14="http://schemas.microsoft.com/office/drawing/2010/main" xmlns="">
+                <a14:hiddenEffects xmlns="" xmlns:a14="http://schemas.microsoft.com/office/drawing/2010/main">
                   <a:effectLst>
                     <a:outerShdw dist="35921" dir="2700000" algn="ctr" rotWithShape="0">
                       <a:schemeClr val="bg2"/>
@@ -5362,14 +5362,14 @@
               <a:effectLst/>
               <a:extLst>
                 <a:ext uri="{909E8E84-426E-40dd-AFC4-6F175D3DCCD1}">
-                  <a14:hiddenFill xmlns:a14="http://schemas.microsoft.com/office/drawing/2010/main" xmlns="">
+                  <a14:hiddenFill xmlns="" xmlns:a14="http://schemas.microsoft.com/office/drawing/2010/main">
                     <a:solidFill>
                       <a:srgbClr val="FFFF00"/>
                     </a:solidFill>
                   </a14:hiddenFill>
                 </a:ext>
                 <a:ext uri="{AF507438-7753-43e0-B8FC-AC1667EBCBE1}">
-                  <a14:hiddenEffects xmlns:a14="http://schemas.microsoft.com/office/drawing/2010/main" xmlns="">
+                  <a14:hiddenEffects xmlns="" xmlns:a14="http://schemas.microsoft.com/office/drawing/2010/main">
                     <a:effectLst>
                       <a:outerShdw dist="35921" dir="2700000" algn="ctr" rotWithShape="0">
                         <a:schemeClr val="bg2"/>
@@ -5465,14 +5465,14 @@
               <a:effectLst/>
               <a:extLst>
                 <a:ext uri="{909E8E84-426E-40dd-AFC4-6F175D3DCCD1}">
-                  <a14:hiddenFill xmlns:a14="http://schemas.microsoft.com/office/drawing/2010/main" xmlns="">
+                  <a14:hiddenFill xmlns="" xmlns:a14="http://schemas.microsoft.com/office/drawing/2010/main">
                     <a:solidFill>
                       <a:srgbClr val="FFFF00"/>
                     </a:solidFill>
                   </a14:hiddenFill>
                 </a:ext>
                 <a:ext uri="{AF507438-7753-43e0-B8FC-AC1667EBCBE1}">
-                  <a14:hiddenEffects xmlns:a14="http://schemas.microsoft.com/office/drawing/2010/main" xmlns="">
+                  <a14:hiddenEffects xmlns="" xmlns:a14="http://schemas.microsoft.com/office/drawing/2010/main">
                     <a:effectLst>
                       <a:outerShdw dist="35921" dir="2700000" algn="ctr" rotWithShape="0">
                         <a:schemeClr val="bg2"/>
@@ -5519,12 +5519,12 @@
             <a:effectLst/>
             <a:extLst>
               <a:ext uri="{909E8E84-426E-40dd-AFC4-6F175D3DCCD1}">
-                <a14:hiddenFill xmlns:a14="http://schemas.microsoft.com/office/drawing/2010/main" xmlns="">
+                <a14:hiddenFill xmlns="" xmlns:a14="http://schemas.microsoft.com/office/drawing/2010/main">
                   <a:noFill/>
                 </a14:hiddenFill>
               </a:ext>
               <a:ext uri="{AF507438-7753-43e0-B8FC-AC1667EBCBE1}">
-                <a14:hiddenEffects xmlns:a14="http://schemas.microsoft.com/office/drawing/2010/main" xmlns="">
+                <a14:hiddenEffects xmlns="" xmlns:a14="http://schemas.microsoft.com/office/drawing/2010/main">
                   <a:effectLst>
                     <a:outerShdw dist="35921" dir="2700000" algn="ctr" rotWithShape="0">
                       <a:schemeClr val="bg2"/>
@@ -5636,14 +5636,14 @@
               <a:effectLst/>
               <a:extLst>
                 <a:ext uri="{909E8E84-426E-40dd-AFC4-6F175D3DCCD1}">
-                  <a14:hiddenFill xmlns:a14="http://schemas.microsoft.com/office/drawing/2010/main" xmlns="">
+                  <a14:hiddenFill xmlns="" xmlns:a14="http://schemas.microsoft.com/office/drawing/2010/main">
                     <a:solidFill>
                       <a:srgbClr val="FFFF00"/>
                     </a:solidFill>
                   </a14:hiddenFill>
                 </a:ext>
                 <a:ext uri="{AF507438-7753-43e0-B8FC-AC1667EBCBE1}">
-                  <a14:hiddenEffects xmlns:a14="http://schemas.microsoft.com/office/drawing/2010/main" xmlns="">
+                  <a14:hiddenEffects xmlns="" xmlns:a14="http://schemas.microsoft.com/office/drawing/2010/main">
                     <a:effectLst>
                       <a:outerShdw dist="35921" dir="2700000" algn="ctr" rotWithShape="0">
                         <a:schemeClr val="bg2"/>
@@ -5739,14 +5739,14 @@
               <a:effectLst/>
               <a:extLst>
                 <a:ext uri="{909E8E84-426E-40dd-AFC4-6F175D3DCCD1}">
-                  <a14:hiddenFill xmlns:a14="http://schemas.microsoft.com/office/drawing/2010/main" xmlns="">
+                  <a14:hiddenFill xmlns="" xmlns:a14="http://schemas.microsoft.com/office/drawing/2010/main">
                     <a:solidFill>
                       <a:srgbClr val="FFFF00"/>
                     </a:solidFill>
                   </a14:hiddenFill>
                 </a:ext>
                 <a:ext uri="{AF507438-7753-43e0-B8FC-AC1667EBCBE1}">
-                  <a14:hiddenEffects xmlns:a14="http://schemas.microsoft.com/office/drawing/2010/main" xmlns="">
+                  <a14:hiddenEffects xmlns="" xmlns:a14="http://schemas.microsoft.com/office/drawing/2010/main">
                     <a:effectLst>
                       <a:outerShdw dist="35921" dir="2700000" algn="ctr" rotWithShape="0">
                         <a:schemeClr val="bg2"/>
@@ -6009,12 +6009,12 @@
             <a:effectLst/>
             <a:extLst>
               <a:ext uri="{909E8E84-426E-40dd-AFC4-6F175D3DCCD1}">
-                <a14:hiddenFill xmlns:a14="http://schemas.microsoft.com/office/drawing/2010/main" xmlns="">
+                <a14:hiddenFill xmlns="" xmlns:a14="http://schemas.microsoft.com/office/drawing/2010/main">
                   <a:noFill/>
                 </a14:hiddenFill>
               </a:ext>
               <a:ext uri="{AF507438-7753-43e0-B8FC-AC1667EBCBE1}">
-                <a14:hiddenEffects xmlns:a14="http://schemas.microsoft.com/office/drawing/2010/main" xmlns="">
+                <a14:hiddenEffects xmlns="" xmlns:a14="http://schemas.microsoft.com/office/drawing/2010/main">
                   <a:effectLst>
                     <a:outerShdw dist="35921" dir="2700000" algn="ctr" rotWithShape="0">
                       <a:schemeClr val="bg2"/>
@@ -6060,12 +6060,12 @@
             <a:effectLst/>
             <a:extLst>
               <a:ext uri="{909E8E84-426E-40dd-AFC4-6F175D3DCCD1}">
-                <a14:hiddenFill xmlns:a14="http://schemas.microsoft.com/office/drawing/2010/main" xmlns="">
+                <a14:hiddenFill xmlns="" xmlns:a14="http://schemas.microsoft.com/office/drawing/2010/main">
                   <a:noFill/>
                 </a14:hiddenFill>
               </a:ext>
               <a:ext uri="{AF507438-7753-43e0-B8FC-AC1667EBCBE1}">
-                <a14:hiddenEffects xmlns:a14="http://schemas.microsoft.com/office/drawing/2010/main" xmlns="">
+                <a14:hiddenEffects xmlns="" xmlns:a14="http://schemas.microsoft.com/office/drawing/2010/main">
                   <a:effectLst>
                     <a:outerShdw dist="35921" dir="2700000" algn="ctr" rotWithShape="0">
                       <a:schemeClr val="bg2"/>
@@ -6111,12 +6111,12 @@
             <a:effectLst/>
             <a:extLst>
               <a:ext uri="{909E8E84-426E-40dd-AFC4-6F175D3DCCD1}">
-                <a14:hiddenFill xmlns:a14="http://schemas.microsoft.com/office/drawing/2010/main" xmlns="">
+                <a14:hiddenFill xmlns="" xmlns:a14="http://schemas.microsoft.com/office/drawing/2010/main">
                   <a:noFill/>
                 </a14:hiddenFill>
               </a:ext>
               <a:ext uri="{AF507438-7753-43e0-B8FC-AC1667EBCBE1}">
-                <a14:hiddenEffects xmlns:a14="http://schemas.microsoft.com/office/drawing/2010/main" xmlns="">
+                <a14:hiddenEffects xmlns="" xmlns:a14="http://schemas.microsoft.com/office/drawing/2010/main">
                   <a:effectLst>
                     <a:outerShdw dist="35921" dir="2700000" algn="ctr" rotWithShape="0">
                       <a:schemeClr val="bg2"/>
@@ -6162,12 +6162,12 @@
             <a:effectLst/>
             <a:extLst>
               <a:ext uri="{909E8E84-426E-40dd-AFC4-6F175D3DCCD1}">
-                <a14:hiddenFill xmlns:a14="http://schemas.microsoft.com/office/drawing/2010/main" xmlns="">
+                <a14:hiddenFill xmlns="" xmlns:a14="http://schemas.microsoft.com/office/drawing/2010/main">
                   <a:noFill/>
                 </a14:hiddenFill>
               </a:ext>
               <a:ext uri="{AF507438-7753-43e0-B8FC-AC1667EBCBE1}">
-                <a14:hiddenEffects xmlns:a14="http://schemas.microsoft.com/office/drawing/2010/main" xmlns="">
+                <a14:hiddenEffects xmlns="" xmlns:a14="http://schemas.microsoft.com/office/drawing/2010/main">
                   <a:effectLst>
                     <a:outerShdw dist="35921" dir="2700000" algn="ctr" rotWithShape="0">
                       <a:schemeClr val="bg2"/>
@@ -6279,14 +6279,14 @@
               <a:effectLst/>
               <a:extLst>
                 <a:ext uri="{909E8E84-426E-40dd-AFC4-6F175D3DCCD1}">
-                  <a14:hiddenFill xmlns:a14="http://schemas.microsoft.com/office/drawing/2010/main" xmlns="">
+                  <a14:hiddenFill xmlns="" xmlns:a14="http://schemas.microsoft.com/office/drawing/2010/main">
                     <a:solidFill>
                       <a:srgbClr val="FFFF00"/>
                     </a:solidFill>
                   </a14:hiddenFill>
                 </a:ext>
                 <a:ext uri="{AF507438-7753-43e0-B8FC-AC1667EBCBE1}">
-                  <a14:hiddenEffects xmlns:a14="http://schemas.microsoft.com/office/drawing/2010/main" xmlns="">
+                  <a14:hiddenEffects xmlns="" xmlns:a14="http://schemas.microsoft.com/office/drawing/2010/main">
                     <a:effectLst>
                       <a:outerShdw dist="35921" dir="2700000" algn="ctr" rotWithShape="0">
                         <a:schemeClr val="bg2"/>
@@ -6382,14 +6382,14 @@
               <a:effectLst/>
               <a:extLst>
                 <a:ext uri="{909E8E84-426E-40dd-AFC4-6F175D3DCCD1}">
-                  <a14:hiddenFill xmlns:a14="http://schemas.microsoft.com/office/drawing/2010/main" xmlns="">
+                  <a14:hiddenFill xmlns="" xmlns:a14="http://schemas.microsoft.com/office/drawing/2010/main">
                     <a:solidFill>
                       <a:srgbClr val="FFFF00"/>
                     </a:solidFill>
                   </a14:hiddenFill>
                 </a:ext>
                 <a:ext uri="{AF507438-7753-43e0-B8FC-AC1667EBCBE1}">
-                  <a14:hiddenEffects xmlns:a14="http://schemas.microsoft.com/office/drawing/2010/main" xmlns="">
+                  <a14:hiddenEffects xmlns="" xmlns:a14="http://schemas.microsoft.com/office/drawing/2010/main">
                     <a:effectLst>
                       <a:outerShdw dist="35921" dir="2700000" algn="ctr" rotWithShape="0">
                         <a:schemeClr val="bg2"/>
@@ -6436,12 +6436,12 @@
             <a:effectLst/>
             <a:extLst>
               <a:ext uri="{909E8E84-426E-40dd-AFC4-6F175D3DCCD1}">
-                <a14:hiddenFill xmlns:a14="http://schemas.microsoft.com/office/drawing/2010/main" xmlns="">
+                <a14:hiddenFill xmlns="" xmlns:a14="http://schemas.microsoft.com/office/drawing/2010/main">
                   <a:noFill/>
                 </a14:hiddenFill>
               </a:ext>
               <a:ext uri="{AF507438-7753-43e0-B8FC-AC1667EBCBE1}">
-                <a14:hiddenEffects xmlns:a14="http://schemas.microsoft.com/office/drawing/2010/main" xmlns="">
+                <a14:hiddenEffects xmlns="" xmlns:a14="http://schemas.microsoft.com/office/drawing/2010/main">
                   <a:effectLst>
                     <a:outerShdw dist="35921" dir="2700000" algn="ctr" rotWithShape="0">
                       <a:schemeClr val="bg2"/>
@@ -6487,12 +6487,12 @@
             <a:effectLst/>
             <a:extLst>
               <a:ext uri="{909E8E84-426E-40dd-AFC4-6F175D3DCCD1}">
-                <a14:hiddenFill xmlns:a14="http://schemas.microsoft.com/office/drawing/2010/main" xmlns="">
+                <a14:hiddenFill xmlns="" xmlns:a14="http://schemas.microsoft.com/office/drawing/2010/main">
                   <a:noFill/>
                 </a14:hiddenFill>
               </a:ext>
               <a:ext uri="{AF507438-7753-43e0-B8FC-AC1667EBCBE1}">
-                <a14:hiddenEffects xmlns:a14="http://schemas.microsoft.com/office/drawing/2010/main" xmlns="">
+                <a14:hiddenEffects xmlns="" xmlns:a14="http://schemas.microsoft.com/office/drawing/2010/main">
                   <a:effectLst>
                     <a:outerShdw dist="35921" dir="2700000" algn="ctr" rotWithShape="0">
                       <a:schemeClr val="bg2"/>
@@ -6538,12 +6538,12 @@
             <a:effectLst/>
             <a:extLst>
               <a:ext uri="{909E8E84-426E-40dd-AFC4-6F175D3DCCD1}">
-                <a14:hiddenFill xmlns:a14="http://schemas.microsoft.com/office/drawing/2010/main" xmlns="">
+                <a14:hiddenFill xmlns="" xmlns:a14="http://schemas.microsoft.com/office/drawing/2010/main">
                   <a:noFill/>
                 </a14:hiddenFill>
               </a:ext>
               <a:ext uri="{AF507438-7753-43e0-B8FC-AC1667EBCBE1}">
-                <a14:hiddenEffects xmlns:a14="http://schemas.microsoft.com/office/drawing/2010/main" xmlns="">
+                <a14:hiddenEffects xmlns="" xmlns:a14="http://schemas.microsoft.com/office/drawing/2010/main">
                   <a:effectLst>
                     <a:outerShdw dist="35921" dir="2700000" algn="ctr" rotWithShape="0">
                       <a:schemeClr val="bg2"/>
@@ -6589,12 +6589,12 @@
             <a:effectLst/>
             <a:extLst>
               <a:ext uri="{909E8E84-426E-40dd-AFC4-6F175D3DCCD1}">
-                <a14:hiddenFill xmlns:a14="http://schemas.microsoft.com/office/drawing/2010/main" xmlns="">
+                <a14:hiddenFill xmlns="" xmlns:a14="http://schemas.microsoft.com/office/drawing/2010/main">
                   <a:noFill/>
                 </a14:hiddenFill>
               </a:ext>
               <a:ext uri="{AF507438-7753-43e0-B8FC-AC1667EBCBE1}">
-                <a14:hiddenEffects xmlns:a14="http://schemas.microsoft.com/office/drawing/2010/main" xmlns="">
+                <a14:hiddenEffects xmlns="" xmlns:a14="http://schemas.microsoft.com/office/drawing/2010/main">
                   <a:effectLst>
                     <a:outerShdw dist="35921" dir="2700000" algn="ctr" rotWithShape="0">
                       <a:schemeClr val="bg2"/>
@@ -6640,12 +6640,12 @@
             <a:effectLst/>
             <a:extLst>
               <a:ext uri="{909E8E84-426E-40dd-AFC4-6F175D3DCCD1}">
-                <a14:hiddenFill xmlns:a14="http://schemas.microsoft.com/office/drawing/2010/main" xmlns="">
+                <a14:hiddenFill xmlns="" xmlns:a14="http://schemas.microsoft.com/office/drawing/2010/main">
                   <a:noFill/>
                 </a14:hiddenFill>
               </a:ext>
               <a:ext uri="{AF507438-7753-43e0-B8FC-AC1667EBCBE1}">
-                <a14:hiddenEffects xmlns:a14="http://schemas.microsoft.com/office/drawing/2010/main" xmlns="">
+                <a14:hiddenEffects xmlns="" xmlns:a14="http://schemas.microsoft.com/office/drawing/2010/main">
                   <a:effectLst>
                     <a:outerShdw dist="35921" dir="2700000" algn="ctr" rotWithShape="0">
                       <a:schemeClr val="bg2"/>
@@ -6691,12 +6691,12 @@
             <a:effectLst/>
             <a:extLst>
               <a:ext uri="{909E8E84-426E-40dd-AFC4-6F175D3DCCD1}">
-                <a14:hiddenFill xmlns:a14="http://schemas.microsoft.com/office/drawing/2010/main" xmlns="">
+                <a14:hiddenFill xmlns="" xmlns:a14="http://schemas.microsoft.com/office/drawing/2010/main">
                   <a:noFill/>
                 </a14:hiddenFill>
               </a:ext>
               <a:ext uri="{AF507438-7753-43e0-B8FC-AC1667EBCBE1}">
-                <a14:hiddenEffects xmlns:a14="http://schemas.microsoft.com/office/drawing/2010/main" xmlns="">
+                <a14:hiddenEffects xmlns="" xmlns:a14="http://schemas.microsoft.com/office/drawing/2010/main">
                   <a:effectLst>
                     <a:outerShdw dist="35921" dir="2700000" algn="ctr" rotWithShape="0">
                       <a:schemeClr val="bg2"/>
@@ -6742,12 +6742,12 @@
             <a:effectLst/>
             <a:extLst>
               <a:ext uri="{909E8E84-426E-40dd-AFC4-6F175D3DCCD1}">
-                <a14:hiddenFill xmlns:a14="http://schemas.microsoft.com/office/drawing/2010/main" xmlns="">
+                <a14:hiddenFill xmlns="" xmlns:a14="http://schemas.microsoft.com/office/drawing/2010/main">
                   <a:noFill/>
                 </a14:hiddenFill>
               </a:ext>
               <a:ext uri="{AF507438-7753-43e0-B8FC-AC1667EBCBE1}">
-                <a14:hiddenEffects xmlns:a14="http://schemas.microsoft.com/office/drawing/2010/main" xmlns="">
+                <a14:hiddenEffects xmlns="" xmlns:a14="http://schemas.microsoft.com/office/drawing/2010/main">
                   <a:effectLst>
                     <a:outerShdw dist="35921" dir="2700000" algn="ctr" rotWithShape="0">
                       <a:schemeClr val="bg2"/>
@@ -6793,12 +6793,12 @@
             <a:effectLst/>
             <a:extLst>
               <a:ext uri="{909E8E84-426E-40dd-AFC4-6F175D3DCCD1}">
-                <a14:hiddenFill xmlns:a14="http://schemas.microsoft.com/office/drawing/2010/main" xmlns="">
+                <a14:hiddenFill xmlns="" xmlns:a14="http://schemas.microsoft.com/office/drawing/2010/main">
                   <a:noFill/>
                 </a14:hiddenFill>
               </a:ext>
               <a:ext uri="{AF507438-7753-43e0-B8FC-AC1667EBCBE1}">
-                <a14:hiddenEffects xmlns:a14="http://schemas.microsoft.com/office/drawing/2010/main" xmlns="">
+                <a14:hiddenEffects xmlns="" xmlns:a14="http://schemas.microsoft.com/office/drawing/2010/main">
                   <a:effectLst>
                     <a:outerShdw dist="35921" dir="2700000" algn="ctr" rotWithShape="0">
                       <a:schemeClr val="bg2"/>
@@ -6844,12 +6844,12 @@
             <a:effectLst/>
             <a:extLst>
               <a:ext uri="{909E8E84-426E-40dd-AFC4-6F175D3DCCD1}">
-                <a14:hiddenFill xmlns:a14="http://schemas.microsoft.com/office/drawing/2010/main" xmlns="">
+                <a14:hiddenFill xmlns="" xmlns:a14="http://schemas.microsoft.com/office/drawing/2010/main">
                   <a:noFill/>
                 </a14:hiddenFill>
               </a:ext>
               <a:ext uri="{AF507438-7753-43e0-B8FC-AC1667EBCBE1}">
-                <a14:hiddenEffects xmlns:a14="http://schemas.microsoft.com/office/drawing/2010/main" xmlns="">
+                <a14:hiddenEffects xmlns="" xmlns:a14="http://schemas.microsoft.com/office/drawing/2010/main">
                   <a:effectLst>
                     <a:outerShdw dist="35921" dir="2700000" algn="ctr" rotWithShape="0">
                       <a:schemeClr val="bg2"/>
@@ -6895,12 +6895,12 @@
             <a:effectLst/>
             <a:extLst>
               <a:ext uri="{909E8E84-426E-40dd-AFC4-6F175D3DCCD1}">
-                <a14:hiddenFill xmlns:a14="http://schemas.microsoft.com/office/drawing/2010/main" xmlns="">
+                <a14:hiddenFill xmlns="" xmlns:a14="http://schemas.microsoft.com/office/drawing/2010/main">
                   <a:noFill/>
                 </a14:hiddenFill>
               </a:ext>
               <a:ext uri="{AF507438-7753-43e0-B8FC-AC1667EBCBE1}">
-                <a14:hiddenEffects xmlns:a14="http://schemas.microsoft.com/office/drawing/2010/main" xmlns="">
+                <a14:hiddenEffects xmlns="" xmlns:a14="http://schemas.microsoft.com/office/drawing/2010/main">
                   <a:effectLst>
                     <a:outerShdw dist="35921" dir="2700000" algn="ctr" rotWithShape="0">
                       <a:schemeClr val="bg2"/>
@@ -6946,12 +6946,12 @@
             <a:effectLst/>
             <a:extLst>
               <a:ext uri="{909E8E84-426E-40dd-AFC4-6F175D3DCCD1}">
-                <a14:hiddenFill xmlns:a14="http://schemas.microsoft.com/office/drawing/2010/main" xmlns="">
+                <a14:hiddenFill xmlns="" xmlns:a14="http://schemas.microsoft.com/office/drawing/2010/main">
                   <a:noFill/>
                 </a14:hiddenFill>
               </a:ext>
               <a:ext uri="{AF507438-7753-43e0-B8FC-AC1667EBCBE1}">
-                <a14:hiddenEffects xmlns:a14="http://schemas.microsoft.com/office/drawing/2010/main" xmlns="">
+                <a14:hiddenEffects xmlns="" xmlns:a14="http://schemas.microsoft.com/office/drawing/2010/main">
                   <a:effectLst>
                     <a:outerShdw dist="35921" dir="2700000" algn="ctr" rotWithShape="0">
                       <a:schemeClr val="bg2"/>
@@ -6997,12 +6997,12 @@
             <a:effectLst/>
             <a:extLst>
               <a:ext uri="{909E8E84-426E-40dd-AFC4-6F175D3DCCD1}">
-                <a14:hiddenFill xmlns:a14="http://schemas.microsoft.com/office/drawing/2010/main" xmlns="">
+                <a14:hiddenFill xmlns="" xmlns:a14="http://schemas.microsoft.com/office/drawing/2010/main">
                   <a:noFill/>
                 </a14:hiddenFill>
               </a:ext>
               <a:ext uri="{AF507438-7753-43e0-B8FC-AC1667EBCBE1}">
-                <a14:hiddenEffects xmlns:a14="http://schemas.microsoft.com/office/drawing/2010/main" xmlns="">
+                <a14:hiddenEffects xmlns="" xmlns:a14="http://schemas.microsoft.com/office/drawing/2010/main">
                   <a:effectLst>
                     <a:outerShdw dist="35921" dir="2700000" algn="ctr" rotWithShape="0">
                       <a:schemeClr val="bg2"/>
@@ -7114,14 +7114,14 @@
               <a:effectLst/>
               <a:extLst>
                 <a:ext uri="{909E8E84-426E-40dd-AFC4-6F175D3DCCD1}">
-                  <a14:hiddenFill xmlns:a14="http://schemas.microsoft.com/office/drawing/2010/main" xmlns="">
+                  <a14:hiddenFill xmlns="" xmlns:a14="http://schemas.microsoft.com/office/drawing/2010/main">
                     <a:solidFill>
                       <a:srgbClr val="FFFF00"/>
                     </a:solidFill>
                   </a14:hiddenFill>
                 </a:ext>
                 <a:ext uri="{AF507438-7753-43e0-B8FC-AC1667EBCBE1}">
-                  <a14:hiddenEffects xmlns:a14="http://schemas.microsoft.com/office/drawing/2010/main" xmlns="">
+                  <a14:hiddenEffects xmlns="" xmlns:a14="http://schemas.microsoft.com/office/drawing/2010/main">
                     <a:effectLst>
                       <a:outerShdw dist="35921" dir="2700000" algn="ctr" rotWithShape="0">
                         <a:schemeClr val="bg2"/>
@@ -7217,14 +7217,14 @@
               <a:effectLst/>
               <a:extLst>
                 <a:ext uri="{909E8E84-426E-40dd-AFC4-6F175D3DCCD1}">
-                  <a14:hiddenFill xmlns:a14="http://schemas.microsoft.com/office/drawing/2010/main" xmlns="">
+                  <a14:hiddenFill xmlns="" xmlns:a14="http://schemas.microsoft.com/office/drawing/2010/main">
                     <a:solidFill>
                       <a:srgbClr val="FFFF00"/>
                     </a:solidFill>
                   </a14:hiddenFill>
                 </a:ext>
                 <a:ext uri="{AF507438-7753-43e0-B8FC-AC1667EBCBE1}">
-                  <a14:hiddenEffects xmlns:a14="http://schemas.microsoft.com/office/drawing/2010/main" xmlns="">
+                  <a14:hiddenEffects xmlns="" xmlns:a14="http://schemas.microsoft.com/office/drawing/2010/main">
                     <a:effectLst>
                       <a:outerShdw dist="35921" dir="2700000" algn="ctr" rotWithShape="0">
                         <a:schemeClr val="bg2"/>
@@ -7271,12 +7271,12 @@
             <a:effectLst/>
             <a:extLst>
               <a:ext uri="{909E8E84-426E-40dd-AFC4-6F175D3DCCD1}">
-                <a14:hiddenFill xmlns:a14="http://schemas.microsoft.com/office/drawing/2010/main" xmlns="">
+                <a14:hiddenFill xmlns="" xmlns:a14="http://schemas.microsoft.com/office/drawing/2010/main">
                   <a:noFill/>
                 </a14:hiddenFill>
               </a:ext>
               <a:ext uri="{AF507438-7753-43e0-B8FC-AC1667EBCBE1}">
-                <a14:hiddenEffects xmlns:a14="http://schemas.microsoft.com/office/drawing/2010/main" xmlns="">
+                <a14:hiddenEffects xmlns="" xmlns:a14="http://schemas.microsoft.com/office/drawing/2010/main">
                   <a:effectLst>
                     <a:outerShdw dist="35921" dir="2700000" algn="ctr" rotWithShape="0">
                       <a:schemeClr val="bg2"/>
@@ -7322,12 +7322,12 @@
             <a:effectLst/>
             <a:extLst>
               <a:ext uri="{909E8E84-426E-40dd-AFC4-6F175D3DCCD1}">
-                <a14:hiddenFill xmlns:a14="http://schemas.microsoft.com/office/drawing/2010/main" xmlns="">
+                <a14:hiddenFill xmlns="" xmlns:a14="http://schemas.microsoft.com/office/drawing/2010/main">
                   <a:noFill/>
                 </a14:hiddenFill>
               </a:ext>
               <a:ext uri="{AF507438-7753-43e0-B8FC-AC1667EBCBE1}">
-                <a14:hiddenEffects xmlns:a14="http://schemas.microsoft.com/office/drawing/2010/main" xmlns="">
+                <a14:hiddenEffects xmlns="" xmlns:a14="http://schemas.microsoft.com/office/drawing/2010/main">
                   <a:effectLst>
                     <a:outerShdw dist="35921" dir="2700000" algn="ctr" rotWithShape="0">
                       <a:schemeClr val="bg2"/>
@@ -7373,12 +7373,12 @@
             <a:effectLst/>
             <a:extLst>
               <a:ext uri="{909E8E84-426E-40dd-AFC4-6F175D3DCCD1}">
-                <a14:hiddenFill xmlns:a14="http://schemas.microsoft.com/office/drawing/2010/main" xmlns="">
+                <a14:hiddenFill xmlns="" xmlns:a14="http://schemas.microsoft.com/office/drawing/2010/main">
                   <a:noFill/>
                 </a14:hiddenFill>
               </a:ext>
               <a:ext uri="{AF507438-7753-43e0-B8FC-AC1667EBCBE1}">
-                <a14:hiddenEffects xmlns:a14="http://schemas.microsoft.com/office/drawing/2010/main" xmlns="">
+                <a14:hiddenEffects xmlns="" xmlns:a14="http://schemas.microsoft.com/office/drawing/2010/main">
                   <a:effectLst>
                     <a:outerShdw dist="35921" dir="2700000" algn="ctr" rotWithShape="0">
                       <a:schemeClr val="bg2"/>
@@ -7424,12 +7424,12 @@
             <a:effectLst/>
             <a:extLst>
               <a:ext uri="{909E8E84-426E-40dd-AFC4-6F175D3DCCD1}">
-                <a14:hiddenFill xmlns:a14="http://schemas.microsoft.com/office/drawing/2010/main" xmlns="">
+                <a14:hiddenFill xmlns="" xmlns:a14="http://schemas.microsoft.com/office/drawing/2010/main">
                   <a:noFill/>
                 </a14:hiddenFill>
               </a:ext>
               <a:ext uri="{AF507438-7753-43e0-B8FC-AC1667EBCBE1}">
-                <a14:hiddenEffects xmlns:a14="http://schemas.microsoft.com/office/drawing/2010/main" xmlns="">
+                <a14:hiddenEffects xmlns="" xmlns:a14="http://schemas.microsoft.com/office/drawing/2010/main">
                   <a:effectLst>
                     <a:outerShdw dist="35921" dir="2700000" algn="ctr" rotWithShape="0">
                       <a:schemeClr val="bg2"/>
@@ -7475,12 +7475,12 @@
             <a:effectLst/>
             <a:extLst>
               <a:ext uri="{909E8E84-426E-40dd-AFC4-6F175D3DCCD1}">
-                <a14:hiddenFill xmlns:a14="http://schemas.microsoft.com/office/drawing/2010/main" xmlns="">
+                <a14:hiddenFill xmlns="" xmlns:a14="http://schemas.microsoft.com/office/drawing/2010/main">
                   <a:noFill/>
                 </a14:hiddenFill>
               </a:ext>
               <a:ext uri="{AF507438-7753-43e0-B8FC-AC1667EBCBE1}">
-                <a14:hiddenEffects xmlns:a14="http://schemas.microsoft.com/office/drawing/2010/main" xmlns="">
+                <a14:hiddenEffects xmlns="" xmlns:a14="http://schemas.microsoft.com/office/drawing/2010/main">
                   <a:effectLst>
                     <a:outerShdw dist="35921" dir="2700000" algn="ctr" rotWithShape="0">
                       <a:schemeClr val="bg2"/>
@@ -7526,12 +7526,12 @@
             <a:effectLst/>
             <a:extLst>
               <a:ext uri="{909E8E84-426E-40dd-AFC4-6F175D3DCCD1}">
-                <a14:hiddenFill xmlns:a14="http://schemas.microsoft.com/office/drawing/2010/main" xmlns="">
+                <a14:hiddenFill xmlns="" xmlns:a14="http://schemas.microsoft.com/office/drawing/2010/main">
                   <a:noFill/>
                 </a14:hiddenFill>
               </a:ext>
               <a:ext uri="{AF507438-7753-43e0-B8FC-AC1667EBCBE1}">
-                <a14:hiddenEffects xmlns:a14="http://schemas.microsoft.com/office/drawing/2010/main" xmlns="">
+                <a14:hiddenEffects xmlns="" xmlns:a14="http://schemas.microsoft.com/office/drawing/2010/main">
                   <a:effectLst>
                     <a:outerShdw dist="35921" dir="2700000" algn="ctr" rotWithShape="0">
                       <a:schemeClr val="bg2"/>
@@ -7577,12 +7577,12 @@
             <a:effectLst/>
             <a:extLst>
               <a:ext uri="{909E8E84-426E-40dd-AFC4-6F175D3DCCD1}">
-                <a14:hiddenFill xmlns:a14="http://schemas.microsoft.com/office/drawing/2010/main" xmlns="">
+                <a14:hiddenFill xmlns="" xmlns:a14="http://schemas.microsoft.com/office/drawing/2010/main">
                   <a:noFill/>
                 </a14:hiddenFill>
               </a:ext>
               <a:ext uri="{AF507438-7753-43e0-B8FC-AC1667EBCBE1}">
-                <a14:hiddenEffects xmlns:a14="http://schemas.microsoft.com/office/drawing/2010/main" xmlns="">
+                <a14:hiddenEffects xmlns="" xmlns:a14="http://schemas.microsoft.com/office/drawing/2010/main">
                   <a:effectLst>
                     <a:outerShdw dist="35921" dir="2700000" algn="ctr" rotWithShape="0">
                       <a:schemeClr val="bg2"/>
@@ -7628,12 +7628,12 @@
             <a:effectLst/>
             <a:extLst>
               <a:ext uri="{909E8E84-426E-40dd-AFC4-6F175D3DCCD1}">
-                <a14:hiddenFill xmlns:a14="http://schemas.microsoft.com/office/drawing/2010/main" xmlns="">
+                <a14:hiddenFill xmlns="" xmlns:a14="http://schemas.microsoft.com/office/drawing/2010/main">
                   <a:noFill/>
                 </a14:hiddenFill>
               </a:ext>
               <a:ext uri="{AF507438-7753-43e0-B8FC-AC1667EBCBE1}">
-                <a14:hiddenEffects xmlns:a14="http://schemas.microsoft.com/office/drawing/2010/main" xmlns="">
+                <a14:hiddenEffects xmlns="" xmlns:a14="http://schemas.microsoft.com/office/drawing/2010/main">
                   <a:effectLst>
                     <a:outerShdw dist="35921" dir="2700000" algn="ctr" rotWithShape="0">
                       <a:schemeClr val="bg2"/>
@@ -7679,12 +7679,12 @@
             <a:effectLst/>
             <a:extLst>
               <a:ext uri="{909E8E84-426E-40dd-AFC4-6F175D3DCCD1}">
-                <a14:hiddenFill xmlns:a14="http://schemas.microsoft.com/office/drawing/2010/main" xmlns="">
+                <a14:hiddenFill xmlns="" xmlns:a14="http://schemas.microsoft.com/office/drawing/2010/main">
                   <a:noFill/>
                 </a14:hiddenFill>
               </a:ext>
               <a:ext uri="{AF507438-7753-43e0-B8FC-AC1667EBCBE1}">
-                <a14:hiddenEffects xmlns:a14="http://schemas.microsoft.com/office/drawing/2010/main" xmlns="">
+                <a14:hiddenEffects xmlns="" xmlns:a14="http://schemas.microsoft.com/office/drawing/2010/main">
                   <a:effectLst>
                     <a:outerShdw dist="35921" dir="2700000" algn="ctr" rotWithShape="0">
                       <a:schemeClr val="bg2"/>
@@ -7730,12 +7730,12 @@
             <a:effectLst/>
             <a:extLst>
               <a:ext uri="{909E8E84-426E-40dd-AFC4-6F175D3DCCD1}">
-                <a14:hiddenFill xmlns:a14="http://schemas.microsoft.com/office/drawing/2010/main" xmlns="">
+                <a14:hiddenFill xmlns="" xmlns:a14="http://schemas.microsoft.com/office/drawing/2010/main">
                   <a:noFill/>
                 </a14:hiddenFill>
               </a:ext>
               <a:ext uri="{AF507438-7753-43e0-B8FC-AC1667EBCBE1}">
-                <a14:hiddenEffects xmlns:a14="http://schemas.microsoft.com/office/drawing/2010/main" xmlns="">
+                <a14:hiddenEffects xmlns="" xmlns:a14="http://schemas.microsoft.com/office/drawing/2010/main">
                   <a:effectLst>
                     <a:outerShdw dist="35921" dir="2700000" algn="ctr" rotWithShape="0">
                       <a:schemeClr val="bg2"/>
@@ -7781,12 +7781,12 @@
             <a:effectLst/>
             <a:extLst>
               <a:ext uri="{909E8E84-426E-40dd-AFC4-6F175D3DCCD1}">
-                <a14:hiddenFill xmlns:a14="http://schemas.microsoft.com/office/drawing/2010/main" xmlns="">
+                <a14:hiddenFill xmlns="" xmlns:a14="http://schemas.microsoft.com/office/drawing/2010/main">
                   <a:noFill/>
                 </a14:hiddenFill>
               </a:ext>
               <a:ext uri="{AF507438-7753-43e0-B8FC-AC1667EBCBE1}">
-                <a14:hiddenEffects xmlns:a14="http://schemas.microsoft.com/office/drawing/2010/main" xmlns="">
+                <a14:hiddenEffects xmlns="" xmlns:a14="http://schemas.microsoft.com/office/drawing/2010/main">
                   <a:effectLst>
                     <a:outerShdw dist="35921" dir="2700000" algn="ctr" rotWithShape="0">
                       <a:schemeClr val="bg2"/>
@@ -7832,12 +7832,12 @@
             <a:effectLst/>
             <a:extLst>
               <a:ext uri="{909E8E84-426E-40dd-AFC4-6F175D3DCCD1}">
-                <a14:hiddenFill xmlns:a14="http://schemas.microsoft.com/office/drawing/2010/main" xmlns="">
+                <a14:hiddenFill xmlns="" xmlns:a14="http://schemas.microsoft.com/office/drawing/2010/main">
                   <a:noFill/>
                 </a14:hiddenFill>
               </a:ext>
               <a:ext uri="{AF507438-7753-43e0-B8FC-AC1667EBCBE1}">
-                <a14:hiddenEffects xmlns:a14="http://schemas.microsoft.com/office/drawing/2010/main" xmlns="">
+                <a14:hiddenEffects xmlns="" xmlns:a14="http://schemas.microsoft.com/office/drawing/2010/main">
                   <a:effectLst>
                     <a:outerShdw dist="35921" dir="2700000" algn="ctr" rotWithShape="0">
                       <a:schemeClr val="bg2"/>
@@ -7883,12 +7883,12 @@
             <a:effectLst/>
             <a:extLst>
               <a:ext uri="{909E8E84-426E-40dd-AFC4-6F175D3DCCD1}">
-                <a14:hiddenFill xmlns:a14="http://schemas.microsoft.com/office/drawing/2010/main" xmlns="">
+                <a14:hiddenFill xmlns="" xmlns:a14="http://schemas.microsoft.com/office/drawing/2010/main">
                   <a:noFill/>
                 </a14:hiddenFill>
               </a:ext>
               <a:ext uri="{AF507438-7753-43e0-B8FC-AC1667EBCBE1}">
-                <a14:hiddenEffects xmlns:a14="http://schemas.microsoft.com/office/drawing/2010/main" xmlns="">
+                <a14:hiddenEffects xmlns="" xmlns:a14="http://schemas.microsoft.com/office/drawing/2010/main">
                   <a:effectLst>
                     <a:outerShdw dist="35921" dir="2700000" algn="ctr" rotWithShape="0">
                       <a:schemeClr val="bg2"/>
@@ -7934,12 +7934,12 @@
             <a:effectLst/>
             <a:extLst>
               <a:ext uri="{909E8E84-426E-40dd-AFC4-6F175D3DCCD1}">
-                <a14:hiddenFill xmlns:a14="http://schemas.microsoft.com/office/drawing/2010/main" xmlns="">
+                <a14:hiddenFill xmlns="" xmlns:a14="http://schemas.microsoft.com/office/drawing/2010/main">
                   <a:noFill/>
                 </a14:hiddenFill>
               </a:ext>
               <a:ext uri="{AF507438-7753-43e0-B8FC-AC1667EBCBE1}">
-                <a14:hiddenEffects xmlns:a14="http://schemas.microsoft.com/office/drawing/2010/main" xmlns="">
+                <a14:hiddenEffects xmlns="" xmlns:a14="http://schemas.microsoft.com/office/drawing/2010/main">
                   <a:effectLst>
                     <a:outerShdw dist="35921" dir="2700000" algn="ctr" rotWithShape="0">
                       <a:schemeClr val="bg2"/>
@@ -8001,12 +8001,12 @@
               <a:effectLst/>
               <a:extLst>
                 <a:ext uri="{909E8E84-426E-40dd-AFC4-6F175D3DCCD1}">
-                  <a14:hiddenFill xmlns:a14="http://schemas.microsoft.com/office/drawing/2010/main" xmlns="">
+                  <a14:hiddenFill xmlns="" xmlns:a14="http://schemas.microsoft.com/office/drawing/2010/main">
                     <a:noFill/>
                   </a14:hiddenFill>
                 </a:ext>
                 <a:ext uri="{AF507438-7753-43e0-B8FC-AC1667EBCBE1}">
-                  <a14:hiddenEffects xmlns:a14="http://schemas.microsoft.com/office/drawing/2010/main" xmlns="">
+                  <a14:hiddenEffects xmlns="" xmlns:a14="http://schemas.microsoft.com/office/drawing/2010/main">
                     <a:effectLst>
                       <a:outerShdw dist="35921" dir="2700000" algn="ctr" rotWithShape="0">
                         <a:schemeClr val="bg2"/>
@@ -8052,12 +8052,12 @@
               <a:effectLst/>
               <a:extLst>
                 <a:ext uri="{909E8E84-426E-40dd-AFC4-6F175D3DCCD1}">
-                  <a14:hiddenFill xmlns:a14="http://schemas.microsoft.com/office/drawing/2010/main" xmlns="">
+                  <a14:hiddenFill xmlns="" xmlns:a14="http://schemas.microsoft.com/office/drawing/2010/main">
                     <a:noFill/>
                   </a14:hiddenFill>
                 </a:ext>
                 <a:ext uri="{AF507438-7753-43e0-B8FC-AC1667EBCBE1}">
-                  <a14:hiddenEffects xmlns:a14="http://schemas.microsoft.com/office/drawing/2010/main" xmlns="">
+                  <a14:hiddenEffects xmlns="" xmlns:a14="http://schemas.microsoft.com/office/drawing/2010/main">
                     <a:effectLst>
                       <a:outerShdw dist="35921" dir="2700000" algn="ctr" rotWithShape="0">
                         <a:schemeClr val="bg2"/>
@@ -8103,12 +8103,12 @@
               <a:effectLst/>
               <a:extLst>
                 <a:ext uri="{909E8E84-426E-40dd-AFC4-6F175D3DCCD1}">
-                  <a14:hiddenFill xmlns:a14="http://schemas.microsoft.com/office/drawing/2010/main" xmlns="">
+                  <a14:hiddenFill xmlns="" xmlns:a14="http://schemas.microsoft.com/office/drawing/2010/main">
                     <a:noFill/>
                   </a14:hiddenFill>
                 </a:ext>
                 <a:ext uri="{AF507438-7753-43e0-B8FC-AC1667EBCBE1}">
-                  <a14:hiddenEffects xmlns:a14="http://schemas.microsoft.com/office/drawing/2010/main" xmlns="">
+                  <a14:hiddenEffects xmlns="" xmlns:a14="http://schemas.microsoft.com/office/drawing/2010/main">
                     <a:effectLst>
                       <a:outerShdw dist="35921" dir="2700000" algn="ctr" rotWithShape="0">
                         <a:schemeClr val="bg2"/>
@@ -8154,12 +8154,12 @@
               <a:effectLst/>
               <a:extLst>
                 <a:ext uri="{909E8E84-426E-40dd-AFC4-6F175D3DCCD1}">
-                  <a14:hiddenFill xmlns:a14="http://schemas.microsoft.com/office/drawing/2010/main" xmlns="">
+                  <a14:hiddenFill xmlns="" xmlns:a14="http://schemas.microsoft.com/office/drawing/2010/main">
                     <a:noFill/>
                   </a14:hiddenFill>
                 </a:ext>
                 <a:ext uri="{AF507438-7753-43e0-B8FC-AC1667EBCBE1}">
-                  <a14:hiddenEffects xmlns:a14="http://schemas.microsoft.com/office/drawing/2010/main" xmlns="">
+                  <a14:hiddenEffects xmlns="" xmlns:a14="http://schemas.microsoft.com/office/drawing/2010/main">
                     <a:effectLst>
                       <a:outerShdw dist="35921" dir="2700000" algn="ctr" rotWithShape="0">
                         <a:schemeClr val="bg2"/>
@@ -8222,12 +8222,12 @@
               <a:effectLst/>
               <a:extLst>
                 <a:ext uri="{909E8E84-426E-40dd-AFC4-6F175D3DCCD1}">
-                  <a14:hiddenFill xmlns:a14="http://schemas.microsoft.com/office/drawing/2010/main" xmlns="">
+                  <a14:hiddenFill xmlns="" xmlns:a14="http://schemas.microsoft.com/office/drawing/2010/main">
                     <a:noFill/>
                   </a14:hiddenFill>
                 </a:ext>
                 <a:ext uri="{AF507438-7753-43e0-B8FC-AC1667EBCBE1}">
-                  <a14:hiddenEffects xmlns:a14="http://schemas.microsoft.com/office/drawing/2010/main" xmlns="">
+                  <a14:hiddenEffects xmlns="" xmlns:a14="http://schemas.microsoft.com/office/drawing/2010/main">
                     <a:effectLst>
                       <a:outerShdw dist="35921" dir="2700000" algn="ctr" rotWithShape="0">
                         <a:schemeClr val="bg2"/>
@@ -8273,12 +8273,12 @@
               <a:effectLst/>
               <a:extLst>
                 <a:ext uri="{909E8E84-426E-40dd-AFC4-6F175D3DCCD1}">
-                  <a14:hiddenFill xmlns:a14="http://schemas.microsoft.com/office/drawing/2010/main" xmlns="">
+                  <a14:hiddenFill xmlns="" xmlns:a14="http://schemas.microsoft.com/office/drawing/2010/main">
                     <a:noFill/>
                   </a14:hiddenFill>
                 </a:ext>
                 <a:ext uri="{AF507438-7753-43e0-B8FC-AC1667EBCBE1}">
-                  <a14:hiddenEffects xmlns:a14="http://schemas.microsoft.com/office/drawing/2010/main" xmlns="">
+                  <a14:hiddenEffects xmlns="" xmlns:a14="http://schemas.microsoft.com/office/drawing/2010/main">
                     <a:effectLst>
                       <a:outerShdw dist="35921" dir="2700000" algn="ctr" rotWithShape="0">
                         <a:schemeClr val="bg2"/>
@@ -8324,12 +8324,12 @@
               <a:effectLst/>
               <a:extLst>
                 <a:ext uri="{909E8E84-426E-40dd-AFC4-6F175D3DCCD1}">
-                  <a14:hiddenFill xmlns:a14="http://schemas.microsoft.com/office/drawing/2010/main" xmlns="">
+                  <a14:hiddenFill xmlns="" xmlns:a14="http://schemas.microsoft.com/office/drawing/2010/main">
                     <a:noFill/>
                   </a14:hiddenFill>
                 </a:ext>
                 <a:ext uri="{AF507438-7753-43e0-B8FC-AC1667EBCBE1}">
-                  <a14:hiddenEffects xmlns:a14="http://schemas.microsoft.com/office/drawing/2010/main" xmlns="">
+                  <a14:hiddenEffects xmlns="" xmlns:a14="http://schemas.microsoft.com/office/drawing/2010/main">
                     <a:effectLst>
                       <a:outerShdw dist="35921" dir="2700000" algn="ctr" rotWithShape="0">
                         <a:schemeClr val="bg2"/>
@@ -8375,12 +8375,12 @@
               <a:effectLst/>
               <a:extLst>
                 <a:ext uri="{909E8E84-426E-40dd-AFC4-6F175D3DCCD1}">
-                  <a14:hiddenFill xmlns:a14="http://schemas.microsoft.com/office/drawing/2010/main" xmlns="">
+                  <a14:hiddenFill xmlns="" xmlns:a14="http://schemas.microsoft.com/office/drawing/2010/main">
                     <a:noFill/>
                   </a14:hiddenFill>
                 </a:ext>
                 <a:ext uri="{AF507438-7753-43e0-B8FC-AC1667EBCBE1}">
-                  <a14:hiddenEffects xmlns:a14="http://schemas.microsoft.com/office/drawing/2010/main" xmlns="">
+                  <a14:hiddenEffects xmlns="" xmlns:a14="http://schemas.microsoft.com/office/drawing/2010/main">
                     <a:effectLst>
                       <a:outerShdw dist="35921" dir="2700000" algn="ctr" rotWithShape="0">
                         <a:schemeClr val="bg2"/>
@@ -8427,12 +8427,12 @@
             <a:effectLst/>
             <a:extLst>
               <a:ext uri="{909E8E84-426E-40dd-AFC4-6F175D3DCCD1}">
-                <a14:hiddenFill xmlns:a14="http://schemas.microsoft.com/office/drawing/2010/main" xmlns="">
+                <a14:hiddenFill xmlns="" xmlns:a14="http://schemas.microsoft.com/office/drawing/2010/main">
                   <a:noFill/>
                 </a14:hiddenFill>
               </a:ext>
               <a:ext uri="{AF507438-7753-43e0-B8FC-AC1667EBCBE1}">
-                <a14:hiddenEffects xmlns:a14="http://schemas.microsoft.com/office/drawing/2010/main" xmlns="">
+                <a14:hiddenEffects xmlns="" xmlns:a14="http://schemas.microsoft.com/office/drawing/2010/main">
                   <a:effectLst>
                     <a:outerShdw dist="35921" dir="2700000" algn="ctr" rotWithShape="0">
                       <a:schemeClr val="bg2"/>
@@ -8478,12 +8478,12 @@
             <a:effectLst/>
             <a:extLst>
               <a:ext uri="{909E8E84-426E-40dd-AFC4-6F175D3DCCD1}">
-                <a14:hiddenFill xmlns:a14="http://schemas.microsoft.com/office/drawing/2010/main" xmlns="">
+                <a14:hiddenFill xmlns="" xmlns:a14="http://schemas.microsoft.com/office/drawing/2010/main">
                   <a:noFill/>
                 </a14:hiddenFill>
               </a:ext>
               <a:ext uri="{AF507438-7753-43e0-B8FC-AC1667EBCBE1}">
-                <a14:hiddenEffects xmlns:a14="http://schemas.microsoft.com/office/drawing/2010/main" xmlns="">
+                <a14:hiddenEffects xmlns="" xmlns:a14="http://schemas.microsoft.com/office/drawing/2010/main">
                   <a:effectLst>
                     <a:outerShdw dist="35921" dir="2700000" algn="ctr" rotWithShape="0">
                       <a:schemeClr val="bg2"/>
@@ -8595,14 +8595,14 @@
               <a:effectLst/>
               <a:extLst>
                 <a:ext uri="{909E8E84-426E-40dd-AFC4-6F175D3DCCD1}">
-                  <a14:hiddenFill xmlns:a14="http://schemas.microsoft.com/office/drawing/2010/main" xmlns="">
+                  <a14:hiddenFill xmlns="" xmlns:a14="http://schemas.microsoft.com/office/drawing/2010/main">
                     <a:solidFill>
                       <a:srgbClr val="FFFF00"/>
                     </a:solidFill>
                   </a14:hiddenFill>
                 </a:ext>
                 <a:ext uri="{AF507438-7753-43e0-B8FC-AC1667EBCBE1}">
-                  <a14:hiddenEffects xmlns:a14="http://schemas.microsoft.com/office/drawing/2010/main" xmlns="">
+                  <a14:hiddenEffects xmlns="" xmlns:a14="http://schemas.microsoft.com/office/drawing/2010/main">
                     <a:effectLst>
                       <a:outerShdw dist="35921" dir="2700000" algn="ctr" rotWithShape="0">
                         <a:schemeClr val="bg2"/>
@@ -8698,14 +8698,14 @@
               <a:effectLst/>
               <a:extLst>
                 <a:ext uri="{909E8E84-426E-40dd-AFC4-6F175D3DCCD1}">
-                  <a14:hiddenFill xmlns:a14="http://schemas.microsoft.com/office/drawing/2010/main" xmlns="">
+                  <a14:hiddenFill xmlns="" xmlns:a14="http://schemas.microsoft.com/office/drawing/2010/main">
                     <a:solidFill>
                       <a:srgbClr val="FFFF00"/>
                     </a:solidFill>
                   </a14:hiddenFill>
                 </a:ext>
                 <a:ext uri="{AF507438-7753-43e0-B8FC-AC1667EBCBE1}">
-                  <a14:hiddenEffects xmlns:a14="http://schemas.microsoft.com/office/drawing/2010/main" xmlns="">
+                  <a14:hiddenEffects xmlns="" xmlns:a14="http://schemas.microsoft.com/office/drawing/2010/main">
                     <a:effectLst>
                       <a:outerShdw dist="35921" dir="2700000" algn="ctr" rotWithShape="0">
                         <a:schemeClr val="bg2"/>
@@ -8752,12 +8752,12 @@
             <a:effectLst/>
             <a:extLst>
               <a:ext uri="{909E8E84-426E-40dd-AFC4-6F175D3DCCD1}">
-                <a14:hiddenFill xmlns:a14="http://schemas.microsoft.com/office/drawing/2010/main" xmlns="">
+                <a14:hiddenFill xmlns="" xmlns:a14="http://schemas.microsoft.com/office/drawing/2010/main">
                   <a:noFill/>
                 </a14:hiddenFill>
               </a:ext>
               <a:ext uri="{AF507438-7753-43e0-B8FC-AC1667EBCBE1}">
-                <a14:hiddenEffects xmlns:a14="http://schemas.microsoft.com/office/drawing/2010/main" xmlns="">
+                <a14:hiddenEffects xmlns="" xmlns:a14="http://schemas.microsoft.com/office/drawing/2010/main">
                   <a:effectLst>
                     <a:outerShdw dist="35921" dir="2700000" algn="ctr" rotWithShape="0">
                       <a:schemeClr val="bg2"/>
@@ -8803,12 +8803,12 @@
             <a:effectLst/>
             <a:extLst>
               <a:ext uri="{909E8E84-426E-40dd-AFC4-6F175D3DCCD1}">
-                <a14:hiddenFill xmlns:a14="http://schemas.microsoft.com/office/drawing/2010/main" xmlns="">
+                <a14:hiddenFill xmlns="" xmlns:a14="http://schemas.microsoft.com/office/drawing/2010/main">
                   <a:noFill/>
                 </a14:hiddenFill>
               </a:ext>
               <a:ext uri="{AF507438-7753-43e0-B8FC-AC1667EBCBE1}">
-                <a14:hiddenEffects xmlns:a14="http://schemas.microsoft.com/office/drawing/2010/main" xmlns="">
+                <a14:hiddenEffects xmlns="" xmlns:a14="http://schemas.microsoft.com/office/drawing/2010/main">
                   <a:effectLst>
                     <a:outerShdw dist="35921" dir="2700000" algn="ctr" rotWithShape="0">
                       <a:schemeClr val="bg2"/>
@@ -8854,12 +8854,12 @@
             <a:effectLst/>
             <a:extLst>
               <a:ext uri="{909E8E84-426E-40dd-AFC4-6F175D3DCCD1}">
-                <a14:hiddenFill xmlns:a14="http://schemas.microsoft.com/office/drawing/2010/main" xmlns="">
+                <a14:hiddenFill xmlns="" xmlns:a14="http://schemas.microsoft.com/office/drawing/2010/main">
                   <a:noFill/>
                 </a14:hiddenFill>
               </a:ext>
               <a:ext uri="{AF507438-7753-43e0-B8FC-AC1667EBCBE1}">
-                <a14:hiddenEffects xmlns:a14="http://schemas.microsoft.com/office/drawing/2010/main" xmlns="">
+                <a14:hiddenEffects xmlns="" xmlns:a14="http://schemas.microsoft.com/office/drawing/2010/main">
                   <a:effectLst>
                     <a:outerShdw dist="35921" dir="2700000" algn="ctr" rotWithShape="0">
                       <a:schemeClr val="bg2"/>
@@ -8905,12 +8905,12 @@
             <a:effectLst/>
             <a:extLst>
               <a:ext uri="{909E8E84-426E-40dd-AFC4-6F175D3DCCD1}">
-                <a14:hiddenFill xmlns:a14="http://schemas.microsoft.com/office/drawing/2010/main" xmlns="">
+                <a14:hiddenFill xmlns="" xmlns:a14="http://schemas.microsoft.com/office/drawing/2010/main">
                   <a:noFill/>
                 </a14:hiddenFill>
               </a:ext>
               <a:ext uri="{AF507438-7753-43e0-B8FC-AC1667EBCBE1}">
-                <a14:hiddenEffects xmlns:a14="http://schemas.microsoft.com/office/drawing/2010/main" xmlns="">
+                <a14:hiddenEffects xmlns="" xmlns:a14="http://schemas.microsoft.com/office/drawing/2010/main">
                   <a:effectLst>
                     <a:outerShdw dist="35921" dir="2700000" algn="ctr" rotWithShape="0">
                       <a:schemeClr val="bg2"/>
@@ -8956,12 +8956,12 @@
             <a:effectLst/>
             <a:extLst>
               <a:ext uri="{909E8E84-426E-40dd-AFC4-6F175D3DCCD1}">
-                <a14:hiddenFill xmlns:a14="http://schemas.microsoft.com/office/drawing/2010/main" xmlns="">
+                <a14:hiddenFill xmlns="" xmlns:a14="http://schemas.microsoft.com/office/drawing/2010/main">
                   <a:noFill/>
                 </a14:hiddenFill>
               </a:ext>
               <a:ext uri="{AF507438-7753-43e0-B8FC-AC1667EBCBE1}">
-                <a14:hiddenEffects xmlns:a14="http://schemas.microsoft.com/office/drawing/2010/main" xmlns="">
+                <a14:hiddenEffects xmlns="" xmlns:a14="http://schemas.microsoft.com/office/drawing/2010/main">
                   <a:effectLst>
                     <a:outerShdw dist="35921" dir="2700000" algn="ctr" rotWithShape="0">
                       <a:schemeClr val="bg2"/>
@@ -9007,12 +9007,12 @@
             <a:effectLst/>
             <a:extLst>
               <a:ext uri="{909E8E84-426E-40dd-AFC4-6F175D3DCCD1}">
-                <a14:hiddenFill xmlns:a14="http://schemas.microsoft.com/office/drawing/2010/main" xmlns="">
+                <a14:hiddenFill xmlns="" xmlns:a14="http://schemas.microsoft.com/office/drawing/2010/main">
                   <a:noFill/>
                 </a14:hiddenFill>
               </a:ext>
               <a:ext uri="{AF507438-7753-43e0-B8FC-AC1667EBCBE1}">
-                <a14:hiddenEffects xmlns:a14="http://schemas.microsoft.com/office/drawing/2010/main" xmlns="">
+                <a14:hiddenEffects xmlns="" xmlns:a14="http://schemas.microsoft.com/office/drawing/2010/main">
                   <a:effectLst>
                     <a:outerShdw dist="35921" dir="2700000" algn="ctr" rotWithShape="0">
                       <a:schemeClr val="bg2"/>
@@ -9124,14 +9124,14 @@
               <a:effectLst/>
               <a:extLst>
                 <a:ext uri="{909E8E84-426E-40dd-AFC4-6F175D3DCCD1}">
-                  <a14:hiddenFill xmlns:a14="http://schemas.microsoft.com/office/drawing/2010/main" xmlns="">
+                  <a14:hiddenFill xmlns="" xmlns:a14="http://schemas.microsoft.com/office/drawing/2010/main">
                     <a:solidFill>
                       <a:srgbClr val="FFFF00"/>
                     </a:solidFill>
                   </a14:hiddenFill>
                 </a:ext>
                 <a:ext uri="{AF507438-7753-43e0-B8FC-AC1667EBCBE1}">
-                  <a14:hiddenEffects xmlns:a14="http://schemas.microsoft.com/office/drawing/2010/main" xmlns="">
+                  <a14:hiddenEffects xmlns="" xmlns:a14="http://schemas.microsoft.com/office/drawing/2010/main">
                     <a:effectLst>
                       <a:outerShdw dist="35921" dir="2700000" algn="ctr" rotWithShape="0">
                         <a:schemeClr val="bg2"/>
@@ -9227,14 +9227,14 @@
               <a:effectLst/>
               <a:extLst>
                 <a:ext uri="{909E8E84-426E-40dd-AFC4-6F175D3DCCD1}">
-                  <a14:hiddenFill xmlns:a14="http://schemas.microsoft.com/office/drawing/2010/main" xmlns="">
+                  <a14:hiddenFill xmlns="" xmlns:a14="http://schemas.microsoft.com/office/drawing/2010/main">
                     <a:solidFill>
                       <a:srgbClr val="FFFF00"/>
                     </a:solidFill>
                   </a14:hiddenFill>
                 </a:ext>
                 <a:ext uri="{AF507438-7753-43e0-B8FC-AC1667EBCBE1}">
-                  <a14:hiddenEffects xmlns:a14="http://schemas.microsoft.com/office/drawing/2010/main" xmlns="">
+                  <a14:hiddenEffects xmlns="" xmlns:a14="http://schemas.microsoft.com/office/drawing/2010/main">
                     <a:effectLst>
                       <a:outerShdw dist="35921" dir="2700000" algn="ctr" rotWithShape="0">
                         <a:schemeClr val="bg2"/>
@@ -9281,12 +9281,12 @@
             <a:effectLst/>
             <a:extLst>
               <a:ext uri="{909E8E84-426E-40dd-AFC4-6F175D3DCCD1}">
-                <a14:hiddenFill xmlns:a14="http://schemas.microsoft.com/office/drawing/2010/main" xmlns="">
+                <a14:hiddenFill xmlns="" xmlns:a14="http://schemas.microsoft.com/office/drawing/2010/main">
                   <a:noFill/>
                 </a14:hiddenFill>
               </a:ext>
               <a:ext uri="{AF507438-7753-43e0-B8FC-AC1667EBCBE1}">
-                <a14:hiddenEffects xmlns:a14="http://schemas.microsoft.com/office/drawing/2010/main" xmlns="">
+                <a14:hiddenEffects xmlns="" xmlns:a14="http://schemas.microsoft.com/office/drawing/2010/main">
                   <a:effectLst>
                     <a:outerShdw dist="35921" dir="2700000" algn="ctr" rotWithShape="0">
                       <a:schemeClr val="bg2"/>
@@ -9398,14 +9398,14 @@
               <a:effectLst/>
               <a:extLst>
                 <a:ext uri="{909E8E84-426E-40dd-AFC4-6F175D3DCCD1}">
-                  <a14:hiddenFill xmlns:a14="http://schemas.microsoft.com/office/drawing/2010/main" xmlns="">
+                  <a14:hiddenFill xmlns="" xmlns:a14="http://schemas.microsoft.com/office/drawing/2010/main">
                     <a:solidFill>
                       <a:srgbClr val="FFFF00"/>
                     </a:solidFill>
                   </a14:hiddenFill>
                 </a:ext>
                 <a:ext uri="{AF507438-7753-43e0-B8FC-AC1667EBCBE1}">
-                  <a14:hiddenEffects xmlns:a14="http://schemas.microsoft.com/office/drawing/2010/main" xmlns="">
+                  <a14:hiddenEffects xmlns="" xmlns:a14="http://schemas.microsoft.com/office/drawing/2010/main">
                     <a:effectLst>
                       <a:outerShdw dist="35921" dir="2700000" algn="ctr" rotWithShape="0">
                         <a:schemeClr val="bg2"/>
@@ -9501,14 +9501,14 @@
               <a:effectLst/>
               <a:extLst>
                 <a:ext uri="{909E8E84-426E-40dd-AFC4-6F175D3DCCD1}">
-                  <a14:hiddenFill xmlns:a14="http://schemas.microsoft.com/office/drawing/2010/main" xmlns="">
+                  <a14:hiddenFill xmlns="" xmlns:a14="http://schemas.microsoft.com/office/drawing/2010/main">
                     <a:solidFill>
                       <a:srgbClr val="FFFF00"/>
                     </a:solidFill>
                   </a14:hiddenFill>
                 </a:ext>
                 <a:ext uri="{AF507438-7753-43e0-B8FC-AC1667EBCBE1}">
-                  <a14:hiddenEffects xmlns:a14="http://schemas.microsoft.com/office/drawing/2010/main" xmlns="">
+                  <a14:hiddenEffects xmlns="" xmlns:a14="http://schemas.microsoft.com/office/drawing/2010/main">
                     <a:effectLst>
                       <a:outerShdw dist="35921" dir="2700000" algn="ctr" rotWithShape="0">
                         <a:schemeClr val="bg2"/>
@@ -10925,14 +10925,14 @@
           <a:effectLst/>
           <a:extLst>
             <a:ext uri="{909E8E84-426E-40dd-AFC4-6F175D3DCCD1}">
-              <a14:hiddenFill xmlns:a14="http://schemas.microsoft.com/office/drawing/2010/main" xmlns="">
+              <a14:hiddenFill xmlns="" xmlns:a14="http://schemas.microsoft.com/office/drawing/2010/main">
                 <a:solidFill>
                   <a:schemeClr val="accent1"/>
                 </a:solidFill>
               </a14:hiddenFill>
             </a:ext>
             <a:ext uri="{91240B29-F687-4f45-9708-019B960494DF}">
-              <a14:hiddenLine xmlns:a14="http://schemas.microsoft.com/office/drawing/2010/main" xmlns="" w="9525">
+              <a14:hiddenLine xmlns="" xmlns:a14="http://schemas.microsoft.com/office/drawing/2010/main" w="9525">
                 <a:solidFill>
                   <a:schemeClr val="tx1"/>
                 </a:solidFill>
@@ -10942,7 +10942,7 @@
               </a14:hiddenLine>
             </a:ext>
             <a:ext uri="{AF507438-7753-43e0-B8FC-AC1667EBCBE1}">
-              <a14:hiddenEffects xmlns:a14="http://schemas.microsoft.com/office/drawing/2010/main" xmlns="">
+              <a14:hiddenEffects xmlns="" xmlns:a14="http://schemas.microsoft.com/office/drawing/2010/main">
                 <a:effectLst>
                   <a:outerShdw dist="35921" dir="2700000" algn="ctr" rotWithShape="0">
                     <a:schemeClr val="bg2"/>
@@ -11861,7 +11861,7 @@
         </p:nvSpPr>
         <p:spPr>
           <a:xfrm>
-            <a:off x="251520" y="1326649"/>
+            <a:off x="251520" y="1157468"/>
             <a:ext cx="8487746" cy="4530813"/>
           </a:xfrm>
           <a:prstGeom prst="rect">
@@ -12028,8 +12028,18 @@
             </a:lvl9pPr>
           </a:lstStyle>
           <a:p>
-            <a:r>
-              <a:rPr lang="en-US" altLang="zh-CN" sz="1500" b="0" i="0" dirty="0">
+            <a:pPr marL="0" indent="0">
+              <a:buNone/>
+            </a:pPr>
+            <a:endParaRPr lang="en-US" altLang="zh-CN" sz="1400" b="0" i="0" dirty="0">
+              <a:effectLst/>
+              <a:latin typeface="Times New Roman" panose="02020603050405020304" pitchFamily="18" charset="0"/>
+              <a:cs typeface="Times New Roman" panose="02020603050405020304" pitchFamily="18" charset="0"/>
+            </a:endParaRPr>
+          </a:p>
+          <a:p>
+            <a:r>
+              <a:rPr lang="en-US" altLang="zh-CN" sz="1400" b="0" i="0" dirty="0">
                 <a:effectLst/>
                 <a:latin typeface="Times New Roman" panose="02020603050405020304" pitchFamily="18" charset="0"/>
                 <a:cs typeface="Times New Roman" panose="02020603050405020304" pitchFamily="18" charset="0"/>
@@ -12037,7 +12047,7 @@
               <a:t>Following the release of the GPT-3 model, researchers have demonstrated that In-Context Learning with fixed parameters can unlock the reasoning</a:t>
             </a:r>
             <a:r>
-              <a:rPr lang="zh-CN" altLang="en-US" sz="1500" b="0" i="0" dirty="0">
+              <a:rPr lang="zh-CN" altLang="en-US" sz="1400" b="0" i="0" dirty="0">
                 <a:effectLst/>
                 <a:latin typeface="Times New Roman" panose="02020603050405020304" pitchFamily="18" charset="0"/>
                 <a:cs typeface="Times New Roman" panose="02020603050405020304" pitchFamily="18" charset="0"/>
@@ -12045,7 +12055,7 @@
               <a:t> </a:t>
             </a:r>
             <a:r>
-              <a:rPr lang="en-US" altLang="zh-CN" sz="1500" b="0" i="0" dirty="0">
+              <a:rPr lang="en-US" altLang="zh-CN" sz="1400" b="0" i="0" dirty="0">
                 <a:effectLst/>
                 <a:latin typeface="Times New Roman" panose="02020603050405020304" pitchFamily="18" charset="0"/>
                 <a:cs typeface="Times New Roman" panose="02020603050405020304" pitchFamily="18" charset="0"/>
@@ -12053,7 +12063,7 @@
               <a:t>capability of large-scale language models. However, small-scale language models have difficulty using prompts to perform complex</a:t>
             </a:r>
             <a:r>
-              <a:rPr lang="zh-CN" altLang="en-US" sz="1500" b="0" i="0" dirty="0">
+              <a:rPr lang="zh-CN" altLang="en-US" sz="1400" b="0" i="0" dirty="0">
                 <a:effectLst/>
                 <a:latin typeface="Times New Roman" panose="02020603050405020304" pitchFamily="18" charset="0"/>
                 <a:cs typeface="Times New Roman" panose="02020603050405020304" pitchFamily="18" charset="0"/>
@@ -12061,7 +12071,7 @@
               <a:t> </a:t>
             </a:r>
             <a:r>
-              <a:rPr lang="en-US" altLang="zh-CN" sz="1500" b="0" i="0" dirty="0">
+              <a:rPr lang="en-US" altLang="zh-CN" sz="1400" b="0" i="0" dirty="0">
                 <a:effectLst/>
                 <a:latin typeface="Times New Roman" panose="02020603050405020304" pitchFamily="18" charset="0"/>
                 <a:cs typeface="Times New Roman" panose="02020603050405020304" pitchFamily="18" charset="0"/>
@@ -12071,7 +12081,7 @@
           </a:p>
           <a:p>
             <a:r>
-              <a:rPr lang="en-US" altLang="zh-CN" sz="1500" b="0" i="0" dirty="0" err="1">
+              <a:rPr lang="en-US" altLang="zh-CN" sz="1400" b="0" i="0" dirty="0" err="1">
                 <a:effectLst/>
                 <a:latin typeface="Times New Roman" panose="02020603050405020304" pitchFamily="18" charset="0"/>
                 <a:cs typeface="Times New Roman" panose="02020603050405020304" pitchFamily="18" charset="0"/>
@@ -12079,7 +12089,7 @@
               <a:t>CoT</a:t>
             </a:r>
             <a:r>
-              <a:rPr lang="en-US" altLang="zh-CN" sz="1500" b="0" i="0" dirty="0">
+              <a:rPr lang="en-US" altLang="zh-CN" sz="1400" b="0" i="0" dirty="0">
                 <a:effectLst/>
                 <a:latin typeface="Times New Roman" panose="02020603050405020304" pitchFamily="18" charset="0"/>
                 <a:cs typeface="Times New Roman" panose="02020603050405020304" pitchFamily="18" charset="0"/>
@@ -12087,7 +12097,7 @@
               <a:t> Instruction Finetuning with reasonings has also been shown to improve the reasoning</a:t>
             </a:r>
             <a:r>
-              <a:rPr lang="zh-CN" altLang="en-US" sz="1500" b="0" i="0" dirty="0">
+              <a:rPr lang="zh-CN" altLang="en-US" sz="1400" b="0" i="0" dirty="0">
                 <a:effectLst/>
                 <a:latin typeface="Times New Roman" panose="02020603050405020304" pitchFamily="18" charset="0"/>
                 <a:cs typeface="Times New Roman" panose="02020603050405020304" pitchFamily="18" charset="0"/>
@@ -12095,15 +12105,15 @@
               <a:t> </a:t>
             </a:r>
             <a:r>
-              <a:rPr lang="en-US" altLang="zh-CN" sz="1500" b="0" i="0" dirty="0">
+              <a:rPr lang="en-US" altLang="zh-CN" sz="1400" b="0" i="0" dirty="0">
                 <a:effectLst/>
                 <a:latin typeface="Times New Roman" panose="02020603050405020304" pitchFamily="18" charset="0"/>
                 <a:cs typeface="Times New Roman" panose="02020603050405020304" pitchFamily="18" charset="0"/>
               </a:rPr>
-              <a:t>ability of large-scale language models by relaxing the condition to allow parameter updates but requires a large amount of data with finetuning</a:t>
-            </a:r>
-            <a:r>
-              <a:rPr lang="zh-CN" altLang="en-US" sz="1500" b="0" i="0" dirty="0">
+              <a:t>ability of large-scale language models by relaxing the condition to allow parameter updates but requires a large amount of data with finetune</a:t>
+            </a:r>
+            <a:r>
+              <a:rPr lang="zh-CN" altLang="en-US" sz="1400" b="0" i="0" dirty="0">
                 <a:effectLst/>
                 <a:latin typeface="Times New Roman" panose="02020603050405020304" pitchFamily="18" charset="0"/>
                 <a:cs typeface="Times New Roman" panose="02020603050405020304" pitchFamily="18" charset="0"/>
@@ -12111,7 +12121,7 @@
               <a:t> </a:t>
             </a:r>
             <a:r>
-              <a:rPr lang="en-US" altLang="zh-CN" sz="1500" b="0" i="0" dirty="0">
+              <a:rPr lang="en-US" altLang="zh-CN" sz="1400" b="0" i="0" dirty="0">
                 <a:effectLst/>
                 <a:latin typeface="Times New Roman" panose="02020603050405020304" pitchFamily="18" charset="0"/>
                 <a:cs typeface="Times New Roman" panose="02020603050405020304" pitchFamily="18" charset="0"/>
@@ -12119,7 +12129,7 @@
               <a:t>processes to improve the reasoning</a:t>
             </a:r>
             <a:r>
-              <a:rPr lang="zh-CN" altLang="en-US" sz="1500" b="0" i="0" dirty="0">
+              <a:rPr lang="zh-CN" altLang="en-US" sz="1400" b="0" i="0" dirty="0">
                 <a:effectLst/>
                 <a:latin typeface="Times New Roman" panose="02020603050405020304" pitchFamily="18" charset="0"/>
                 <a:cs typeface="Times New Roman" panose="02020603050405020304" pitchFamily="18" charset="0"/>
@@ -12127,15 +12137,83 @@
               <a:t> </a:t>
             </a:r>
             <a:r>
-              <a:rPr lang="en-US" altLang="zh-CN" sz="1500" b="0" i="0" dirty="0">
+              <a:rPr lang="en-US" altLang="zh-CN" sz="1400" b="0" i="0" dirty="0">
                 <a:effectLst/>
                 <a:latin typeface="Times New Roman" panose="02020603050405020304" pitchFamily="18" charset="0"/>
                 <a:cs typeface="Times New Roman" panose="02020603050405020304" pitchFamily="18" charset="0"/>
               </a:rPr>
               <a:t>ability of small-scale models.</a:t>
             </a:r>
-            <a:r>
-              <a:rPr lang="zh-CN" altLang="en-US" sz="1500" b="0" i="0" dirty="0">
+          </a:p>
+          <a:p>
+            <a:r>
+              <a:rPr lang="en-US" altLang="zh-CN" sz="1400" b="0" i="0" dirty="0">
+                <a:effectLst/>
+                <a:latin typeface="Times New Roman" panose="02020603050405020304" pitchFamily="18" charset="0"/>
+                <a:cs typeface="Times New Roman" panose="02020603050405020304" pitchFamily="18" charset="0"/>
+              </a:rPr>
+              <a:t>Even so, the models still perform poorly after using </a:t>
+            </a:r>
+            <a:r>
+              <a:rPr lang="en-US" altLang="zh-CN" sz="1400" b="0" i="0" dirty="0" err="1">
+                <a:effectLst/>
+                <a:latin typeface="Times New Roman" panose="02020603050405020304" pitchFamily="18" charset="0"/>
+                <a:cs typeface="Times New Roman" panose="02020603050405020304" pitchFamily="18" charset="0"/>
+              </a:rPr>
+              <a:t>CoT</a:t>
+            </a:r>
+            <a:r>
+              <a:rPr lang="en-US" altLang="zh-CN" sz="1400" b="0" i="0" dirty="0">
+                <a:effectLst/>
+                <a:latin typeface="Times New Roman" panose="02020603050405020304" pitchFamily="18" charset="0"/>
+                <a:cs typeface="Times New Roman" panose="02020603050405020304" pitchFamily="18" charset="0"/>
+              </a:rPr>
+              <a:t> Instruction Finetuning to improve their inference; even </a:t>
+            </a:r>
+            <a:r>
+              <a:rPr lang="en-US" altLang="zh-CN" sz="1400" b="0" i="0" dirty="0" err="1">
+                <a:effectLst/>
+                <a:latin typeface="Times New Roman" panose="02020603050405020304" pitchFamily="18" charset="0"/>
+                <a:cs typeface="Times New Roman" panose="02020603050405020304" pitchFamily="18" charset="0"/>
+              </a:rPr>
+              <a:t>CoT</a:t>
+            </a:r>
+            <a:r>
+              <a:rPr lang="en-US" altLang="zh-CN" sz="1400" b="0" i="0" dirty="0">
+                <a:effectLst/>
+                <a:latin typeface="Times New Roman" panose="02020603050405020304" pitchFamily="18" charset="0"/>
+                <a:cs typeface="Times New Roman" panose="02020603050405020304" pitchFamily="18" charset="0"/>
+              </a:rPr>
+              <a:t> Instruction Finetuning is often less effective than simply using Instruction Finetune without adding </a:t>
+            </a:r>
+            <a:r>
+              <a:rPr lang="en-US" altLang="zh-CN" sz="1400" b="0" i="0" dirty="0" err="1">
+                <a:effectLst/>
+                <a:latin typeface="Times New Roman" panose="02020603050405020304" pitchFamily="18" charset="0"/>
+                <a:cs typeface="Times New Roman" panose="02020603050405020304" pitchFamily="18" charset="0"/>
+              </a:rPr>
+              <a:t>CoT</a:t>
+            </a:r>
+            <a:r>
+              <a:rPr lang="en-US" altLang="zh-CN" sz="1400" b="0" i="0" dirty="0">
+                <a:effectLst/>
+                <a:latin typeface="Times New Roman" panose="02020603050405020304" pitchFamily="18" charset="0"/>
+                <a:cs typeface="Times New Roman" panose="02020603050405020304" pitchFamily="18" charset="0"/>
+              </a:rPr>
+              <a:t>.</a:t>
+            </a:r>
+          </a:p>
+          <a:p>
+            <a:r>
+              <a:rPr lang="en-US" altLang="zh-CN" sz="1400" b="0" i="0" dirty="0">
+                <a:effectLst/>
+                <a:latin typeface="Times New Roman" panose="02020603050405020304" pitchFamily="18" charset="0"/>
+                <a:cs typeface="Times New Roman" panose="02020603050405020304" pitchFamily="18" charset="0"/>
+              </a:rPr>
+              <a:t>Therefore, we would like to propose a new language model, the Teacher LM, dedicated to generating reasoning processes that provide model-generated high-quality reasoning for existing QA</a:t>
+            </a:r>
+            <a:r>
+              <a:rPr lang="zh-CN" altLang="en-US" sz="1400" b="0" i="0" dirty="0">
                 <a:effectLst/>
                 <a:latin typeface="Times New Roman" panose="02020603050405020304" pitchFamily="18" charset="0"/>
                 <a:cs typeface="Times New Roman" panose="02020603050405020304" pitchFamily="18" charset="0"/>
@@ -12143,15 +12221,62 @@
               <a:t> </a:t>
             </a:r>
             <a:r>
-              <a:rPr lang="en-US" altLang="zh-CN" sz="1500" b="0" i="0" dirty="0">
+              <a:rPr lang="en-US" altLang="zh-CN" sz="1400" b="0" i="0" dirty="0">
                 <a:effectLst/>
                 <a:latin typeface="Times New Roman" panose="02020603050405020304" pitchFamily="18" charset="0"/>
                 <a:cs typeface="Times New Roman" panose="02020603050405020304" pitchFamily="18" charset="0"/>
               </a:rPr>
-              <a:t>Even so, the models still perform poorly after using </a:t>
-            </a:r>
-            <a:r>
-              <a:rPr lang="en-US" altLang="zh-CN" sz="1500" b="0" i="0" dirty="0" err="1">
+              <a:t>tasks, replacing manually annotated</a:t>
+            </a:r>
+            <a:r>
+              <a:rPr lang="zh-CN" altLang="en-US" sz="1400" b="0" i="0" dirty="0">
+                <a:effectLst/>
+                <a:latin typeface="Times New Roman" panose="02020603050405020304" pitchFamily="18" charset="0"/>
+                <a:cs typeface="Times New Roman" panose="02020603050405020304" pitchFamily="18" charset="0"/>
+              </a:rPr>
+              <a:t> </a:t>
+            </a:r>
+            <a:r>
+              <a:rPr lang="en-US" altLang="zh-CN" sz="1400" b="0" i="0" dirty="0" err="1">
+                <a:effectLst/>
+                <a:latin typeface="Times New Roman" panose="02020603050405020304" pitchFamily="18" charset="0"/>
+                <a:cs typeface="Times New Roman" panose="02020603050405020304" pitchFamily="18" charset="0"/>
+              </a:rPr>
+              <a:t>Co</a:t>
+            </a:r>
+            <a:r>
+              <a:rPr lang="en-US" altLang="zh-CN" sz="1400" dirty="0" err="1">
+                <a:latin typeface="Times New Roman" panose="02020603050405020304" pitchFamily="18" charset="0"/>
+                <a:cs typeface="Times New Roman" panose="02020603050405020304" pitchFamily="18" charset="0"/>
+              </a:rPr>
+              <a:t>T</a:t>
+            </a:r>
+            <a:r>
+              <a:rPr lang="en-US" altLang="zh-CN" sz="1400" b="0" i="0" dirty="0">
+                <a:effectLst/>
+                <a:latin typeface="Times New Roman" panose="02020603050405020304" pitchFamily="18" charset="0"/>
+                <a:cs typeface="Times New Roman" panose="02020603050405020304" pitchFamily="18" charset="0"/>
+              </a:rPr>
+              <a:t>. Ultimately, our reasoning </a:t>
+            </a:r>
+            <a:r>
+              <a:rPr lang="zh-CN" altLang="en-US" sz="1400" b="0" i="0" dirty="0">
+                <a:effectLst/>
+                <a:latin typeface="Times New Roman" panose="02020603050405020304" pitchFamily="18" charset="0"/>
+                <a:cs typeface="Times New Roman" panose="02020603050405020304" pitchFamily="18" charset="0"/>
+              </a:rPr>
+              <a:t> </a:t>
+            </a:r>
+            <a:r>
+              <a:rPr lang="en-US" altLang="zh-CN" sz="1400" b="0" i="0" dirty="0">
+                <a:effectLst/>
+                <a:latin typeface="Times New Roman" panose="02020603050405020304" pitchFamily="18" charset="0"/>
+                <a:cs typeface="Times New Roman" panose="02020603050405020304" pitchFamily="18" charset="0"/>
+              </a:rPr>
+              <a:t>are used to perform </a:t>
+            </a:r>
+            <a:r>
+              <a:rPr lang="en-US" altLang="zh-CN" sz="1400" b="0" i="0" dirty="0" err="1">
                 <a:effectLst/>
                 <a:latin typeface="Times New Roman" panose="02020603050405020304" pitchFamily="18" charset="0"/>
                 <a:cs typeface="Times New Roman" panose="02020603050405020304" pitchFamily="18" charset="0"/>
@@ -12159,160 +12284,37 @@
               <a:t>CoT</a:t>
             </a:r>
             <a:r>
-              <a:rPr lang="en-US" altLang="zh-CN" sz="1500" b="0" i="0" dirty="0">
+              <a:rPr lang="en-US" altLang="zh-CN" sz="1400" b="0" i="0" dirty="0">
                 <a:effectLst/>
                 <a:latin typeface="Times New Roman" panose="02020603050405020304" pitchFamily="18" charset="0"/>
                 <a:cs typeface="Times New Roman" panose="02020603050405020304" pitchFamily="18" charset="0"/>
               </a:rPr>
-              <a:t> Instruction Finetuning to improve their inference; even </a:t>
-            </a:r>
-            <a:r>
-              <a:rPr lang="en-US" altLang="zh-CN" sz="1500" b="0" i="0" dirty="0" err="1">
+              <a:t> Instruction Finetune, improving small-scale language models' reasoning</a:t>
+            </a:r>
+            <a:r>
+              <a:rPr lang="zh-CN" altLang="en-US" sz="1400" b="0" i="0" dirty="0">
                 <a:effectLst/>
                 <a:latin typeface="Times New Roman" panose="02020603050405020304" pitchFamily="18" charset="0"/>
                 <a:cs typeface="Times New Roman" panose="02020603050405020304" pitchFamily="18" charset="0"/>
               </a:rPr>
-              <a:t>CoT</a:t>
-            </a:r>
-            <a:r>
-              <a:rPr lang="en-US" altLang="zh-CN" sz="1500" b="0" i="0" dirty="0">
+              <a:t> </a:t>
+            </a:r>
+            <a:r>
+              <a:rPr lang="en-US" altLang="zh-CN" sz="1400" b="0" i="0" dirty="0" err="1">
                 <a:effectLst/>
                 <a:latin typeface="Times New Roman" panose="02020603050405020304" pitchFamily="18" charset="0"/>
                 <a:cs typeface="Times New Roman" panose="02020603050405020304" pitchFamily="18" charset="0"/>
               </a:rPr>
-              <a:t> Instruction Finetuning is often less effective than simply using Instruction Finetune without adding </a:t>
-            </a:r>
-            <a:r>
-              <a:rPr lang="en-US" altLang="zh-CN" sz="1500" b="0" i="0" dirty="0" err="1">
-                <a:effectLst/>
-                <a:latin typeface="Times New Roman" panose="02020603050405020304" pitchFamily="18" charset="0"/>
-                <a:cs typeface="Times New Roman" panose="02020603050405020304" pitchFamily="18" charset="0"/>
-              </a:rPr>
-              <a:t>CoT</a:t>
-            </a:r>
-            <a:r>
-              <a:rPr lang="en-US" altLang="zh-CN" sz="1500" b="0" i="0" dirty="0">
+              <a:t>aility</a:t>
+            </a:r>
+            <a:r>
+              <a:rPr lang="en-US" altLang="zh-CN" sz="1400" b="0" i="0" dirty="0">
                 <a:effectLst/>
                 <a:latin typeface="Times New Roman" panose="02020603050405020304" pitchFamily="18" charset="0"/>
                 <a:cs typeface="Times New Roman" panose="02020603050405020304" pitchFamily="18" charset="0"/>
               </a:rPr>
               <a:t>.</a:t>
             </a:r>
-          </a:p>
-          <a:p>
-            <a:r>
-              <a:rPr lang="en-US" altLang="zh-CN" sz="1500" b="0" i="0" dirty="0">
-                <a:effectLst/>
-                <a:latin typeface="Times New Roman" panose="02020603050405020304" pitchFamily="18" charset="0"/>
-                <a:cs typeface="Times New Roman" panose="02020603050405020304" pitchFamily="18" charset="0"/>
-              </a:rPr>
-              <a:t>Therefore, we would like to propose a new language model, the Teacher LM, dedicated to generating reasoning processes that provide model-generated high-quality reasoning for existing QA</a:t>
-            </a:r>
-            <a:r>
-              <a:rPr lang="zh-CN" altLang="en-US" sz="1500" b="0" i="0" dirty="0">
-                <a:effectLst/>
-                <a:latin typeface="Times New Roman" panose="02020603050405020304" pitchFamily="18" charset="0"/>
-                <a:cs typeface="Times New Roman" panose="02020603050405020304" pitchFamily="18" charset="0"/>
-              </a:rPr>
-              <a:t> </a:t>
-            </a:r>
-            <a:r>
-              <a:rPr lang="en-US" altLang="zh-CN" sz="1500" b="0" i="0" dirty="0">
-                <a:effectLst/>
-                <a:latin typeface="Times New Roman" panose="02020603050405020304" pitchFamily="18" charset="0"/>
-                <a:cs typeface="Times New Roman" panose="02020603050405020304" pitchFamily="18" charset="0"/>
-              </a:rPr>
-              <a:t>tasks, replacing manually annotated</a:t>
-            </a:r>
-            <a:r>
-              <a:rPr lang="zh-CN" altLang="en-US" sz="1500" b="0" i="0" dirty="0">
-                <a:effectLst/>
-                <a:latin typeface="Times New Roman" panose="02020603050405020304" pitchFamily="18" charset="0"/>
-                <a:cs typeface="Times New Roman" panose="02020603050405020304" pitchFamily="18" charset="0"/>
-              </a:rPr>
-              <a:t> </a:t>
-            </a:r>
-            <a:r>
-              <a:rPr lang="en-US" altLang="zh-CN" sz="1500" b="0" i="0" dirty="0" err="1">
-                <a:effectLst/>
-                <a:latin typeface="Times New Roman" panose="02020603050405020304" pitchFamily="18" charset="0"/>
-                <a:cs typeface="Times New Roman" panose="02020603050405020304" pitchFamily="18" charset="0"/>
-              </a:rPr>
-              <a:t>Co</a:t>
-            </a:r>
-            <a:r>
-              <a:rPr lang="en-US" altLang="zh-CN" sz="1500" dirty="0" err="1">
-                <a:latin typeface="Times New Roman" panose="02020603050405020304" pitchFamily="18" charset="0"/>
-                <a:cs typeface="Times New Roman" panose="02020603050405020304" pitchFamily="18" charset="0"/>
-              </a:rPr>
-              <a:t>T</a:t>
-            </a:r>
-            <a:r>
-              <a:rPr lang="en-US" altLang="zh-CN" sz="1500" b="0" i="0" dirty="0">
-                <a:effectLst/>
-                <a:latin typeface="Times New Roman" panose="02020603050405020304" pitchFamily="18" charset="0"/>
-                <a:cs typeface="Times New Roman" panose="02020603050405020304" pitchFamily="18" charset="0"/>
-              </a:rPr>
-              <a:t>. Ultimately, our reasoning</a:t>
-            </a:r>
-            <a:r>
-              <a:rPr lang="zh-CN" altLang="en-US" sz="1500" b="0" i="0" dirty="0">
-                <a:effectLst/>
-                <a:latin typeface="Times New Roman" panose="02020603050405020304" pitchFamily="18" charset="0"/>
-                <a:cs typeface="Times New Roman" panose="02020603050405020304" pitchFamily="18" charset="0"/>
-              </a:rPr>
-              <a:t> </a:t>
-            </a:r>
-            <a:r>
-              <a:rPr lang="en-US" altLang="zh-CN" sz="1500" b="0" i="0" dirty="0">
-                <a:effectLst/>
-                <a:latin typeface="Times New Roman" panose="02020603050405020304" pitchFamily="18" charset="0"/>
-                <a:cs typeface="Times New Roman" panose="02020603050405020304" pitchFamily="18" charset="0"/>
-              </a:rPr>
-              <a:t>is used to perform </a:t>
-            </a:r>
-            <a:r>
-              <a:rPr lang="en-US" altLang="zh-CN" sz="1500" b="0" i="0" dirty="0" err="1">
-                <a:effectLst/>
-                <a:latin typeface="Times New Roman" panose="02020603050405020304" pitchFamily="18" charset="0"/>
-                <a:cs typeface="Times New Roman" panose="02020603050405020304" pitchFamily="18" charset="0"/>
-              </a:rPr>
-              <a:t>CoT</a:t>
-            </a:r>
-            <a:r>
-              <a:rPr lang="en-US" altLang="zh-CN" sz="1500" b="0" i="0" dirty="0">
-                <a:effectLst/>
-                <a:latin typeface="Times New Roman" panose="02020603050405020304" pitchFamily="18" charset="0"/>
-                <a:cs typeface="Times New Roman" panose="02020603050405020304" pitchFamily="18" charset="0"/>
-              </a:rPr>
-              <a:t> Instruction Finetune, improving small-scale language models’ reasoning</a:t>
-            </a:r>
-            <a:r>
-              <a:rPr lang="zh-CN" altLang="en-US" sz="1500" b="0" i="0" dirty="0">
-                <a:effectLst/>
-                <a:latin typeface="Times New Roman" panose="02020603050405020304" pitchFamily="18" charset="0"/>
-                <a:cs typeface="Times New Roman" panose="02020603050405020304" pitchFamily="18" charset="0"/>
-              </a:rPr>
-              <a:t> </a:t>
-            </a:r>
-            <a:r>
-              <a:rPr lang="en-US" altLang="zh-CN" sz="1500" b="0" i="0" dirty="0">
-                <a:effectLst/>
-                <a:latin typeface="Times New Roman" panose="02020603050405020304" pitchFamily="18" charset="0"/>
-                <a:cs typeface="Times New Roman" panose="02020603050405020304" pitchFamily="18" charset="0"/>
-              </a:rPr>
-              <a:t>ability.</a:t>
-            </a:r>
-          </a:p>
-          <a:p>
-            <a:pPr marL="0" indent="0">
-              <a:buNone/>
-            </a:pPr>
-            <a:endParaRPr lang="en-US" altLang="zh-CN" sz="1500" b="0" i="0" dirty="0">
-              <a:effectLst/>
-              <a:latin typeface="Times New Roman" panose="02020603050405020304" pitchFamily="18" charset="0"/>
-              <a:cs typeface="Times New Roman" panose="02020603050405020304" pitchFamily="18" charset="0"/>
-            </a:endParaRPr>
           </a:p>
         </p:txBody>
       </p:sp>
@@ -12754,7 +12756,7 @@
           </a:lstStyle>
           <a:p>
             <a:r>
-              <a:rPr lang="en-US" altLang="zh-CN" sz="2000" dirty="0">
+              <a:rPr lang="en-US" altLang="zh-CN" sz="1600" dirty="0">
                 <a:latin typeface="Times New Roman" panose="02020603050405020304" pitchFamily="18" charset="0"/>
                 <a:cs typeface="Times New Roman" panose="02020603050405020304" pitchFamily="18" charset="0"/>
               </a:rPr>
@@ -12763,21 +12765,21 @@
           </a:p>
           <a:p>
             <a:r>
-              <a:rPr lang="en-US" altLang="zh-CN" sz="2000" dirty="0">
+              <a:rPr lang="en-US" altLang="zh-CN" sz="1600" dirty="0">
                 <a:latin typeface="Times New Roman" panose="02020603050405020304" pitchFamily="18" charset="0"/>
                 <a:cs typeface="Times New Roman" panose="02020603050405020304" pitchFamily="18" charset="0"/>
               </a:rPr>
               <a:t>We demonstrate that Finetune can unlock complex reasoning capabilities for small-scale language models on a small amount of data with model-generated </a:t>
             </a:r>
             <a:r>
-              <a:rPr lang="en-US" altLang="zh-CN" sz="2000" dirty="0" err="1">
+              <a:rPr lang="en-US" altLang="zh-CN" sz="1600" dirty="0" err="1">
                 <a:latin typeface="Times New Roman" panose="02020603050405020304" pitchFamily="18" charset="0"/>
                 <a:cs typeface="Times New Roman" panose="02020603050405020304" pitchFamily="18" charset="0"/>
               </a:rPr>
               <a:t>CoT</a:t>
             </a:r>
             <a:r>
-              <a:rPr lang="en-US" altLang="zh-CN" sz="2000" dirty="0">
+              <a:rPr lang="en-US" altLang="zh-CN" sz="1600" dirty="0">
                 <a:latin typeface="Times New Roman" panose="02020603050405020304" pitchFamily="18" charset="0"/>
                 <a:cs typeface="Times New Roman" panose="02020603050405020304" pitchFamily="18" charset="0"/>
               </a:rPr>
@@ -12786,7 +12788,7 @@
           </a:p>
           <a:p>
             <a:r>
-              <a:rPr lang="en-US" altLang="zh-CN" sz="2000" dirty="0">
+              <a:rPr lang="en-US" altLang="zh-CN" sz="1600" dirty="0">
                 <a:latin typeface="Times New Roman" panose="02020603050405020304" pitchFamily="18" charset="0"/>
                 <a:cs typeface="Times New Roman" panose="02020603050405020304" pitchFamily="18" charset="0"/>
               </a:rPr>

</xml_diff>

<commit_message>
北京：2023-01-11 08:19:20 纽约：2023-01-10 19:19:20 加州：2023-01-10 16:19:20 伦敦：2023-01-11 00:19:20 瑞士：2023-01-11 01:19:20 悉尼：2023-01-11 11:19:20
</commit_message>
<xml_diff>
--- a/self-info/Teacher LM English.pptx
+++ b/self-info/Teacher LM English.pptx
@@ -246,7 +246,7 @@
           <a:p>
             <a:fld id="{ECC6E495-074D-4A49-A062-D8E5D467D02D}" type="datetimeFigureOut">
               <a:rPr lang="en-US" smtClean="0"/>
-              <a:t>12/28/22</a:t>
+              <a:t>1/10/23</a:t>
             </a:fld>
             <a:endParaRPr lang="en-US"/>
           </a:p>
@@ -411,7 +411,7 @@
           <a:p>
             <a:fld id="{00F24AD7-4E24-49EC-8378-ED00CCEB1ED7}" type="datetimeFigureOut">
               <a:rPr lang="zh-CN" altLang="en-US" smtClean="0"/>
-              <a:t>2022/12/28</a:t>
+              <a:t>2023/1/10</a:t>
             </a:fld>
             <a:endParaRPr lang="zh-CN" altLang="en-US"/>
           </a:p>
@@ -1581,14 +1581,14 @@
           <a:effectLst/>
           <a:extLst>
             <a:ext uri="{909E8E84-426E-40dd-AFC4-6F175D3DCCD1}">
-              <a14:hiddenFill xmlns="" xmlns:a14="http://schemas.microsoft.com/office/drawing/2010/main">
+              <a14:hiddenFill xmlns:a14="http://schemas.microsoft.com/office/drawing/2010/main" xmlns="">
                 <a:solidFill>
                   <a:schemeClr val="accent1"/>
                 </a:solidFill>
               </a14:hiddenFill>
             </a:ext>
             <a:ext uri="{91240B29-F687-4f45-9708-019B960494DF}">
-              <a14:hiddenLine xmlns="" xmlns:a14="http://schemas.microsoft.com/office/drawing/2010/main" w="9525">
+              <a14:hiddenLine xmlns:a14="http://schemas.microsoft.com/office/drawing/2010/main" xmlns="" w="9525">
                 <a:solidFill>
                   <a:schemeClr val="tx1"/>
                 </a:solidFill>
@@ -1598,7 +1598,7 @@
               </a14:hiddenLine>
             </a:ext>
             <a:ext uri="{AF507438-7753-43e0-B8FC-AC1667EBCBE1}">
-              <a14:hiddenEffects xmlns="" xmlns:a14="http://schemas.microsoft.com/office/drawing/2010/main">
+              <a14:hiddenEffects xmlns:a14="http://schemas.microsoft.com/office/drawing/2010/main" xmlns="">
                 <a:effectLst>
                   <a:outerShdw dist="35921" dir="2700000" algn="ctr" rotWithShape="0">
                     <a:schemeClr val="bg2"/>
@@ -1645,14 +1645,14 @@
           <a:effectLst/>
           <a:extLst>
             <a:ext uri="{909E8E84-426E-40dd-AFC4-6F175D3DCCD1}">
-              <a14:hiddenFill xmlns="" xmlns:a14="http://schemas.microsoft.com/office/drawing/2010/main">
+              <a14:hiddenFill xmlns:a14="http://schemas.microsoft.com/office/drawing/2010/main" xmlns="">
                 <a:solidFill>
                   <a:schemeClr val="accent1"/>
                 </a:solidFill>
               </a14:hiddenFill>
             </a:ext>
             <a:ext uri="{91240B29-F687-4f45-9708-019B960494DF}">
-              <a14:hiddenLine xmlns="" xmlns:a14="http://schemas.microsoft.com/office/drawing/2010/main" w="9525">
+              <a14:hiddenLine xmlns:a14="http://schemas.microsoft.com/office/drawing/2010/main" xmlns="" w="9525">
                 <a:solidFill>
                   <a:schemeClr val="tx1"/>
                 </a:solidFill>
@@ -1662,7 +1662,7 @@
               </a14:hiddenLine>
             </a:ext>
             <a:ext uri="{AF507438-7753-43e0-B8FC-AC1667EBCBE1}">
-              <a14:hiddenEffects xmlns="" xmlns:a14="http://schemas.microsoft.com/office/drawing/2010/main">
+              <a14:hiddenEffects xmlns:a14="http://schemas.microsoft.com/office/drawing/2010/main" xmlns="">
                 <a:effectLst>
                   <a:outerShdw dist="35921" dir="2700000" algn="ctr" rotWithShape="0">
                     <a:schemeClr val="bg2"/>
@@ -2175,14 +2175,14 @@
           <a:effectLst/>
           <a:extLst>
             <a:ext uri="{909E8E84-426E-40dd-AFC4-6F175D3DCCD1}">
-              <a14:hiddenFill xmlns="" xmlns:a14="http://schemas.microsoft.com/office/drawing/2010/main">
+              <a14:hiddenFill xmlns:a14="http://schemas.microsoft.com/office/drawing/2010/main" xmlns="">
                 <a:solidFill>
                   <a:schemeClr val="accent1"/>
                 </a:solidFill>
               </a14:hiddenFill>
             </a:ext>
             <a:ext uri="{91240B29-F687-4f45-9708-019B960494DF}">
-              <a14:hiddenLine xmlns="" xmlns:a14="http://schemas.microsoft.com/office/drawing/2010/main" w="9525">
+              <a14:hiddenLine xmlns:a14="http://schemas.microsoft.com/office/drawing/2010/main" xmlns="" w="9525">
                 <a:solidFill>
                   <a:schemeClr val="tx1"/>
                 </a:solidFill>
@@ -2192,7 +2192,7 @@
               </a14:hiddenLine>
             </a:ext>
             <a:ext uri="{AF507438-7753-43e0-B8FC-AC1667EBCBE1}">
-              <a14:hiddenEffects xmlns="" xmlns:a14="http://schemas.microsoft.com/office/drawing/2010/main">
+              <a14:hiddenEffects xmlns:a14="http://schemas.microsoft.com/office/drawing/2010/main" xmlns="">
                 <a:effectLst>
                   <a:outerShdw dist="35921" dir="2700000" algn="ctr" rotWithShape="0">
                     <a:schemeClr val="bg2"/>
@@ -2247,12 +2247,12 @@
             <a:effectLst/>
             <a:extLst>
               <a:ext uri="{909E8E84-426E-40dd-AFC4-6F175D3DCCD1}">
-                <a14:hiddenFill xmlns="" xmlns:a14="http://schemas.microsoft.com/office/drawing/2010/main">
+                <a14:hiddenFill xmlns:a14="http://schemas.microsoft.com/office/drawing/2010/main" xmlns="">
                   <a:noFill/>
                 </a14:hiddenFill>
               </a:ext>
               <a:ext uri="{AF507438-7753-43e0-B8FC-AC1667EBCBE1}">
-                <a14:hiddenEffects xmlns="" xmlns:a14="http://schemas.microsoft.com/office/drawing/2010/main">
+                <a14:hiddenEffects xmlns:a14="http://schemas.microsoft.com/office/drawing/2010/main" xmlns="">
                   <a:effectLst>
                     <a:outerShdw dist="35921" dir="2700000" algn="ctr" rotWithShape="0">
                       <a:schemeClr val="bg2"/>
@@ -2298,12 +2298,12 @@
             <a:effectLst/>
             <a:extLst>
               <a:ext uri="{909E8E84-426E-40dd-AFC4-6F175D3DCCD1}">
-                <a14:hiddenFill xmlns="" xmlns:a14="http://schemas.microsoft.com/office/drawing/2010/main">
+                <a14:hiddenFill xmlns:a14="http://schemas.microsoft.com/office/drawing/2010/main" xmlns="">
                   <a:noFill/>
                 </a14:hiddenFill>
               </a:ext>
               <a:ext uri="{AF507438-7753-43e0-B8FC-AC1667EBCBE1}">
-                <a14:hiddenEffects xmlns="" xmlns:a14="http://schemas.microsoft.com/office/drawing/2010/main">
+                <a14:hiddenEffects xmlns:a14="http://schemas.microsoft.com/office/drawing/2010/main" xmlns="">
                   <a:effectLst>
                     <a:outerShdw dist="35921" dir="2700000" algn="ctr" rotWithShape="0">
                       <a:schemeClr val="bg2"/>
@@ -2349,12 +2349,12 @@
             <a:effectLst/>
             <a:extLst>
               <a:ext uri="{909E8E84-426E-40dd-AFC4-6F175D3DCCD1}">
-                <a14:hiddenFill xmlns="" xmlns:a14="http://schemas.microsoft.com/office/drawing/2010/main">
+                <a14:hiddenFill xmlns:a14="http://schemas.microsoft.com/office/drawing/2010/main" xmlns="">
                   <a:noFill/>
                 </a14:hiddenFill>
               </a:ext>
               <a:ext uri="{AF507438-7753-43e0-B8FC-AC1667EBCBE1}">
-                <a14:hiddenEffects xmlns="" xmlns:a14="http://schemas.microsoft.com/office/drawing/2010/main">
+                <a14:hiddenEffects xmlns:a14="http://schemas.microsoft.com/office/drawing/2010/main" xmlns="">
                   <a:effectLst>
                     <a:outerShdw dist="35921" dir="2700000" algn="ctr" rotWithShape="0">
                       <a:schemeClr val="bg2"/>
@@ -2400,12 +2400,12 @@
             <a:effectLst/>
             <a:extLst>
               <a:ext uri="{909E8E84-426E-40dd-AFC4-6F175D3DCCD1}">
-                <a14:hiddenFill xmlns="" xmlns:a14="http://schemas.microsoft.com/office/drawing/2010/main">
+                <a14:hiddenFill xmlns:a14="http://schemas.microsoft.com/office/drawing/2010/main" xmlns="">
                   <a:noFill/>
                 </a14:hiddenFill>
               </a:ext>
               <a:ext uri="{AF507438-7753-43e0-B8FC-AC1667EBCBE1}">
-                <a14:hiddenEffects xmlns="" xmlns:a14="http://schemas.microsoft.com/office/drawing/2010/main">
+                <a14:hiddenEffects xmlns:a14="http://schemas.microsoft.com/office/drawing/2010/main" xmlns="">
                   <a:effectLst>
                     <a:outerShdw dist="35921" dir="2700000" algn="ctr" rotWithShape="0">
                       <a:schemeClr val="bg2"/>
@@ -2517,14 +2517,14 @@
               <a:effectLst/>
               <a:extLst>
                 <a:ext uri="{909E8E84-426E-40dd-AFC4-6F175D3DCCD1}">
-                  <a14:hiddenFill xmlns="" xmlns:a14="http://schemas.microsoft.com/office/drawing/2010/main">
+                  <a14:hiddenFill xmlns:a14="http://schemas.microsoft.com/office/drawing/2010/main" xmlns="">
                     <a:solidFill>
                       <a:srgbClr val="FFFF00"/>
                     </a:solidFill>
                   </a14:hiddenFill>
                 </a:ext>
                 <a:ext uri="{AF507438-7753-43e0-B8FC-AC1667EBCBE1}">
-                  <a14:hiddenEffects xmlns="" xmlns:a14="http://schemas.microsoft.com/office/drawing/2010/main">
+                  <a14:hiddenEffects xmlns:a14="http://schemas.microsoft.com/office/drawing/2010/main" xmlns="">
                     <a:effectLst>
                       <a:outerShdw dist="35921" dir="2700000" algn="ctr" rotWithShape="0">
                         <a:schemeClr val="bg2"/>
@@ -2620,14 +2620,14 @@
               <a:effectLst/>
               <a:extLst>
                 <a:ext uri="{909E8E84-426E-40dd-AFC4-6F175D3DCCD1}">
-                  <a14:hiddenFill xmlns="" xmlns:a14="http://schemas.microsoft.com/office/drawing/2010/main">
+                  <a14:hiddenFill xmlns:a14="http://schemas.microsoft.com/office/drawing/2010/main" xmlns="">
                     <a:solidFill>
                       <a:srgbClr val="FFFF00"/>
                     </a:solidFill>
                   </a14:hiddenFill>
                 </a:ext>
                 <a:ext uri="{AF507438-7753-43e0-B8FC-AC1667EBCBE1}">
-                  <a14:hiddenEffects xmlns="" xmlns:a14="http://schemas.microsoft.com/office/drawing/2010/main">
+                  <a14:hiddenEffects xmlns:a14="http://schemas.microsoft.com/office/drawing/2010/main" xmlns="">
                     <a:effectLst>
                       <a:outerShdw dist="35921" dir="2700000" algn="ctr" rotWithShape="0">
                         <a:schemeClr val="bg2"/>
@@ -2674,12 +2674,12 @@
             <a:effectLst/>
             <a:extLst>
               <a:ext uri="{909E8E84-426E-40dd-AFC4-6F175D3DCCD1}">
-                <a14:hiddenFill xmlns="" xmlns:a14="http://schemas.microsoft.com/office/drawing/2010/main">
+                <a14:hiddenFill xmlns:a14="http://schemas.microsoft.com/office/drawing/2010/main" xmlns="">
                   <a:noFill/>
                 </a14:hiddenFill>
               </a:ext>
               <a:ext uri="{AF507438-7753-43e0-B8FC-AC1667EBCBE1}">
-                <a14:hiddenEffects xmlns="" xmlns:a14="http://schemas.microsoft.com/office/drawing/2010/main">
+                <a14:hiddenEffects xmlns:a14="http://schemas.microsoft.com/office/drawing/2010/main" xmlns="">
                   <a:effectLst>
                     <a:outerShdw dist="35921" dir="2700000" algn="ctr" rotWithShape="0">
                       <a:schemeClr val="bg2"/>
@@ -2725,12 +2725,12 @@
             <a:effectLst/>
             <a:extLst>
               <a:ext uri="{909E8E84-426E-40dd-AFC4-6F175D3DCCD1}">
-                <a14:hiddenFill xmlns="" xmlns:a14="http://schemas.microsoft.com/office/drawing/2010/main">
+                <a14:hiddenFill xmlns:a14="http://schemas.microsoft.com/office/drawing/2010/main" xmlns="">
                   <a:noFill/>
                 </a14:hiddenFill>
               </a:ext>
               <a:ext uri="{AF507438-7753-43e0-B8FC-AC1667EBCBE1}">
-                <a14:hiddenEffects xmlns="" xmlns:a14="http://schemas.microsoft.com/office/drawing/2010/main">
+                <a14:hiddenEffects xmlns:a14="http://schemas.microsoft.com/office/drawing/2010/main" xmlns="">
                   <a:effectLst>
                     <a:outerShdw dist="35921" dir="2700000" algn="ctr" rotWithShape="0">
                       <a:schemeClr val="bg2"/>
@@ -2776,12 +2776,12 @@
             <a:effectLst/>
             <a:extLst>
               <a:ext uri="{909E8E84-426E-40dd-AFC4-6F175D3DCCD1}">
-                <a14:hiddenFill xmlns="" xmlns:a14="http://schemas.microsoft.com/office/drawing/2010/main">
+                <a14:hiddenFill xmlns:a14="http://schemas.microsoft.com/office/drawing/2010/main" xmlns="">
                   <a:noFill/>
                 </a14:hiddenFill>
               </a:ext>
               <a:ext uri="{AF507438-7753-43e0-B8FC-AC1667EBCBE1}">
-                <a14:hiddenEffects xmlns="" xmlns:a14="http://schemas.microsoft.com/office/drawing/2010/main">
+                <a14:hiddenEffects xmlns:a14="http://schemas.microsoft.com/office/drawing/2010/main" xmlns="">
                   <a:effectLst>
                     <a:outerShdw dist="35921" dir="2700000" algn="ctr" rotWithShape="0">
                       <a:schemeClr val="bg2"/>
@@ -2827,12 +2827,12 @@
             <a:effectLst/>
             <a:extLst>
               <a:ext uri="{909E8E84-426E-40dd-AFC4-6F175D3DCCD1}">
-                <a14:hiddenFill xmlns="" xmlns:a14="http://schemas.microsoft.com/office/drawing/2010/main">
+                <a14:hiddenFill xmlns:a14="http://schemas.microsoft.com/office/drawing/2010/main" xmlns="">
                   <a:noFill/>
                 </a14:hiddenFill>
               </a:ext>
               <a:ext uri="{AF507438-7753-43e0-B8FC-AC1667EBCBE1}">
-                <a14:hiddenEffects xmlns="" xmlns:a14="http://schemas.microsoft.com/office/drawing/2010/main">
+                <a14:hiddenEffects xmlns:a14="http://schemas.microsoft.com/office/drawing/2010/main" xmlns="">
                   <a:effectLst>
                     <a:outerShdw dist="35921" dir="2700000" algn="ctr" rotWithShape="0">
                       <a:schemeClr val="bg2"/>
@@ -2878,12 +2878,12 @@
             <a:effectLst/>
             <a:extLst>
               <a:ext uri="{909E8E84-426E-40dd-AFC4-6F175D3DCCD1}">
-                <a14:hiddenFill xmlns="" xmlns:a14="http://schemas.microsoft.com/office/drawing/2010/main">
+                <a14:hiddenFill xmlns:a14="http://schemas.microsoft.com/office/drawing/2010/main" xmlns="">
                   <a:noFill/>
                 </a14:hiddenFill>
               </a:ext>
               <a:ext uri="{AF507438-7753-43e0-B8FC-AC1667EBCBE1}">
-                <a14:hiddenEffects xmlns="" xmlns:a14="http://schemas.microsoft.com/office/drawing/2010/main">
+                <a14:hiddenEffects xmlns:a14="http://schemas.microsoft.com/office/drawing/2010/main" xmlns="">
                   <a:effectLst>
                     <a:outerShdw dist="35921" dir="2700000" algn="ctr" rotWithShape="0">
                       <a:schemeClr val="bg2"/>
@@ -2929,12 +2929,12 @@
             <a:effectLst/>
             <a:extLst>
               <a:ext uri="{909E8E84-426E-40dd-AFC4-6F175D3DCCD1}">
-                <a14:hiddenFill xmlns="" xmlns:a14="http://schemas.microsoft.com/office/drawing/2010/main">
+                <a14:hiddenFill xmlns:a14="http://schemas.microsoft.com/office/drawing/2010/main" xmlns="">
                   <a:noFill/>
                 </a14:hiddenFill>
               </a:ext>
               <a:ext uri="{AF507438-7753-43e0-B8FC-AC1667EBCBE1}">
-                <a14:hiddenEffects xmlns="" xmlns:a14="http://schemas.microsoft.com/office/drawing/2010/main">
+                <a14:hiddenEffects xmlns:a14="http://schemas.microsoft.com/office/drawing/2010/main" xmlns="">
                   <a:effectLst>
                     <a:outerShdw dist="35921" dir="2700000" algn="ctr" rotWithShape="0">
                       <a:schemeClr val="bg2"/>
@@ -2980,12 +2980,12 @@
             <a:effectLst/>
             <a:extLst>
               <a:ext uri="{909E8E84-426E-40dd-AFC4-6F175D3DCCD1}">
-                <a14:hiddenFill xmlns="" xmlns:a14="http://schemas.microsoft.com/office/drawing/2010/main">
+                <a14:hiddenFill xmlns:a14="http://schemas.microsoft.com/office/drawing/2010/main" xmlns="">
                   <a:noFill/>
                 </a14:hiddenFill>
               </a:ext>
               <a:ext uri="{AF507438-7753-43e0-B8FC-AC1667EBCBE1}">
-                <a14:hiddenEffects xmlns="" xmlns:a14="http://schemas.microsoft.com/office/drawing/2010/main">
+                <a14:hiddenEffects xmlns:a14="http://schemas.microsoft.com/office/drawing/2010/main" xmlns="">
                   <a:effectLst>
                     <a:outerShdw dist="35921" dir="2700000" algn="ctr" rotWithShape="0">
                       <a:schemeClr val="bg2"/>
@@ -3031,12 +3031,12 @@
             <a:effectLst/>
             <a:extLst>
               <a:ext uri="{909E8E84-426E-40dd-AFC4-6F175D3DCCD1}">
-                <a14:hiddenFill xmlns="" xmlns:a14="http://schemas.microsoft.com/office/drawing/2010/main">
+                <a14:hiddenFill xmlns:a14="http://schemas.microsoft.com/office/drawing/2010/main" xmlns="">
                   <a:noFill/>
                 </a14:hiddenFill>
               </a:ext>
               <a:ext uri="{AF507438-7753-43e0-B8FC-AC1667EBCBE1}">
-                <a14:hiddenEffects xmlns="" xmlns:a14="http://schemas.microsoft.com/office/drawing/2010/main">
+                <a14:hiddenEffects xmlns:a14="http://schemas.microsoft.com/office/drawing/2010/main" xmlns="">
                   <a:effectLst>
                     <a:outerShdw dist="35921" dir="2700000" algn="ctr" rotWithShape="0">
                       <a:schemeClr val="bg2"/>
@@ -3082,12 +3082,12 @@
             <a:effectLst/>
             <a:extLst>
               <a:ext uri="{909E8E84-426E-40dd-AFC4-6F175D3DCCD1}">
-                <a14:hiddenFill xmlns="" xmlns:a14="http://schemas.microsoft.com/office/drawing/2010/main">
+                <a14:hiddenFill xmlns:a14="http://schemas.microsoft.com/office/drawing/2010/main" xmlns="">
                   <a:noFill/>
                 </a14:hiddenFill>
               </a:ext>
               <a:ext uri="{AF507438-7753-43e0-B8FC-AC1667EBCBE1}">
-                <a14:hiddenEffects xmlns="" xmlns:a14="http://schemas.microsoft.com/office/drawing/2010/main">
+                <a14:hiddenEffects xmlns:a14="http://schemas.microsoft.com/office/drawing/2010/main" xmlns="">
                   <a:effectLst>
                     <a:outerShdw dist="35921" dir="2700000" algn="ctr" rotWithShape="0">
                       <a:schemeClr val="bg2"/>
@@ -3133,12 +3133,12 @@
             <a:effectLst/>
             <a:extLst>
               <a:ext uri="{909E8E84-426E-40dd-AFC4-6F175D3DCCD1}">
-                <a14:hiddenFill xmlns="" xmlns:a14="http://schemas.microsoft.com/office/drawing/2010/main">
+                <a14:hiddenFill xmlns:a14="http://schemas.microsoft.com/office/drawing/2010/main" xmlns="">
                   <a:noFill/>
                 </a14:hiddenFill>
               </a:ext>
               <a:ext uri="{AF507438-7753-43e0-B8FC-AC1667EBCBE1}">
-                <a14:hiddenEffects xmlns="" xmlns:a14="http://schemas.microsoft.com/office/drawing/2010/main">
+                <a14:hiddenEffects xmlns:a14="http://schemas.microsoft.com/office/drawing/2010/main" xmlns="">
                   <a:effectLst>
                     <a:outerShdw dist="35921" dir="2700000" algn="ctr" rotWithShape="0">
                       <a:schemeClr val="bg2"/>
@@ -3184,12 +3184,12 @@
             <a:effectLst/>
             <a:extLst>
               <a:ext uri="{909E8E84-426E-40dd-AFC4-6F175D3DCCD1}">
-                <a14:hiddenFill xmlns="" xmlns:a14="http://schemas.microsoft.com/office/drawing/2010/main">
+                <a14:hiddenFill xmlns:a14="http://schemas.microsoft.com/office/drawing/2010/main" xmlns="">
                   <a:noFill/>
                 </a14:hiddenFill>
               </a:ext>
               <a:ext uri="{AF507438-7753-43e0-B8FC-AC1667EBCBE1}">
-                <a14:hiddenEffects xmlns="" xmlns:a14="http://schemas.microsoft.com/office/drawing/2010/main">
+                <a14:hiddenEffects xmlns:a14="http://schemas.microsoft.com/office/drawing/2010/main" xmlns="">
                   <a:effectLst>
                     <a:outerShdw dist="35921" dir="2700000" algn="ctr" rotWithShape="0">
                       <a:schemeClr val="bg2"/>
@@ -3235,12 +3235,12 @@
             <a:effectLst/>
             <a:extLst>
               <a:ext uri="{909E8E84-426E-40dd-AFC4-6F175D3DCCD1}">
-                <a14:hiddenFill xmlns="" xmlns:a14="http://schemas.microsoft.com/office/drawing/2010/main">
+                <a14:hiddenFill xmlns:a14="http://schemas.microsoft.com/office/drawing/2010/main" xmlns="">
                   <a:noFill/>
                 </a14:hiddenFill>
               </a:ext>
               <a:ext uri="{AF507438-7753-43e0-B8FC-AC1667EBCBE1}">
-                <a14:hiddenEffects xmlns="" xmlns:a14="http://schemas.microsoft.com/office/drawing/2010/main">
+                <a14:hiddenEffects xmlns:a14="http://schemas.microsoft.com/office/drawing/2010/main" xmlns="">
                   <a:effectLst>
                     <a:outerShdw dist="35921" dir="2700000" algn="ctr" rotWithShape="0">
                       <a:schemeClr val="bg2"/>
@@ -3352,14 +3352,14 @@
               <a:effectLst/>
               <a:extLst>
                 <a:ext uri="{909E8E84-426E-40dd-AFC4-6F175D3DCCD1}">
-                  <a14:hiddenFill xmlns="" xmlns:a14="http://schemas.microsoft.com/office/drawing/2010/main">
+                  <a14:hiddenFill xmlns:a14="http://schemas.microsoft.com/office/drawing/2010/main" xmlns="">
                     <a:solidFill>
                       <a:srgbClr val="FFFF00"/>
                     </a:solidFill>
                   </a14:hiddenFill>
                 </a:ext>
                 <a:ext uri="{AF507438-7753-43e0-B8FC-AC1667EBCBE1}">
-                  <a14:hiddenEffects xmlns="" xmlns:a14="http://schemas.microsoft.com/office/drawing/2010/main">
+                  <a14:hiddenEffects xmlns:a14="http://schemas.microsoft.com/office/drawing/2010/main" xmlns="">
                     <a:effectLst>
                       <a:outerShdw dist="35921" dir="2700000" algn="ctr" rotWithShape="0">
                         <a:schemeClr val="bg2"/>
@@ -3455,14 +3455,14 @@
               <a:effectLst/>
               <a:extLst>
                 <a:ext uri="{909E8E84-426E-40dd-AFC4-6F175D3DCCD1}">
-                  <a14:hiddenFill xmlns="" xmlns:a14="http://schemas.microsoft.com/office/drawing/2010/main">
+                  <a14:hiddenFill xmlns:a14="http://schemas.microsoft.com/office/drawing/2010/main" xmlns="">
                     <a:solidFill>
                       <a:srgbClr val="FFFF00"/>
                     </a:solidFill>
                   </a14:hiddenFill>
                 </a:ext>
                 <a:ext uri="{AF507438-7753-43e0-B8FC-AC1667EBCBE1}">
-                  <a14:hiddenEffects xmlns="" xmlns:a14="http://schemas.microsoft.com/office/drawing/2010/main">
+                  <a14:hiddenEffects xmlns:a14="http://schemas.microsoft.com/office/drawing/2010/main" xmlns="">
                     <a:effectLst>
                       <a:outerShdw dist="35921" dir="2700000" algn="ctr" rotWithShape="0">
                         <a:schemeClr val="bg2"/>
@@ -3509,12 +3509,12 @@
             <a:effectLst/>
             <a:extLst>
               <a:ext uri="{909E8E84-426E-40dd-AFC4-6F175D3DCCD1}">
-                <a14:hiddenFill xmlns="" xmlns:a14="http://schemas.microsoft.com/office/drawing/2010/main">
+                <a14:hiddenFill xmlns:a14="http://schemas.microsoft.com/office/drawing/2010/main" xmlns="">
                   <a:noFill/>
                 </a14:hiddenFill>
               </a:ext>
               <a:ext uri="{AF507438-7753-43e0-B8FC-AC1667EBCBE1}">
-                <a14:hiddenEffects xmlns="" xmlns:a14="http://schemas.microsoft.com/office/drawing/2010/main">
+                <a14:hiddenEffects xmlns:a14="http://schemas.microsoft.com/office/drawing/2010/main" xmlns="">
                   <a:effectLst>
                     <a:outerShdw dist="35921" dir="2700000" algn="ctr" rotWithShape="0">
                       <a:schemeClr val="bg2"/>
@@ -3560,12 +3560,12 @@
             <a:effectLst/>
             <a:extLst>
               <a:ext uri="{909E8E84-426E-40dd-AFC4-6F175D3DCCD1}">
-                <a14:hiddenFill xmlns="" xmlns:a14="http://schemas.microsoft.com/office/drawing/2010/main">
+                <a14:hiddenFill xmlns:a14="http://schemas.microsoft.com/office/drawing/2010/main" xmlns="">
                   <a:noFill/>
                 </a14:hiddenFill>
               </a:ext>
               <a:ext uri="{AF507438-7753-43e0-B8FC-AC1667EBCBE1}">
-                <a14:hiddenEffects xmlns="" xmlns:a14="http://schemas.microsoft.com/office/drawing/2010/main">
+                <a14:hiddenEffects xmlns:a14="http://schemas.microsoft.com/office/drawing/2010/main" xmlns="">
                   <a:effectLst>
                     <a:outerShdw dist="35921" dir="2700000" algn="ctr" rotWithShape="0">
                       <a:schemeClr val="bg2"/>
@@ -3611,12 +3611,12 @@
             <a:effectLst/>
             <a:extLst>
               <a:ext uri="{909E8E84-426E-40dd-AFC4-6F175D3DCCD1}">
-                <a14:hiddenFill xmlns="" xmlns:a14="http://schemas.microsoft.com/office/drawing/2010/main">
+                <a14:hiddenFill xmlns:a14="http://schemas.microsoft.com/office/drawing/2010/main" xmlns="">
                   <a:noFill/>
                 </a14:hiddenFill>
               </a:ext>
               <a:ext uri="{AF507438-7753-43e0-B8FC-AC1667EBCBE1}">
-                <a14:hiddenEffects xmlns="" xmlns:a14="http://schemas.microsoft.com/office/drawing/2010/main">
+                <a14:hiddenEffects xmlns:a14="http://schemas.microsoft.com/office/drawing/2010/main" xmlns="">
                   <a:effectLst>
                     <a:outerShdw dist="35921" dir="2700000" algn="ctr" rotWithShape="0">
                       <a:schemeClr val="bg2"/>
@@ -3662,12 +3662,12 @@
             <a:effectLst/>
             <a:extLst>
               <a:ext uri="{909E8E84-426E-40dd-AFC4-6F175D3DCCD1}">
-                <a14:hiddenFill xmlns="" xmlns:a14="http://schemas.microsoft.com/office/drawing/2010/main">
+                <a14:hiddenFill xmlns:a14="http://schemas.microsoft.com/office/drawing/2010/main" xmlns="">
                   <a:noFill/>
                 </a14:hiddenFill>
               </a:ext>
               <a:ext uri="{AF507438-7753-43e0-B8FC-AC1667EBCBE1}">
-                <a14:hiddenEffects xmlns="" xmlns:a14="http://schemas.microsoft.com/office/drawing/2010/main">
+                <a14:hiddenEffects xmlns:a14="http://schemas.microsoft.com/office/drawing/2010/main" xmlns="">
                   <a:effectLst>
                     <a:outerShdw dist="35921" dir="2700000" algn="ctr" rotWithShape="0">
                       <a:schemeClr val="bg2"/>
@@ -3713,12 +3713,12 @@
             <a:effectLst/>
             <a:extLst>
               <a:ext uri="{909E8E84-426E-40dd-AFC4-6F175D3DCCD1}">
-                <a14:hiddenFill xmlns="" xmlns:a14="http://schemas.microsoft.com/office/drawing/2010/main">
+                <a14:hiddenFill xmlns:a14="http://schemas.microsoft.com/office/drawing/2010/main" xmlns="">
                   <a:noFill/>
                 </a14:hiddenFill>
               </a:ext>
               <a:ext uri="{AF507438-7753-43e0-B8FC-AC1667EBCBE1}">
-                <a14:hiddenEffects xmlns="" xmlns:a14="http://schemas.microsoft.com/office/drawing/2010/main">
+                <a14:hiddenEffects xmlns:a14="http://schemas.microsoft.com/office/drawing/2010/main" xmlns="">
                   <a:effectLst>
                     <a:outerShdw dist="35921" dir="2700000" algn="ctr" rotWithShape="0">
                       <a:schemeClr val="bg2"/>
@@ -3764,12 +3764,12 @@
             <a:effectLst/>
             <a:extLst>
               <a:ext uri="{909E8E84-426E-40dd-AFC4-6F175D3DCCD1}">
-                <a14:hiddenFill xmlns="" xmlns:a14="http://schemas.microsoft.com/office/drawing/2010/main">
+                <a14:hiddenFill xmlns:a14="http://schemas.microsoft.com/office/drawing/2010/main" xmlns="">
                   <a:noFill/>
                 </a14:hiddenFill>
               </a:ext>
               <a:ext uri="{AF507438-7753-43e0-B8FC-AC1667EBCBE1}">
-                <a14:hiddenEffects xmlns="" xmlns:a14="http://schemas.microsoft.com/office/drawing/2010/main">
+                <a14:hiddenEffects xmlns:a14="http://schemas.microsoft.com/office/drawing/2010/main" xmlns="">
                   <a:effectLst>
                     <a:outerShdw dist="35921" dir="2700000" algn="ctr" rotWithShape="0">
                       <a:schemeClr val="bg2"/>
@@ -3815,12 +3815,12 @@
             <a:effectLst/>
             <a:extLst>
               <a:ext uri="{909E8E84-426E-40dd-AFC4-6F175D3DCCD1}">
-                <a14:hiddenFill xmlns="" xmlns:a14="http://schemas.microsoft.com/office/drawing/2010/main">
+                <a14:hiddenFill xmlns:a14="http://schemas.microsoft.com/office/drawing/2010/main" xmlns="">
                   <a:noFill/>
                 </a14:hiddenFill>
               </a:ext>
               <a:ext uri="{AF507438-7753-43e0-B8FC-AC1667EBCBE1}">
-                <a14:hiddenEffects xmlns="" xmlns:a14="http://schemas.microsoft.com/office/drawing/2010/main">
+                <a14:hiddenEffects xmlns:a14="http://schemas.microsoft.com/office/drawing/2010/main" xmlns="">
                   <a:effectLst>
                     <a:outerShdw dist="35921" dir="2700000" algn="ctr" rotWithShape="0">
                       <a:schemeClr val="bg2"/>
@@ -3866,12 +3866,12 @@
             <a:effectLst/>
             <a:extLst>
               <a:ext uri="{909E8E84-426E-40dd-AFC4-6F175D3DCCD1}">
-                <a14:hiddenFill xmlns="" xmlns:a14="http://schemas.microsoft.com/office/drawing/2010/main">
+                <a14:hiddenFill xmlns:a14="http://schemas.microsoft.com/office/drawing/2010/main" xmlns="">
                   <a:noFill/>
                 </a14:hiddenFill>
               </a:ext>
               <a:ext uri="{AF507438-7753-43e0-B8FC-AC1667EBCBE1}">
-                <a14:hiddenEffects xmlns="" xmlns:a14="http://schemas.microsoft.com/office/drawing/2010/main">
+                <a14:hiddenEffects xmlns:a14="http://schemas.microsoft.com/office/drawing/2010/main" xmlns="">
                   <a:effectLst>
                     <a:outerShdw dist="35921" dir="2700000" algn="ctr" rotWithShape="0">
                       <a:schemeClr val="bg2"/>
@@ -3917,12 +3917,12 @@
             <a:effectLst/>
             <a:extLst>
               <a:ext uri="{909E8E84-426E-40dd-AFC4-6F175D3DCCD1}">
-                <a14:hiddenFill xmlns="" xmlns:a14="http://schemas.microsoft.com/office/drawing/2010/main">
+                <a14:hiddenFill xmlns:a14="http://schemas.microsoft.com/office/drawing/2010/main" xmlns="">
                   <a:noFill/>
                 </a14:hiddenFill>
               </a:ext>
               <a:ext uri="{AF507438-7753-43e0-B8FC-AC1667EBCBE1}">
-                <a14:hiddenEffects xmlns="" xmlns:a14="http://schemas.microsoft.com/office/drawing/2010/main">
+                <a14:hiddenEffects xmlns:a14="http://schemas.microsoft.com/office/drawing/2010/main" xmlns="">
                   <a:effectLst>
                     <a:outerShdw dist="35921" dir="2700000" algn="ctr" rotWithShape="0">
                       <a:schemeClr val="bg2"/>
@@ -3968,12 +3968,12 @@
             <a:effectLst/>
             <a:extLst>
               <a:ext uri="{909E8E84-426E-40dd-AFC4-6F175D3DCCD1}">
-                <a14:hiddenFill xmlns="" xmlns:a14="http://schemas.microsoft.com/office/drawing/2010/main">
+                <a14:hiddenFill xmlns:a14="http://schemas.microsoft.com/office/drawing/2010/main" xmlns="">
                   <a:noFill/>
                 </a14:hiddenFill>
               </a:ext>
               <a:ext uri="{AF507438-7753-43e0-B8FC-AC1667EBCBE1}">
-                <a14:hiddenEffects xmlns="" xmlns:a14="http://schemas.microsoft.com/office/drawing/2010/main">
+                <a14:hiddenEffects xmlns:a14="http://schemas.microsoft.com/office/drawing/2010/main" xmlns="">
                   <a:effectLst>
                     <a:outerShdw dist="35921" dir="2700000" algn="ctr" rotWithShape="0">
                       <a:schemeClr val="bg2"/>
@@ -4019,12 +4019,12 @@
             <a:effectLst/>
             <a:extLst>
               <a:ext uri="{909E8E84-426E-40dd-AFC4-6F175D3DCCD1}">
-                <a14:hiddenFill xmlns="" xmlns:a14="http://schemas.microsoft.com/office/drawing/2010/main">
+                <a14:hiddenFill xmlns:a14="http://schemas.microsoft.com/office/drawing/2010/main" xmlns="">
                   <a:noFill/>
                 </a14:hiddenFill>
               </a:ext>
               <a:ext uri="{AF507438-7753-43e0-B8FC-AC1667EBCBE1}">
-                <a14:hiddenEffects xmlns="" xmlns:a14="http://schemas.microsoft.com/office/drawing/2010/main">
+                <a14:hiddenEffects xmlns:a14="http://schemas.microsoft.com/office/drawing/2010/main" xmlns="">
                   <a:effectLst>
                     <a:outerShdw dist="35921" dir="2700000" algn="ctr" rotWithShape="0">
                       <a:schemeClr val="bg2"/>
@@ -4070,12 +4070,12 @@
             <a:effectLst/>
             <a:extLst>
               <a:ext uri="{909E8E84-426E-40dd-AFC4-6F175D3DCCD1}">
-                <a14:hiddenFill xmlns="" xmlns:a14="http://schemas.microsoft.com/office/drawing/2010/main">
+                <a14:hiddenFill xmlns:a14="http://schemas.microsoft.com/office/drawing/2010/main" xmlns="">
                   <a:noFill/>
                 </a14:hiddenFill>
               </a:ext>
               <a:ext uri="{AF507438-7753-43e0-B8FC-AC1667EBCBE1}">
-                <a14:hiddenEffects xmlns="" xmlns:a14="http://schemas.microsoft.com/office/drawing/2010/main">
+                <a14:hiddenEffects xmlns:a14="http://schemas.microsoft.com/office/drawing/2010/main" xmlns="">
                   <a:effectLst>
                     <a:outerShdw dist="35921" dir="2700000" algn="ctr" rotWithShape="0">
                       <a:schemeClr val="bg2"/>
@@ -4121,12 +4121,12 @@
             <a:effectLst/>
             <a:extLst>
               <a:ext uri="{909E8E84-426E-40dd-AFC4-6F175D3DCCD1}">
-                <a14:hiddenFill xmlns="" xmlns:a14="http://schemas.microsoft.com/office/drawing/2010/main">
+                <a14:hiddenFill xmlns:a14="http://schemas.microsoft.com/office/drawing/2010/main" xmlns="">
                   <a:noFill/>
                 </a14:hiddenFill>
               </a:ext>
               <a:ext uri="{AF507438-7753-43e0-B8FC-AC1667EBCBE1}">
-                <a14:hiddenEffects xmlns="" xmlns:a14="http://schemas.microsoft.com/office/drawing/2010/main">
+                <a14:hiddenEffects xmlns:a14="http://schemas.microsoft.com/office/drawing/2010/main" xmlns="">
                   <a:effectLst>
                     <a:outerShdw dist="35921" dir="2700000" algn="ctr" rotWithShape="0">
                       <a:schemeClr val="bg2"/>
@@ -4172,12 +4172,12 @@
             <a:effectLst/>
             <a:extLst>
               <a:ext uri="{909E8E84-426E-40dd-AFC4-6F175D3DCCD1}">
-                <a14:hiddenFill xmlns="" xmlns:a14="http://schemas.microsoft.com/office/drawing/2010/main">
+                <a14:hiddenFill xmlns:a14="http://schemas.microsoft.com/office/drawing/2010/main" xmlns="">
                   <a:noFill/>
                 </a14:hiddenFill>
               </a:ext>
               <a:ext uri="{AF507438-7753-43e0-B8FC-AC1667EBCBE1}">
-                <a14:hiddenEffects xmlns="" xmlns:a14="http://schemas.microsoft.com/office/drawing/2010/main">
+                <a14:hiddenEffects xmlns:a14="http://schemas.microsoft.com/office/drawing/2010/main" xmlns="">
                   <a:effectLst>
                     <a:outerShdw dist="35921" dir="2700000" algn="ctr" rotWithShape="0">
                       <a:schemeClr val="bg2"/>
@@ -4239,12 +4239,12 @@
               <a:effectLst/>
               <a:extLst>
                 <a:ext uri="{909E8E84-426E-40dd-AFC4-6F175D3DCCD1}">
-                  <a14:hiddenFill xmlns="" xmlns:a14="http://schemas.microsoft.com/office/drawing/2010/main">
+                  <a14:hiddenFill xmlns:a14="http://schemas.microsoft.com/office/drawing/2010/main" xmlns="">
                     <a:noFill/>
                   </a14:hiddenFill>
                 </a:ext>
                 <a:ext uri="{AF507438-7753-43e0-B8FC-AC1667EBCBE1}">
-                  <a14:hiddenEffects xmlns="" xmlns:a14="http://schemas.microsoft.com/office/drawing/2010/main">
+                  <a14:hiddenEffects xmlns:a14="http://schemas.microsoft.com/office/drawing/2010/main" xmlns="">
                     <a:effectLst>
                       <a:outerShdw dist="35921" dir="2700000" algn="ctr" rotWithShape="0">
                         <a:schemeClr val="bg2"/>
@@ -4290,12 +4290,12 @@
               <a:effectLst/>
               <a:extLst>
                 <a:ext uri="{909E8E84-426E-40dd-AFC4-6F175D3DCCD1}">
-                  <a14:hiddenFill xmlns="" xmlns:a14="http://schemas.microsoft.com/office/drawing/2010/main">
+                  <a14:hiddenFill xmlns:a14="http://schemas.microsoft.com/office/drawing/2010/main" xmlns="">
                     <a:noFill/>
                   </a14:hiddenFill>
                 </a:ext>
                 <a:ext uri="{AF507438-7753-43e0-B8FC-AC1667EBCBE1}">
-                  <a14:hiddenEffects xmlns="" xmlns:a14="http://schemas.microsoft.com/office/drawing/2010/main">
+                  <a14:hiddenEffects xmlns:a14="http://schemas.microsoft.com/office/drawing/2010/main" xmlns="">
                     <a:effectLst>
                       <a:outerShdw dist="35921" dir="2700000" algn="ctr" rotWithShape="0">
                         <a:schemeClr val="bg2"/>
@@ -4341,12 +4341,12 @@
               <a:effectLst/>
               <a:extLst>
                 <a:ext uri="{909E8E84-426E-40dd-AFC4-6F175D3DCCD1}">
-                  <a14:hiddenFill xmlns="" xmlns:a14="http://schemas.microsoft.com/office/drawing/2010/main">
+                  <a14:hiddenFill xmlns:a14="http://schemas.microsoft.com/office/drawing/2010/main" xmlns="">
                     <a:noFill/>
                   </a14:hiddenFill>
                 </a:ext>
                 <a:ext uri="{AF507438-7753-43e0-B8FC-AC1667EBCBE1}">
-                  <a14:hiddenEffects xmlns="" xmlns:a14="http://schemas.microsoft.com/office/drawing/2010/main">
+                  <a14:hiddenEffects xmlns:a14="http://schemas.microsoft.com/office/drawing/2010/main" xmlns="">
                     <a:effectLst>
                       <a:outerShdw dist="35921" dir="2700000" algn="ctr" rotWithShape="0">
                         <a:schemeClr val="bg2"/>
@@ -4392,12 +4392,12 @@
               <a:effectLst/>
               <a:extLst>
                 <a:ext uri="{909E8E84-426E-40dd-AFC4-6F175D3DCCD1}">
-                  <a14:hiddenFill xmlns="" xmlns:a14="http://schemas.microsoft.com/office/drawing/2010/main">
+                  <a14:hiddenFill xmlns:a14="http://schemas.microsoft.com/office/drawing/2010/main" xmlns="">
                     <a:noFill/>
                   </a14:hiddenFill>
                 </a:ext>
                 <a:ext uri="{AF507438-7753-43e0-B8FC-AC1667EBCBE1}">
-                  <a14:hiddenEffects xmlns="" xmlns:a14="http://schemas.microsoft.com/office/drawing/2010/main">
+                  <a14:hiddenEffects xmlns:a14="http://schemas.microsoft.com/office/drawing/2010/main" xmlns="">
                     <a:effectLst>
                       <a:outerShdw dist="35921" dir="2700000" algn="ctr" rotWithShape="0">
                         <a:schemeClr val="bg2"/>
@@ -4460,12 +4460,12 @@
               <a:effectLst/>
               <a:extLst>
                 <a:ext uri="{909E8E84-426E-40dd-AFC4-6F175D3DCCD1}">
-                  <a14:hiddenFill xmlns="" xmlns:a14="http://schemas.microsoft.com/office/drawing/2010/main">
+                  <a14:hiddenFill xmlns:a14="http://schemas.microsoft.com/office/drawing/2010/main" xmlns="">
                     <a:noFill/>
                   </a14:hiddenFill>
                 </a:ext>
                 <a:ext uri="{AF507438-7753-43e0-B8FC-AC1667EBCBE1}">
-                  <a14:hiddenEffects xmlns="" xmlns:a14="http://schemas.microsoft.com/office/drawing/2010/main">
+                  <a14:hiddenEffects xmlns:a14="http://schemas.microsoft.com/office/drawing/2010/main" xmlns="">
                     <a:effectLst>
                       <a:outerShdw dist="35921" dir="2700000" algn="ctr" rotWithShape="0">
                         <a:schemeClr val="bg2"/>
@@ -4511,12 +4511,12 @@
               <a:effectLst/>
               <a:extLst>
                 <a:ext uri="{909E8E84-426E-40dd-AFC4-6F175D3DCCD1}">
-                  <a14:hiddenFill xmlns="" xmlns:a14="http://schemas.microsoft.com/office/drawing/2010/main">
+                  <a14:hiddenFill xmlns:a14="http://schemas.microsoft.com/office/drawing/2010/main" xmlns="">
                     <a:noFill/>
                   </a14:hiddenFill>
                 </a:ext>
                 <a:ext uri="{AF507438-7753-43e0-B8FC-AC1667EBCBE1}">
-                  <a14:hiddenEffects xmlns="" xmlns:a14="http://schemas.microsoft.com/office/drawing/2010/main">
+                  <a14:hiddenEffects xmlns:a14="http://schemas.microsoft.com/office/drawing/2010/main" xmlns="">
                     <a:effectLst>
                       <a:outerShdw dist="35921" dir="2700000" algn="ctr" rotWithShape="0">
                         <a:schemeClr val="bg2"/>
@@ -4562,12 +4562,12 @@
               <a:effectLst/>
               <a:extLst>
                 <a:ext uri="{909E8E84-426E-40dd-AFC4-6F175D3DCCD1}">
-                  <a14:hiddenFill xmlns="" xmlns:a14="http://schemas.microsoft.com/office/drawing/2010/main">
+                  <a14:hiddenFill xmlns:a14="http://schemas.microsoft.com/office/drawing/2010/main" xmlns="">
                     <a:noFill/>
                   </a14:hiddenFill>
                 </a:ext>
                 <a:ext uri="{AF507438-7753-43e0-B8FC-AC1667EBCBE1}">
-                  <a14:hiddenEffects xmlns="" xmlns:a14="http://schemas.microsoft.com/office/drawing/2010/main">
+                  <a14:hiddenEffects xmlns:a14="http://schemas.microsoft.com/office/drawing/2010/main" xmlns="">
                     <a:effectLst>
                       <a:outerShdw dist="35921" dir="2700000" algn="ctr" rotWithShape="0">
                         <a:schemeClr val="bg2"/>
@@ -4613,12 +4613,12 @@
               <a:effectLst/>
               <a:extLst>
                 <a:ext uri="{909E8E84-426E-40dd-AFC4-6F175D3DCCD1}">
-                  <a14:hiddenFill xmlns="" xmlns:a14="http://schemas.microsoft.com/office/drawing/2010/main">
+                  <a14:hiddenFill xmlns:a14="http://schemas.microsoft.com/office/drawing/2010/main" xmlns="">
                     <a:noFill/>
                   </a14:hiddenFill>
                 </a:ext>
                 <a:ext uri="{AF507438-7753-43e0-B8FC-AC1667EBCBE1}">
-                  <a14:hiddenEffects xmlns="" xmlns:a14="http://schemas.microsoft.com/office/drawing/2010/main">
+                  <a14:hiddenEffects xmlns:a14="http://schemas.microsoft.com/office/drawing/2010/main" xmlns="">
                     <a:effectLst>
                       <a:outerShdw dist="35921" dir="2700000" algn="ctr" rotWithShape="0">
                         <a:schemeClr val="bg2"/>
@@ -4665,12 +4665,12 @@
             <a:effectLst/>
             <a:extLst>
               <a:ext uri="{909E8E84-426E-40dd-AFC4-6F175D3DCCD1}">
-                <a14:hiddenFill xmlns="" xmlns:a14="http://schemas.microsoft.com/office/drawing/2010/main">
+                <a14:hiddenFill xmlns:a14="http://schemas.microsoft.com/office/drawing/2010/main" xmlns="">
                   <a:noFill/>
                 </a14:hiddenFill>
               </a:ext>
               <a:ext uri="{AF507438-7753-43e0-B8FC-AC1667EBCBE1}">
-                <a14:hiddenEffects xmlns="" xmlns:a14="http://schemas.microsoft.com/office/drawing/2010/main">
+                <a14:hiddenEffects xmlns:a14="http://schemas.microsoft.com/office/drawing/2010/main" xmlns="">
                   <a:effectLst>
                     <a:outerShdw dist="35921" dir="2700000" algn="ctr" rotWithShape="0">
                       <a:schemeClr val="bg2"/>
@@ -4716,12 +4716,12 @@
             <a:effectLst/>
             <a:extLst>
               <a:ext uri="{909E8E84-426E-40dd-AFC4-6F175D3DCCD1}">
-                <a14:hiddenFill xmlns="" xmlns:a14="http://schemas.microsoft.com/office/drawing/2010/main">
+                <a14:hiddenFill xmlns:a14="http://schemas.microsoft.com/office/drawing/2010/main" xmlns="">
                   <a:noFill/>
                 </a14:hiddenFill>
               </a:ext>
               <a:ext uri="{AF507438-7753-43e0-B8FC-AC1667EBCBE1}">
-                <a14:hiddenEffects xmlns="" xmlns:a14="http://schemas.microsoft.com/office/drawing/2010/main">
+                <a14:hiddenEffects xmlns:a14="http://schemas.microsoft.com/office/drawing/2010/main" xmlns="">
                   <a:effectLst>
                     <a:outerShdw dist="35921" dir="2700000" algn="ctr" rotWithShape="0">
                       <a:schemeClr val="bg2"/>
@@ -4833,14 +4833,14 @@
               <a:effectLst/>
               <a:extLst>
                 <a:ext uri="{909E8E84-426E-40dd-AFC4-6F175D3DCCD1}">
-                  <a14:hiddenFill xmlns="" xmlns:a14="http://schemas.microsoft.com/office/drawing/2010/main">
+                  <a14:hiddenFill xmlns:a14="http://schemas.microsoft.com/office/drawing/2010/main" xmlns="">
                     <a:solidFill>
                       <a:srgbClr val="FFFF00"/>
                     </a:solidFill>
                   </a14:hiddenFill>
                 </a:ext>
                 <a:ext uri="{AF507438-7753-43e0-B8FC-AC1667EBCBE1}">
-                  <a14:hiddenEffects xmlns="" xmlns:a14="http://schemas.microsoft.com/office/drawing/2010/main">
+                  <a14:hiddenEffects xmlns:a14="http://schemas.microsoft.com/office/drawing/2010/main" xmlns="">
                     <a:effectLst>
                       <a:outerShdw dist="35921" dir="2700000" algn="ctr" rotWithShape="0">
                         <a:schemeClr val="bg2"/>
@@ -4936,14 +4936,14 @@
               <a:effectLst/>
               <a:extLst>
                 <a:ext uri="{909E8E84-426E-40dd-AFC4-6F175D3DCCD1}">
-                  <a14:hiddenFill xmlns="" xmlns:a14="http://schemas.microsoft.com/office/drawing/2010/main">
+                  <a14:hiddenFill xmlns:a14="http://schemas.microsoft.com/office/drawing/2010/main" xmlns="">
                     <a:solidFill>
                       <a:srgbClr val="FFFF00"/>
                     </a:solidFill>
                   </a14:hiddenFill>
                 </a:ext>
                 <a:ext uri="{AF507438-7753-43e0-B8FC-AC1667EBCBE1}">
-                  <a14:hiddenEffects xmlns="" xmlns:a14="http://schemas.microsoft.com/office/drawing/2010/main">
+                  <a14:hiddenEffects xmlns:a14="http://schemas.microsoft.com/office/drawing/2010/main" xmlns="">
                     <a:effectLst>
                       <a:outerShdw dist="35921" dir="2700000" algn="ctr" rotWithShape="0">
                         <a:schemeClr val="bg2"/>
@@ -4990,12 +4990,12 @@
             <a:effectLst/>
             <a:extLst>
               <a:ext uri="{909E8E84-426E-40dd-AFC4-6F175D3DCCD1}">
-                <a14:hiddenFill xmlns="" xmlns:a14="http://schemas.microsoft.com/office/drawing/2010/main">
+                <a14:hiddenFill xmlns:a14="http://schemas.microsoft.com/office/drawing/2010/main" xmlns="">
                   <a:noFill/>
                 </a14:hiddenFill>
               </a:ext>
               <a:ext uri="{AF507438-7753-43e0-B8FC-AC1667EBCBE1}">
-                <a14:hiddenEffects xmlns="" xmlns:a14="http://schemas.microsoft.com/office/drawing/2010/main">
+                <a14:hiddenEffects xmlns:a14="http://schemas.microsoft.com/office/drawing/2010/main" xmlns="">
                   <a:effectLst>
                     <a:outerShdw dist="35921" dir="2700000" algn="ctr" rotWithShape="0">
                       <a:schemeClr val="bg2"/>
@@ -5041,12 +5041,12 @@
             <a:effectLst/>
             <a:extLst>
               <a:ext uri="{909E8E84-426E-40dd-AFC4-6F175D3DCCD1}">
-                <a14:hiddenFill xmlns="" xmlns:a14="http://schemas.microsoft.com/office/drawing/2010/main">
+                <a14:hiddenFill xmlns:a14="http://schemas.microsoft.com/office/drawing/2010/main" xmlns="">
                   <a:noFill/>
                 </a14:hiddenFill>
               </a:ext>
               <a:ext uri="{AF507438-7753-43e0-B8FC-AC1667EBCBE1}">
-                <a14:hiddenEffects xmlns="" xmlns:a14="http://schemas.microsoft.com/office/drawing/2010/main">
+                <a14:hiddenEffects xmlns:a14="http://schemas.microsoft.com/office/drawing/2010/main" xmlns="">
                   <a:effectLst>
                     <a:outerShdw dist="35921" dir="2700000" algn="ctr" rotWithShape="0">
                       <a:schemeClr val="bg2"/>
@@ -5092,12 +5092,12 @@
             <a:effectLst/>
             <a:extLst>
               <a:ext uri="{909E8E84-426E-40dd-AFC4-6F175D3DCCD1}">
-                <a14:hiddenFill xmlns="" xmlns:a14="http://schemas.microsoft.com/office/drawing/2010/main">
+                <a14:hiddenFill xmlns:a14="http://schemas.microsoft.com/office/drawing/2010/main" xmlns="">
                   <a:noFill/>
                 </a14:hiddenFill>
               </a:ext>
               <a:ext uri="{AF507438-7753-43e0-B8FC-AC1667EBCBE1}">
-                <a14:hiddenEffects xmlns="" xmlns:a14="http://schemas.microsoft.com/office/drawing/2010/main">
+                <a14:hiddenEffects xmlns:a14="http://schemas.microsoft.com/office/drawing/2010/main" xmlns="">
                   <a:effectLst>
                     <a:outerShdw dist="35921" dir="2700000" algn="ctr" rotWithShape="0">
                       <a:schemeClr val="bg2"/>
@@ -5143,12 +5143,12 @@
             <a:effectLst/>
             <a:extLst>
               <a:ext uri="{909E8E84-426E-40dd-AFC4-6F175D3DCCD1}">
-                <a14:hiddenFill xmlns="" xmlns:a14="http://schemas.microsoft.com/office/drawing/2010/main">
+                <a14:hiddenFill xmlns:a14="http://schemas.microsoft.com/office/drawing/2010/main" xmlns="">
                   <a:noFill/>
                 </a14:hiddenFill>
               </a:ext>
               <a:ext uri="{AF507438-7753-43e0-B8FC-AC1667EBCBE1}">
-                <a14:hiddenEffects xmlns="" xmlns:a14="http://schemas.microsoft.com/office/drawing/2010/main">
+                <a14:hiddenEffects xmlns:a14="http://schemas.microsoft.com/office/drawing/2010/main" xmlns="">
                   <a:effectLst>
                     <a:outerShdw dist="35921" dir="2700000" algn="ctr" rotWithShape="0">
                       <a:schemeClr val="bg2"/>
@@ -5194,12 +5194,12 @@
             <a:effectLst/>
             <a:extLst>
               <a:ext uri="{909E8E84-426E-40dd-AFC4-6F175D3DCCD1}">
-                <a14:hiddenFill xmlns="" xmlns:a14="http://schemas.microsoft.com/office/drawing/2010/main">
+                <a14:hiddenFill xmlns:a14="http://schemas.microsoft.com/office/drawing/2010/main" xmlns="">
                   <a:noFill/>
                 </a14:hiddenFill>
               </a:ext>
               <a:ext uri="{AF507438-7753-43e0-B8FC-AC1667EBCBE1}">
-                <a14:hiddenEffects xmlns="" xmlns:a14="http://schemas.microsoft.com/office/drawing/2010/main">
+                <a14:hiddenEffects xmlns:a14="http://schemas.microsoft.com/office/drawing/2010/main" xmlns="">
                   <a:effectLst>
                     <a:outerShdw dist="35921" dir="2700000" algn="ctr" rotWithShape="0">
                       <a:schemeClr val="bg2"/>
@@ -5245,12 +5245,12 @@
             <a:effectLst/>
             <a:extLst>
               <a:ext uri="{909E8E84-426E-40dd-AFC4-6F175D3DCCD1}">
-                <a14:hiddenFill xmlns="" xmlns:a14="http://schemas.microsoft.com/office/drawing/2010/main">
+                <a14:hiddenFill xmlns:a14="http://schemas.microsoft.com/office/drawing/2010/main" xmlns="">
                   <a:noFill/>
                 </a14:hiddenFill>
               </a:ext>
               <a:ext uri="{AF507438-7753-43e0-B8FC-AC1667EBCBE1}">
-                <a14:hiddenEffects xmlns="" xmlns:a14="http://schemas.microsoft.com/office/drawing/2010/main">
+                <a14:hiddenEffects xmlns:a14="http://schemas.microsoft.com/office/drawing/2010/main" xmlns="">
                   <a:effectLst>
                     <a:outerShdw dist="35921" dir="2700000" algn="ctr" rotWithShape="0">
                       <a:schemeClr val="bg2"/>
@@ -5362,14 +5362,14 @@
               <a:effectLst/>
               <a:extLst>
                 <a:ext uri="{909E8E84-426E-40dd-AFC4-6F175D3DCCD1}">
-                  <a14:hiddenFill xmlns="" xmlns:a14="http://schemas.microsoft.com/office/drawing/2010/main">
+                  <a14:hiddenFill xmlns:a14="http://schemas.microsoft.com/office/drawing/2010/main" xmlns="">
                     <a:solidFill>
                       <a:srgbClr val="FFFF00"/>
                     </a:solidFill>
                   </a14:hiddenFill>
                 </a:ext>
                 <a:ext uri="{AF507438-7753-43e0-B8FC-AC1667EBCBE1}">
-                  <a14:hiddenEffects xmlns="" xmlns:a14="http://schemas.microsoft.com/office/drawing/2010/main">
+                  <a14:hiddenEffects xmlns:a14="http://schemas.microsoft.com/office/drawing/2010/main" xmlns="">
                     <a:effectLst>
                       <a:outerShdw dist="35921" dir="2700000" algn="ctr" rotWithShape="0">
                         <a:schemeClr val="bg2"/>
@@ -5465,14 +5465,14 @@
               <a:effectLst/>
               <a:extLst>
                 <a:ext uri="{909E8E84-426E-40dd-AFC4-6F175D3DCCD1}">
-                  <a14:hiddenFill xmlns="" xmlns:a14="http://schemas.microsoft.com/office/drawing/2010/main">
+                  <a14:hiddenFill xmlns:a14="http://schemas.microsoft.com/office/drawing/2010/main" xmlns="">
                     <a:solidFill>
                       <a:srgbClr val="FFFF00"/>
                     </a:solidFill>
                   </a14:hiddenFill>
                 </a:ext>
                 <a:ext uri="{AF507438-7753-43e0-B8FC-AC1667EBCBE1}">
-                  <a14:hiddenEffects xmlns="" xmlns:a14="http://schemas.microsoft.com/office/drawing/2010/main">
+                  <a14:hiddenEffects xmlns:a14="http://schemas.microsoft.com/office/drawing/2010/main" xmlns="">
                     <a:effectLst>
                       <a:outerShdw dist="35921" dir="2700000" algn="ctr" rotWithShape="0">
                         <a:schemeClr val="bg2"/>
@@ -5519,12 +5519,12 @@
             <a:effectLst/>
             <a:extLst>
               <a:ext uri="{909E8E84-426E-40dd-AFC4-6F175D3DCCD1}">
-                <a14:hiddenFill xmlns="" xmlns:a14="http://schemas.microsoft.com/office/drawing/2010/main">
+                <a14:hiddenFill xmlns:a14="http://schemas.microsoft.com/office/drawing/2010/main" xmlns="">
                   <a:noFill/>
                 </a14:hiddenFill>
               </a:ext>
               <a:ext uri="{AF507438-7753-43e0-B8FC-AC1667EBCBE1}">
-                <a14:hiddenEffects xmlns="" xmlns:a14="http://schemas.microsoft.com/office/drawing/2010/main">
+                <a14:hiddenEffects xmlns:a14="http://schemas.microsoft.com/office/drawing/2010/main" xmlns="">
                   <a:effectLst>
                     <a:outerShdw dist="35921" dir="2700000" algn="ctr" rotWithShape="0">
                       <a:schemeClr val="bg2"/>
@@ -5636,14 +5636,14 @@
               <a:effectLst/>
               <a:extLst>
                 <a:ext uri="{909E8E84-426E-40dd-AFC4-6F175D3DCCD1}">
-                  <a14:hiddenFill xmlns="" xmlns:a14="http://schemas.microsoft.com/office/drawing/2010/main">
+                  <a14:hiddenFill xmlns:a14="http://schemas.microsoft.com/office/drawing/2010/main" xmlns="">
                     <a:solidFill>
                       <a:srgbClr val="FFFF00"/>
                     </a:solidFill>
                   </a14:hiddenFill>
                 </a:ext>
                 <a:ext uri="{AF507438-7753-43e0-B8FC-AC1667EBCBE1}">
-                  <a14:hiddenEffects xmlns="" xmlns:a14="http://schemas.microsoft.com/office/drawing/2010/main">
+                  <a14:hiddenEffects xmlns:a14="http://schemas.microsoft.com/office/drawing/2010/main" xmlns="">
                     <a:effectLst>
                       <a:outerShdw dist="35921" dir="2700000" algn="ctr" rotWithShape="0">
                         <a:schemeClr val="bg2"/>
@@ -5739,14 +5739,14 @@
               <a:effectLst/>
               <a:extLst>
                 <a:ext uri="{909E8E84-426E-40dd-AFC4-6F175D3DCCD1}">
-                  <a14:hiddenFill xmlns="" xmlns:a14="http://schemas.microsoft.com/office/drawing/2010/main">
+                  <a14:hiddenFill xmlns:a14="http://schemas.microsoft.com/office/drawing/2010/main" xmlns="">
                     <a:solidFill>
                       <a:srgbClr val="FFFF00"/>
                     </a:solidFill>
                   </a14:hiddenFill>
                 </a:ext>
                 <a:ext uri="{AF507438-7753-43e0-B8FC-AC1667EBCBE1}">
-                  <a14:hiddenEffects xmlns="" xmlns:a14="http://schemas.microsoft.com/office/drawing/2010/main">
+                  <a14:hiddenEffects xmlns:a14="http://schemas.microsoft.com/office/drawing/2010/main" xmlns="">
                     <a:effectLst>
                       <a:outerShdw dist="35921" dir="2700000" algn="ctr" rotWithShape="0">
                         <a:schemeClr val="bg2"/>
@@ -6009,12 +6009,12 @@
             <a:effectLst/>
             <a:extLst>
               <a:ext uri="{909E8E84-426E-40dd-AFC4-6F175D3DCCD1}">
-                <a14:hiddenFill xmlns="" xmlns:a14="http://schemas.microsoft.com/office/drawing/2010/main">
+                <a14:hiddenFill xmlns:a14="http://schemas.microsoft.com/office/drawing/2010/main" xmlns="">
                   <a:noFill/>
                 </a14:hiddenFill>
               </a:ext>
               <a:ext uri="{AF507438-7753-43e0-B8FC-AC1667EBCBE1}">
-                <a14:hiddenEffects xmlns="" xmlns:a14="http://schemas.microsoft.com/office/drawing/2010/main">
+                <a14:hiddenEffects xmlns:a14="http://schemas.microsoft.com/office/drawing/2010/main" xmlns="">
                   <a:effectLst>
                     <a:outerShdw dist="35921" dir="2700000" algn="ctr" rotWithShape="0">
                       <a:schemeClr val="bg2"/>
@@ -6060,12 +6060,12 @@
             <a:effectLst/>
             <a:extLst>
               <a:ext uri="{909E8E84-426E-40dd-AFC4-6F175D3DCCD1}">
-                <a14:hiddenFill xmlns="" xmlns:a14="http://schemas.microsoft.com/office/drawing/2010/main">
+                <a14:hiddenFill xmlns:a14="http://schemas.microsoft.com/office/drawing/2010/main" xmlns="">
                   <a:noFill/>
                 </a14:hiddenFill>
               </a:ext>
               <a:ext uri="{AF507438-7753-43e0-B8FC-AC1667EBCBE1}">
-                <a14:hiddenEffects xmlns="" xmlns:a14="http://schemas.microsoft.com/office/drawing/2010/main">
+                <a14:hiddenEffects xmlns:a14="http://schemas.microsoft.com/office/drawing/2010/main" xmlns="">
                   <a:effectLst>
                     <a:outerShdw dist="35921" dir="2700000" algn="ctr" rotWithShape="0">
                       <a:schemeClr val="bg2"/>
@@ -6111,12 +6111,12 @@
             <a:effectLst/>
             <a:extLst>
               <a:ext uri="{909E8E84-426E-40dd-AFC4-6F175D3DCCD1}">
-                <a14:hiddenFill xmlns="" xmlns:a14="http://schemas.microsoft.com/office/drawing/2010/main">
+                <a14:hiddenFill xmlns:a14="http://schemas.microsoft.com/office/drawing/2010/main" xmlns="">
                   <a:noFill/>
                 </a14:hiddenFill>
               </a:ext>
               <a:ext uri="{AF507438-7753-43e0-B8FC-AC1667EBCBE1}">
-                <a14:hiddenEffects xmlns="" xmlns:a14="http://schemas.microsoft.com/office/drawing/2010/main">
+                <a14:hiddenEffects xmlns:a14="http://schemas.microsoft.com/office/drawing/2010/main" xmlns="">
                   <a:effectLst>
                     <a:outerShdw dist="35921" dir="2700000" algn="ctr" rotWithShape="0">
                       <a:schemeClr val="bg2"/>
@@ -6162,12 +6162,12 @@
             <a:effectLst/>
             <a:extLst>
               <a:ext uri="{909E8E84-426E-40dd-AFC4-6F175D3DCCD1}">
-                <a14:hiddenFill xmlns="" xmlns:a14="http://schemas.microsoft.com/office/drawing/2010/main">
+                <a14:hiddenFill xmlns:a14="http://schemas.microsoft.com/office/drawing/2010/main" xmlns="">
                   <a:noFill/>
                 </a14:hiddenFill>
               </a:ext>
               <a:ext uri="{AF507438-7753-43e0-B8FC-AC1667EBCBE1}">
-                <a14:hiddenEffects xmlns="" xmlns:a14="http://schemas.microsoft.com/office/drawing/2010/main">
+                <a14:hiddenEffects xmlns:a14="http://schemas.microsoft.com/office/drawing/2010/main" xmlns="">
                   <a:effectLst>
                     <a:outerShdw dist="35921" dir="2700000" algn="ctr" rotWithShape="0">
                       <a:schemeClr val="bg2"/>
@@ -6279,14 +6279,14 @@
               <a:effectLst/>
               <a:extLst>
                 <a:ext uri="{909E8E84-426E-40dd-AFC4-6F175D3DCCD1}">
-                  <a14:hiddenFill xmlns="" xmlns:a14="http://schemas.microsoft.com/office/drawing/2010/main">
+                  <a14:hiddenFill xmlns:a14="http://schemas.microsoft.com/office/drawing/2010/main" xmlns="">
                     <a:solidFill>
                       <a:srgbClr val="FFFF00"/>
                     </a:solidFill>
                   </a14:hiddenFill>
                 </a:ext>
                 <a:ext uri="{AF507438-7753-43e0-B8FC-AC1667EBCBE1}">
-                  <a14:hiddenEffects xmlns="" xmlns:a14="http://schemas.microsoft.com/office/drawing/2010/main">
+                  <a14:hiddenEffects xmlns:a14="http://schemas.microsoft.com/office/drawing/2010/main" xmlns="">
                     <a:effectLst>
                       <a:outerShdw dist="35921" dir="2700000" algn="ctr" rotWithShape="0">
                         <a:schemeClr val="bg2"/>
@@ -6382,14 +6382,14 @@
               <a:effectLst/>
               <a:extLst>
                 <a:ext uri="{909E8E84-426E-40dd-AFC4-6F175D3DCCD1}">
-                  <a14:hiddenFill xmlns="" xmlns:a14="http://schemas.microsoft.com/office/drawing/2010/main">
+                  <a14:hiddenFill xmlns:a14="http://schemas.microsoft.com/office/drawing/2010/main" xmlns="">
                     <a:solidFill>
                       <a:srgbClr val="FFFF00"/>
                     </a:solidFill>
                   </a14:hiddenFill>
                 </a:ext>
                 <a:ext uri="{AF507438-7753-43e0-B8FC-AC1667EBCBE1}">
-                  <a14:hiddenEffects xmlns="" xmlns:a14="http://schemas.microsoft.com/office/drawing/2010/main">
+                  <a14:hiddenEffects xmlns:a14="http://schemas.microsoft.com/office/drawing/2010/main" xmlns="">
                     <a:effectLst>
                       <a:outerShdw dist="35921" dir="2700000" algn="ctr" rotWithShape="0">
                         <a:schemeClr val="bg2"/>
@@ -6436,12 +6436,12 @@
             <a:effectLst/>
             <a:extLst>
               <a:ext uri="{909E8E84-426E-40dd-AFC4-6F175D3DCCD1}">
-                <a14:hiddenFill xmlns="" xmlns:a14="http://schemas.microsoft.com/office/drawing/2010/main">
+                <a14:hiddenFill xmlns:a14="http://schemas.microsoft.com/office/drawing/2010/main" xmlns="">
                   <a:noFill/>
                 </a14:hiddenFill>
               </a:ext>
               <a:ext uri="{AF507438-7753-43e0-B8FC-AC1667EBCBE1}">
-                <a14:hiddenEffects xmlns="" xmlns:a14="http://schemas.microsoft.com/office/drawing/2010/main">
+                <a14:hiddenEffects xmlns:a14="http://schemas.microsoft.com/office/drawing/2010/main" xmlns="">
                   <a:effectLst>
                     <a:outerShdw dist="35921" dir="2700000" algn="ctr" rotWithShape="0">
                       <a:schemeClr val="bg2"/>
@@ -6487,12 +6487,12 @@
             <a:effectLst/>
             <a:extLst>
               <a:ext uri="{909E8E84-426E-40dd-AFC4-6F175D3DCCD1}">
-                <a14:hiddenFill xmlns="" xmlns:a14="http://schemas.microsoft.com/office/drawing/2010/main">
+                <a14:hiddenFill xmlns:a14="http://schemas.microsoft.com/office/drawing/2010/main" xmlns="">
                   <a:noFill/>
                 </a14:hiddenFill>
               </a:ext>
               <a:ext uri="{AF507438-7753-43e0-B8FC-AC1667EBCBE1}">
-                <a14:hiddenEffects xmlns="" xmlns:a14="http://schemas.microsoft.com/office/drawing/2010/main">
+                <a14:hiddenEffects xmlns:a14="http://schemas.microsoft.com/office/drawing/2010/main" xmlns="">
                   <a:effectLst>
                     <a:outerShdw dist="35921" dir="2700000" algn="ctr" rotWithShape="0">
                       <a:schemeClr val="bg2"/>
@@ -6538,12 +6538,12 @@
             <a:effectLst/>
             <a:extLst>
               <a:ext uri="{909E8E84-426E-40dd-AFC4-6F175D3DCCD1}">
-                <a14:hiddenFill xmlns="" xmlns:a14="http://schemas.microsoft.com/office/drawing/2010/main">
+                <a14:hiddenFill xmlns:a14="http://schemas.microsoft.com/office/drawing/2010/main" xmlns="">
                   <a:noFill/>
                 </a14:hiddenFill>
               </a:ext>
               <a:ext uri="{AF507438-7753-43e0-B8FC-AC1667EBCBE1}">
-                <a14:hiddenEffects xmlns="" xmlns:a14="http://schemas.microsoft.com/office/drawing/2010/main">
+                <a14:hiddenEffects xmlns:a14="http://schemas.microsoft.com/office/drawing/2010/main" xmlns="">
                   <a:effectLst>
                     <a:outerShdw dist="35921" dir="2700000" algn="ctr" rotWithShape="0">
                       <a:schemeClr val="bg2"/>
@@ -6589,12 +6589,12 @@
             <a:effectLst/>
             <a:extLst>
               <a:ext uri="{909E8E84-426E-40dd-AFC4-6F175D3DCCD1}">
-                <a14:hiddenFill xmlns="" xmlns:a14="http://schemas.microsoft.com/office/drawing/2010/main">
+                <a14:hiddenFill xmlns:a14="http://schemas.microsoft.com/office/drawing/2010/main" xmlns="">
                   <a:noFill/>
                 </a14:hiddenFill>
               </a:ext>
               <a:ext uri="{AF507438-7753-43e0-B8FC-AC1667EBCBE1}">
-                <a14:hiddenEffects xmlns="" xmlns:a14="http://schemas.microsoft.com/office/drawing/2010/main">
+                <a14:hiddenEffects xmlns:a14="http://schemas.microsoft.com/office/drawing/2010/main" xmlns="">
                   <a:effectLst>
                     <a:outerShdw dist="35921" dir="2700000" algn="ctr" rotWithShape="0">
                       <a:schemeClr val="bg2"/>
@@ -6640,12 +6640,12 @@
             <a:effectLst/>
             <a:extLst>
               <a:ext uri="{909E8E84-426E-40dd-AFC4-6F175D3DCCD1}">
-                <a14:hiddenFill xmlns="" xmlns:a14="http://schemas.microsoft.com/office/drawing/2010/main">
+                <a14:hiddenFill xmlns:a14="http://schemas.microsoft.com/office/drawing/2010/main" xmlns="">
                   <a:noFill/>
                 </a14:hiddenFill>
               </a:ext>
               <a:ext uri="{AF507438-7753-43e0-B8FC-AC1667EBCBE1}">
-                <a14:hiddenEffects xmlns="" xmlns:a14="http://schemas.microsoft.com/office/drawing/2010/main">
+                <a14:hiddenEffects xmlns:a14="http://schemas.microsoft.com/office/drawing/2010/main" xmlns="">
                   <a:effectLst>
                     <a:outerShdw dist="35921" dir="2700000" algn="ctr" rotWithShape="0">
                       <a:schemeClr val="bg2"/>
@@ -6691,12 +6691,12 @@
             <a:effectLst/>
             <a:extLst>
               <a:ext uri="{909E8E84-426E-40dd-AFC4-6F175D3DCCD1}">
-                <a14:hiddenFill xmlns="" xmlns:a14="http://schemas.microsoft.com/office/drawing/2010/main">
+                <a14:hiddenFill xmlns:a14="http://schemas.microsoft.com/office/drawing/2010/main" xmlns="">
                   <a:noFill/>
                 </a14:hiddenFill>
               </a:ext>
               <a:ext uri="{AF507438-7753-43e0-B8FC-AC1667EBCBE1}">
-                <a14:hiddenEffects xmlns="" xmlns:a14="http://schemas.microsoft.com/office/drawing/2010/main">
+                <a14:hiddenEffects xmlns:a14="http://schemas.microsoft.com/office/drawing/2010/main" xmlns="">
                   <a:effectLst>
                     <a:outerShdw dist="35921" dir="2700000" algn="ctr" rotWithShape="0">
                       <a:schemeClr val="bg2"/>
@@ -6742,12 +6742,12 @@
             <a:effectLst/>
             <a:extLst>
               <a:ext uri="{909E8E84-426E-40dd-AFC4-6F175D3DCCD1}">
-                <a14:hiddenFill xmlns="" xmlns:a14="http://schemas.microsoft.com/office/drawing/2010/main">
+                <a14:hiddenFill xmlns:a14="http://schemas.microsoft.com/office/drawing/2010/main" xmlns="">
                   <a:noFill/>
                 </a14:hiddenFill>
               </a:ext>
               <a:ext uri="{AF507438-7753-43e0-B8FC-AC1667EBCBE1}">
-                <a14:hiddenEffects xmlns="" xmlns:a14="http://schemas.microsoft.com/office/drawing/2010/main">
+                <a14:hiddenEffects xmlns:a14="http://schemas.microsoft.com/office/drawing/2010/main" xmlns="">
                   <a:effectLst>
                     <a:outerShdw dist="35921" dir="2700000" algn="ctr" rotWithShape="0">
                       <a:schemeClr val="bg2"/>
@@ -6793,12 +6793,12 @@
             <a:effectLst/>
             <a:extLst>
               <a:ext uri="{909E8E84-426E-40dd-AFC4-6F175D3DCCD1}">
-                <a14:hiddenFill xmlns="" xmlns:a14="http://schemas.microsoft.com/office/drawing/2010/main">
+                <a14:hiddenFill xmlns:a14="http://schemas.microsoft.com/office/drawing/2010/main" xmlns="">
                   <a:noFill/>
                 </a14:hiddenFill>
               </a:ext>
               <a:ext uri="{AF507438-7753-43e0-B8FC-AC1667EBCBE1}">
-                <a14:hiddenEffects xmlns="" xmlns:a14="http://schemas.microsoft.com/office/drawing/2010/main">
+                <a14:hiddenEffects xmlns:a14="http://schemas.microsoft.com/office/drawing/2010/main" xmlns="">
                   <a:effectLst>
                     <a:outerShdw dist="35921" dir="2700000" algn="ctr" rotWithShape="0">
                       <a:schemeClr val="bg2"/>
@@ -6844,12 +6844,12 @@
             <a:effectLst/>
             <a:extLst>
               <a:ext uri="{909E8E84-426E-40dd-AFC4-6F175D3DCCD1}">
-                <a14:hiddenFill xmlns="" xmlns:a14="http://schemas.microsoft.com/office/drawing/2010/main">
+                <a14:hiddenFill xmlns:a14="http://schemas.microsoft.com/office/drawing/2010/main" xmlns="">
                   <a:noFill/>
                 </a14:hiddenFill>
               </a:ext>
               <a:ext uri="{AF507438-7753-43e0-B8FC-AC1667EBCBE1}">
-                <a14:hiddenEffects xmlns="" xmlns:a14="http://schemas.microsoft.com/office/drawing/2010/main">
+                <a14:hiddenEffects xmlns:a14="http://schemas.microsoft.com/office/drawing/2010/main" xmlns="">
                   <a:effectLst>
                     <a:outerShdw dist="35921" dir="2700000" algn="ctr" rotWithShape="0">
                       <a:schemeClr val="bg2"/>
@@ -6895,12 +6895,12 @@
             <a:effectLst/>
             <a:extLst>
               <a:ext uri="{909E8E84-426E-40dd-AFC4-6F175D3DCCD1}">
-                <a14:hiddenFill xmlns="" xmlns:a14="http://schemas.microsoft.com/office/drawing/2010/main">
+                <a14:hiddenFill xmlns:a14="http://schemas.microsoft.com/office/drawing/2010/main" xmlns="">
                   <a:noFill/>
                 </a14:hiddenFill>
               </a:ext>
               <a:ext uri="{AF507438-7753-43e0-B8FC-AC1667EBCBE1}">
-                <a14:hiddenEffects xmlns="" xmlns:a14="http://schemas.microsoft.com/office/drawing/2010/main">
+                <a14:hiddenEffects xmlns:a14="http://schemas.microsoft.com/office/drawing/2010/main" xmlns="">
                   <a:effectLst>
                     <a:outerShdw dist="35921" dir="2700000" algn="ctr" rotWithShape="0">
                       <a:schemeClr val="bg2"/>
@@ -6946,12 +6946,12 @@
             <a:effectLst/>
             <a:extLst>
               <a:ext uri="{909E8E84-426E-40dd-AFC4-6F175D3DCCD1}">
-                <a14:hiddenFill xmlns="" xmlns:a14="http://schemas.microsoft.com/office/drawing/2010/main">
+                <a14:hiddenFill xmlns:a14="http://schemas.microsoft.com/office/drawing/2010/main" xmlns="">
                   <a:noFill/>
                 </a14:hiddenFill>
               </a:ext>
               <a:ext uri="{AF507438-7753-43e0-B8FC-AC1667EBCBE1}">
-                <a14:hiddenEffects xmlns="" xmlns:a14="http://schemas.microsoft.com/office/drawing/2010/main">
+                <a14:hiddenEffects xmlns:a14="http://schemas.microsoft.com/office/drawing/2010/main" xmlns="">
                   <a:effectLst>
                     <a:outerShdw dist="35921" dir="2700000" algn="ctr" rotWithShape="0">
                       <a:schemeClr val="bg2"/>
@@ -6997,12 +6997,12 @@
             <a:effectLst/>
             <a:extLst>
               <a:ext uri="{909E8E84-426E-40dd-AFC4-6F175D3DCCD1}">
-                <a14:hiddenFill xmlns="" xmlns:a14="http://schemas.microsoft.com/office/drawing/2010/main">
+                <a14:hiddenFill xmlns:a14="http://schemas.microsoft.com/office/drawing/2010/main" xmlns="">
                   <a:noFill/>
                 </a14:hiddenFill>
               </a:ext>
               <a:ext uri="{AF507438-7753-43e0-B8FC-AC1667EBCBE1}">
-                <a14:hiddenEffects xmlns="" xmlns:a14="http://schemas.microsoft.com/office/drawing/2010/main">
+                <a14:hiddenEffects xmlns:a14="http://schemas.microsoft.com/office/drawing/2010/main" xmlns="">
                   <a:effectLst>
                     <a:outerShdw dist="35921" dir="2700000" algn="ctr" rotWithShape="0">
                       <a:schemeClr val="bg2"/>
@@ -7114,14 +7114,14 @@
               <a:effectLst/>
               <a:extLst>
                 <a:ext uri="{909E8E84-426E-40dd-AFC4-6F175D3DCCD1}">
-                  <a14:hiddenFill xmlns="" xmlns:a14="http://schemas.microsoft.com/office/drawing/2010/main">
+                  <a14:hiddenFill xmlns:a14="http://schemas.microsoft.com/office/drawing/2010/main" xmlns="">
                     <a:solidFill>
                       <a:srgbClr val="FFFF00"/>
                     </a:solidFill>
                   </a14:hiddenFill>
                 </a:ext>
                 <a:ext uri="{AF507438-7753-43e0-B8FC-AC1667EBCBE1}">
-                  <a14:hiddenEffects xmlns="" xmlns:a14="http://schemas.microsoft.com/office/drawing/2010/main">
+                  <a14:hiddenEffects xmlns:a14="http://schemas.microsoft.com/office/drawing/2010/main" xmlns="">
                     <a:effectLst>
                       <a:outerShdw dist="35921" dir="2700000" algn="ctr" rotWithShape="0">
                         <a:schemeClr val="bg2"/>
@@ -7217,14 +7217,14 @@
               <a:effectLst/>
               <a:extLst>
                 <a:ext uri="{909E8E84-426E-40dd-AFC4-6F175D3DCCD1}">
-                  <a14:hiddenFill xmlns="" xmlns:a14="http://schemas.microsoft.com/office/drawing/2010/main">
+                  <a14:hiddenFill xmlns:a14="http://schemas.microsoft.com/office/drawing/2010/main" xmlns="">
                     <a:solidFill>
                       <a:srgbClr val="FFFF00"/>
                     </a:solidFill>
                   </a14:hiddenFill>
                 </a:ext>
                 <a:ext uri="{AF507438-7753-43e0-B8FC-AC1667EBCBE1}">
-                  <a14:hiddenEffects xmlns="" xmlns:a14="http://schemas.microsoft.com/office/drawing/2010/main">
+                  <a14:hiddenEffects xmlns:a14="http://schemas.microsoft.com/office/drawing/2010/main" xmlns="">
                     <a:effectLst>
                       <a:outerShdw dist="35921" dir="2700000" algn="ctr" rotWithShape="0">
                         <a:schemeClr val="bg2"/>
@@ -7271,12 +7271,12 @@
             <a:effectLst/>
             <a:extLst>
               <a:ext uri="{909E8E84-426E-40dd-AFC4-6F175D3DCCD1}">
-                <a14:hiddenFill xmlns="" xmlns:a14="http://schemas.microsoft.com/office/drawing/2010/main">
+                <a14:hiddenFill xmlns:a14="http://schemas.microsoft.com/office/drawing/2010/main" xmlns="">
                   <a:noFill/>
                 </a14:hiddenFill>
               </a:ext>
               <a:ext uri="{AF507438-7753-43e0-B8FC-AC1667EBCBE1}">
-                <a14:hiddenEffects xmlns="" xmlns:a14="http://schemas.microsoft.com/office/drawing/2010/main">
+                <a14:hiddenEffects xmlns:a14="http://schemas.microsoft.com/office/drawing/2010/main" xmlns="">
                   <a:effectLst>
                     <a:outerShdw dist="35921" dir="2700000" algn="ctr" rotWithShape="0">
                       <a:schemeClr val="bg2"/>
@@ -7322,12 +7322,12 @@
             <a:effectLst/>
             <a:extLst>
               <a:ext uri="{909E8E84-426E-40dd-AFC4-6F175D3DCCD1}">
-                <a14:hiddenFill xmlns="" xmlns:a14="http://schemas.microsoft.com/office/drawing/2010/main">
+                <a14:hiddenFill xmlns:a14="http://schemas.microsoft.com/office/drawing/2010/main" xmlns="">
                   <a:noFill/>
                 </a14:hiddenFill>
               </a:ext>
               <a:ext uri="{AF507438-7753-43e0-B8FC-AC1667EBCBE1}">
-                <a14:hiddenEffects xmlns="" xmlns:a14="http://schemas.microsoft.com/office/drawing/2010/main">
+                <a14:hiddenEffects xmlns:a14="http://schemas.microsoft.com/office/drawing/2010/main" xmlns="">
                   <a:effectLst>
                     <a:outerShdw dist="35921" dir="2700000" algn="ctr" rotWithShape="0">
                       <a:schemeClr val="bg2"/>
@@ -7373,12 +7373,12 @@
             <a:effectLst/>
             <a:extLst>
               <a:ext uri="{909E8E84-426E-40dd-AFC4-6F175D3DCCD1}">
-                <a14:hiddenFill xmlns="" xmlns:a14="http://schemas.microsoft.com/office/drawing/2010/main">
+                <a14:hiddenFill xmlns:a14="http://schemas.microsoft.com/office/drawing/2010/main" xmlns="">
                   <a:noFill/>
                 </a14:hiddenFill>
               </a:ext>
               <a:ext uri="{AF507438-7753-43e0-B8FC-AC1667EBCBE1}">
-                <a14:hiddenEffects xmlns="" xmlns:a14="http://schemas.microsoft.com/office/drawing/2010/main">
+                <a14:hiddenEffects xmlns:a14="http://schemas.microsoft.com/office/drawing/2010/main" xmlns="">
                   <a:effectLst>
                     <a:outerShdw dist="35921" dir="2700000" algn="ctr" rotWithShape="0">
                       <a:schemeClr val="bg2"/>
@@ -7424,12 +7424,12 @@
             <a:effectLst/>
             <a:extLst>
               <a:ext uri="{909E8E84-426E-40dd-AFC4-6F175D3DCCD1}">
-                <a14:hiddenFill xmlns="" xmlns:a14="http://schemas.microsoft.com/office/drawing/2010/main">
+                <a14:hiddenFill xmlns:a14="http://schemas.microsoft.com/office/drawing/2010/main" xmlns="">
                   <a:noFill/>
                 </a14:hiddenFill>
               </a:ext>
               <a:ext uri="{AF507438-7753-43e0-B8FC-AC1667EBCBE1}">
-                <a14:hiddenEffects xmlns="" xmlns:a14="http://schemas.microsoft.com/office/drawing/2010/main">
+                <a14:hiddenEffects xmlns:a14="http://schemas.microsoft.com/office/drawing/2010/main" xmlns="">
                   <a:effectLst>
                     <a:outerShdw dist="35921" dir="2700000" algn="ctr" rotWithShape="0">
                       <a:schemeClr val="bg2"/>
@@ -7475,12 +7475,12 @@
             <a:effectLst/>
             <a:extLst>
               <a:ext uri="{909E8E84-426E-40dd-AFC4-6F175D3DCCD1}">
-                <a14:hiddenFill xmlns="" xmlns:a14="http://schemas.microsoft.com/office/drawing/2010/main">
+                <a14:hiddenFill xmlns:a14="http://schemas.microsoft.com/office/drawing/2010/main" xmlns="">
                   <a:noFill/>
                 </a14:hiddenFill>
               </a:ext>
               <a:ext uri="{AF507438-7753-43e0-B8FC-AC1667EBCBE1}">
-                <a14:hiddenEffects xmlns="" xmlns:a14="http://schemas.microsoft.com/office/drawing/2010/main">
+                <a14:hiddenEffects xmlns:a14="http://schemas.microsoft.com/office/drawing/2010/main" xmlns="">
                   <a:effectLst>
                     <a:outerShdw dist="35921" dir="2700000" algn="ctr" rotWithShape="0">
                       <a:schemeClr val="bg2"/>
@@ -7526,12 +7526,12 @@
             <a:effectLst/>
             <a:extLst>
               <a:ext uri="{909E8E84-426E-40dd-AFC4-6F175D3DCCD1}">
-                <a14:hiddenFill xmlns="" xmlns:a14="http://schemas.microsoft.com/office/drawing/2010/main">
+                <a14:hiddenFill xmlns:a14="http://schemas.microsoft.com/office/drawing/2010/main" xmlns="">
                   <a:noFill/>
                 </a14:hiddenFill>
               </a:ext>
               <a:ext uri="{AF507438-7753-43e0-B8FC-AC1667EBCBE1}">
-                <a14:hiddenEffects xmlns="" xmlns:a14="http://schemas.microsoft.com/office/drawing/2010/main">
+                <a14:hiddenEffects xmlns:a14="http://schemas.microsoft.com/office/drawing/2010/main" xmlns="">
                   <a:effectLst>
                     <a:outerShdw dist="35921" dir="2700000" algn="ctr" rotWithShape="0">
                       <a:schemeClr val="bg2"/>
@@ -7577,12 +7577,12 @@
             <a:effectLst/>
             <a:extLst>
               <a:ext uri="{909E8E84-426E-40dd-AFC4-6F175D3DCCD1}">
-                <a14:hiddenFill xmlns="" xmlns:a14="http://schemas.microsoft.com/office/drawing/2010/main">
+                <a14:hiddenFill xmlns:a14="http://schemas.microsoft.com/office/drawing/2010/main" xmlns="">
                   <a:noFill/>
                 </a14:hiddenFill>
               </a:ext>
               <a:ext uri="{AF507438-7753-43e0-B8FC-AC1667EBCBE1}">
-                <a14:hiddenEffects xmlns="" xmlns:a14="http://schemas.microsoft.com/office/drawing/2010/main">
+                <a14:hiddenEffects xmlns:a14="http://schemas.microsoft.com/office/drawing/2010/main" xmlns="">
                   <a:effectLst>
                     <a:outerShdw dist="35921" dir="2700000" algn="ctr" rotWithShape="0">
                       <a:schemeClr val="bg2"/>
@@ -7628,12 +7628,12 @@
             <a:effectLst/>
             <a:extLst>
               <a:ext uri="{909E8E84-426E-40dd-AFC4-6F175D3DCCD1}">
-                <a14:hiddenFill xmlns="" xmlns:a14="http://schemas.microsoft.com/office/drawing/2010/main">
+                <a14:hiddenFill xmlns:a14="http://schemas.microsoft.com/office/drawing/2010/main" xmlns="">
                   <a:noFill/>
                 </a14:hiddenFill>
               </a:ext>
               <a:ext uri="{AF507438-7753-43e0-B8FC-AC1667EBCBE1}">
-                <a14:hiddenEffects xmlns="" xmlns:a14="http://schemas.microsoft.com/office/drawing/2010/main">
+                <a14:hiddenEffects xmlns:a14="http://schemas.microsoft.com/office/drawing/2010/main" xmlns="">
                   <a:effectLst>
                     <a:outerShdw dist="35921" dir="2700000" algn="ctr" rotWithShape="0">
                       <a:schemeClr val="bg2"/>
@@ -7679,12 +7679,12 @@
             <a:effectLst/>
             <a:extLst>
               <a:ext uri="{909E8E84-426E-40dd-AFC4-6F175D3DCCD1}">
-                <a14:hiddenFill xmlns="" xmlns:a14="http://schemas.microsoft.com/office/drawing/2010/main">
+                <a14:hiddenFill xmlns:a14="http://schemas.microsoft.com/office/drawing/2010/main" xmlns="">
                   <a:noFill/>
                 </a14:hiddenFill>
               </a:ext>
               <a:ext uri="{AF507438-7753-43e0-B8FC-AC1667EBCBE1}">
-                <a14:hiddenEffects xmlns="" xmlns:a14="http://schemas.microsoft.com/office/drawing/2010/main">
+                <a14:hiddenEffects xmlns:a14="http://schemas.microsoft.com/office/drawing/2010/main" xmlns="">
                   <a:effectLst>
                     <a:outerShdw dist="35921" dir="2700000" algn="ctr" rotWithShape="0">
                       <a:schemeClr val="bg2"/>
@@ -7730,12 +7730,12 @@
             <a:effectLst/>
             <a:extLst>
               <a:ext uri="{909E8E84-426E-40dd-AFC4-6F175D3DCCD1}">
-                <a14:hiddenFill xmlns="" xmlns:a14="http://schemas.microsoft.com/office/drawing/2010/main">
+                <a14:hiddenFill xmlns:a14="http://schemas.microsoft.com/office/drawing/2010/main" xmlns="">
                   <a:noFill/>
                 </a14:hiddenFill>
               </a:ext>
               <a:ext uri="{AF507438-7753-43e0-B8FC-AC1667EBCBE1}">
-                <a14:hiddenEffects xmlns="" xmlns:a14="http://schemas.microsoft.com/office/drawing/2010/main">
+                <a14:hiddenEffects xmlns:a14="http://schemas.microsoft.com/office/drawing/2010/main" xmlns="">
                   <a:effectLst>
                     <a:outerShdw dist="35921" dir="2700000" algn="ctr" rotWithShape="0">
                       <a:schemeClr val="bg2"/>
@@ -7781,12 +7781,12 @@
             <a:effectLst/>
             <a:extLst>
               <a:ext uri="{909E8E84-426E-40dd-AFC4-6F175D3DCCD1}">
-                <a14:hiddenFill xmlns="" xmlns:a14="http://schemas.microsoft.com/office/drawing/2010/main">
+                <a14:hiddenFill xmlns:a14="http://schemas.microsoft.com/office/drawing/2010/main" xmlns="">
                   <a:noFill/>
                 </a14:hiddenFill>
               </a:ext>
               <a:ext uri="{AF507438-7753-43e0-B8FC-AC1667EBCBE1}">
-                <a14:hiddenEffects xmlns="" xmlns:a14="http://schemas.microsoft.com/office/drawing/2010/main">
+                <a14:hiddenEffects xmlns:a14="http://schemas.microsoft.com/office/drawing/2010/main" xmlns="">
                   <a:effectLst>
                     <a:outerShdw dist="35921" dir="2700000" algn="ctr" rotWithShape="0">
                       <a:schemeClr val="bg2"/>
@@ -7832,12 +7832,12 @@
             <a:effectLst/>
             <a:extLst>
               <a:ext uri="{909E8E84-426E-40dd-AFC4-6F175D3DCCD1}">
-                <a14:hiddenFill xmlns="" xmlns:a14="http://schemas.microsoft.com/office/drawing/2010/main">
+                <a14:hiddenFill xmlns:a14="http://schemas.microsoft.com/office/drawing/2010/main" xmlns="">
                   <a:noFill/>
                 </a14:hiddenFill>
               </a:ext>
               <a:ext uri="{AF507438-7753-43e0-B8FC-AC1667EBCBE1}">
-                <a14:hiddenEffects xmlns="" xmlns:a14="http://schemas.microsoft.com/office/drawing/2010/main">
+                <a14:hiddenEffects xmlns:a14="http://schemas.microsoft.com/office/drawing/2010/main" xmlns="">
                   <a:effectLst>
                     <a:outerShdw dist="35921" dir="2700000" algn="ctr" rotWithShape="0">
                       <a:schemeClr val="bg2"/>
@@ -7883,12 +7883,12 @@
             <a:effectLst/>
             <a:extLst>
               <a:ext uri="{909E8E84-426E-40dd-AFC4-6F175D3DCCD1}">
-                <a14:hiddenFill xmlns="" xmlns:a14="http://schemas.microsoft.com/office/drawing/2010/main">
+                <a14:hiddenFill xmlns:a14="http://schemas.microsoft.com/office/drawing/2010/main" xmlns="">
                   <a:noFill/>
                 </a14:hiddenFill>
               </a:ext>
               <a:ext uri="{AF507438-7753-43e0-B8FC-AC1667EBCBE1}">
-                <a14:hiddenEffects xmlns="" xmlns:a14="http://schemas.microsoft.com/office/drawing/2010/main">
+                <a14:hiddenEffects xmlns:a14="http://schemas.microsoft.com/office/drawing/2010/main" xmlns="">
                   <a:effectLst>
                     <a:outerShdw dist="35921" dir="2700000" algn="ctr" rotWithShape="0">
                       <a:schemeClr val="bg2"/>
@@ -7934,12 +7934,12 @@
             <a:effectLst/>
             <a:extLst>
               <a:ext uri="{909E8E84-426E-40dd-AFC4-6F175D3DCCD1}">
-                <a14:hiddenFill xmlns="" xmlns:a14="http://schemas.microsoft.com/office/drawing/2010/main">
+                <a14:hiddenFill xmlns:a14="http://schemas.microsoft.com/office/drawing/2010/main" xmlns="">
                   <a:noFill/>
                 </a14:hiddenFill>
               </a:ext>
               <a:ext uri="{AF507438-7753-43e0-B8FC-AC1667EBCBE1}">
-                <a14:hiddenEffects xmlns="" xmlns:a14="http://schemas.microsoft.com/office/drawing/2010/main">
+                <a14:hiddenEffects xmlns:a14="http://schemas.microsoft.com/office/drawing/2010/main" xmlns="">
                   <a:effectLst>
                     <a:outerShdw dist="35921" dir="2700000" algn="ctr" rotWithShape="0">
                       <a:schemeClr val="bg2"/>
@@ -8001,12 +8001,12 @@
               <a:effectLst/>
               <a:extLst>
                 <a:ext uri="{909E8E84-426E-40dd-AFC4-6F175D3DCCD1}">
-                  <a14:hiddenFill xmlns="" xmlns:a14="http://schemas.microsoft.com/office/drawing/2010/main">
+                  <a14:hiddenFill xmlns:a14="http://schemas.microsoft.com/office/drawing/2010/main" xmlns="">
                     <a:noFill/>
                   </a14:hiddenFill>
                 </a:ext>
                 <a:ext uri="{AF507438-7753-43e0-B8FC-AC1667EBCBE1}">
-                  <a14:hiddenEffects xmlns="" xmlns:a14="http://schemas.microsoft.com/office/drawing/2010/main">
+                  <a14:hiddenEffects xmlns:a14="http://schemas.microsoft.com/office/drawing/2010/main" xmlns="">
                     <a:effectLst>
                       <a:outerShdw dist="35921" dir="2700000" algn="ctr" rotWithShape="0">
                         <a:schemeClr val="bg2"/>
@@ -8052,12 +8052,12 @@
               <a:effectLst/>
               <a:extLst>
                 <a:ext uri="{909E8E84-426E-40dd-AFC4-6F175D3DCCD1}">
-                  <a14:hiddenFill xmlns="" xmlns:a14="http://schemas.microsoft.com/office/drawing/2010/main">
+                  <a14:hiddenFill xmlns:a14="http://schemas.microsoft.com/office/drawing/2010/main" xmlns="">
                     <a:noFill/>
                   </a14:hiddenFill>
                 </a:ext>
                 <a:ext uri="{AF507438-7753-43e0-B8FC-AC1667EBCBE1}">
-                  <a14:hiddenEffects xmlns="" xmlns:a14="http://schemas.microsoft.com/office/drawing/2010/main">
+                  <a14:hiddenEffects xmlns:a14="http://schemas.microsoft.com/office/drawing/2010/main" xmlns="">
                     <a:effectLst>
                       <a:outerShdw dist="35921" dir="2700000" algn="ctr" rotWithShape="0">
                         <a:schemeClr val="bg2"/>
@@ -8103,12 +8103,12 @@
               <a:effectLst/>
               <a:extLst>
                 <a:ext uri="{909E8E84-426E-40dd-AFC4-6F175D3DCCD1}">
-                  <a14:hiddenFill xmlns="" xmlns:a14="http://schemas.microsoft.com/office/drawing/2010/main">
+                  <a14:hiddenFill xmlns:a14="http://schemas.microsoft.com/office/drawing/2010/main" xmlns="">
                     <a:noFill/>
                   </a14:hiddenFill>
                 </a:ext>
                 <a:ext uri="{AF507438-7753-43e0-B8FC-AC1667EBCBE1}">
-                  <a14:hiddenEffects xmlns="" xmlns:a14="http://schemas.microsoft.com/office/drawing/2010/main">
+                  <a14:hiddenEffects xmlns:a14="http://schemas.microsoft.com/office/drawing/2010/main" xmlns="">
                     <a:effectLst>
                       <a:outerShdw dist="35921" dir="2700000" algn="ctr" rotWithShape="0">
                         <a:schemeClr val="bg2"/>
@@ -8154,12 +8154,12 @@
               <a:effectLst/>
               <a:extLst>
                 <a:ext uri="{909E8E84-426E-40dd-AFC4-6F175D3DCCD1}">
-                  <a14:hiddenFill xmlns="" xmlns:a14="http://schemas.microsoft.com/office/drawing/2010/main">
+                  <a14:hiddenFill xmlns:a14="http://schemas.microsoft.com/office/drawing/2010/main" xmlns="">
                     <a:noFill/>
                   </a14:hiddenFill>
                 </a:ext>
                 <a:ext uri="{AF507438-7753-43e0-B8FC-AC1667EBCBE1}">
-                  <a14:hiddenEffects xmlns="" xmlns:a14="http://schemas.microsoft.com/office/drawing/2010/main">
+                  <a14:hiddenEffects xmlns:a14="http://schemas.microsoft.com/office/drawing/2010/main" xmlns="">
                     <a:effectLst>
                       <a:outerShdw dist="35921" dir="2700000" algn="ctr" rotWithShape="0">
                         <a:schemeClr val="bg2"/>
@@ -8222,12 +8222,12 @@
               <a:effectLst/>
               <a:extLst>
                 <a:ext uri="{909E8E84-426E-40dd-AFC4-6F175D3DCCD1}">
-                  <a14:hiddenFill xmlns="" xmlns:a14="http://schemas.microsoft.com/office/drawing/2010/main">
+                  <a14:hiddenFill xmlns:a14="http://schemas.microsoft.com/office/drawing/2010/main" xmlns="">
                     <a:noFill/>
                   </a14:hiddenFill>
                 </a:ext>
                 <a:ext uri="{AF507438-7753-43e0-B8FC-AC1667EBCBE1}">
-                  <a14:hiddenEffects xmlns="" xmlns:a14="http://schemas.microsoft.com/office/drawing/2010/main">
+                  <a14:hiddenEffects xmlns:a14="http://schemas.microsoft.com/office/drawing/2010/main" xmlns="">
                     <a:effectLst>
                       <a:outerShdw dist="35921" dir="2700000" algn="ctr" rotWithShape="0">
                         <a:schemeClr val="bg2"/>
@@ -8273,12 +8273,12 @@
               <a:effectLst/>
               <a:extLst>
                 <a:ext uri="{909E8E84-426E-40dd-AFC4-6F175D3DCCD1}">
-                  <a14:hiddenFill xmlns="" xmlns:a14="http://schemas.microsoft.com/office/drawing/2010/main">
+                  <a14:hiddenFill xmlns:a14="http://schemas.microsoft.com/office/drawing/2010/main" xmlns="">
                     <a:noFill/>
                   </a14:hiddenFill>
                 </a:ext>
                 <a:ext uri="{AF507438-7753-43e0-B8FC-AC1667EBCBE1}">
-                  <a14:hiddenEffects xmlns="" xmlns:a14="http://schemas.microsoft.com/office/drawing/2010/main">
+                  <a14:hiddenEffects xmlns:a14="http://schemas.microsoft.com/office/drawing/2010/main" xmlns="">
                     <a:effectLst>
                       <a:outerShdw dist="35921" dir="2700000" algn="ctr" rotWithShape="0">
                         <a:schemeClr val="bg2"/>
@@ -8324,12 +8324,12 @@
               <a:effectLst/>
               <a:extLst>
                 <a:ext uri="{909E8E84-426E-40dd-AFC4-6F175D3DCCD1}">
-                  <a14:hiddenFill xmlns="" xmlns:a14="http://schemas.microsoft.com/office/drawing/2010/main">
+                  <a14:hiddenFill xmlns:a14="http://schemas.microsoft.com/office/drawing/2010/main" xmlns="">
                     <a:noFill/>
                   </a14:hiddenFill>
                 </a:ext>
                 <a:ext uri="{AF507438-7753-43e0-B8FC-AC1667EBCBE1}">
-                  <a14:hiddenEffects xmlns="" xmlns:a14="http://schemas.microsoft.com/office/drawing/2010/main">
+                  <a14:hiddenEffects xmlns:a14="http://schemas.microsoft.com/office/drawing/2010/main" xmlns="">
                     <a:effectLst>
                       <a:outerShdw dist="35921" dir="2700000" algn="ctr" rotWithShape="0">
                         <a:schemeClr val="bg2"/>
@@ -8375,12 +8375,12 @@
               <a:effectLst/>
               <a:extLst>
                 <a:ext uri="{909E8E84-426E-40dd-AFC4-6F175D3DCCD1}">
-                  <a14:hiddenFill xmlns="" xmlns:a14="http://schemas.microsoft.com/office/drawing/2010/main">
+                  <a14:hiddenFill xmlns:a14="http://schemas.microsoft.com/office/drawing/2010/main" xmlns="">
                     <a:noFill/>
                   </a14:hiddenFill>
                 </a:ext>
                 <a:ext uri="{AF507438-7753-43e0-B8FC-AC1667EBCBE1}">
-                  <a14:hiddenEffects xmlns="" xmlns:a14="http://schemas.microsoft.com/office/drawing/2010/main">
+                  <a14:hiddenEffects xmlns:a14="http://schemas.microsoft.com/office/drawing/2010/main" xmlns="">
                     <a:effectLst>
                       <a:outerShdw dist="35921" dir="2700000" algn="ctr" rotWithShape="0">
                         <a:schemeClr val="bg2"/>
@@ -8427,12 +8427,12 @@
             <a:effectLst/>
             <a:extLst>
               <a:ext uri="{909E8E84-426E-40dd-AFC4-6F175D3DCCD1}">
-                <a14:hiddenFill xmlns="" xmlns:a14="http://schemas.microsoft.com/office/drawing/2010/main">
+                <a14:hiddenFill xmlns:a14="http://schemas.microsoft.com/office/drawing/2010/main" xmlns="">
                   <a:noFill/>
                 </a14:hiddenFill>
               </a:ext>
               <a:ext uri="{AF507438-7753-43e0-B8FC-AC1667EBCBE1}">
-                <a14:hiddenEffects xmlns="" xmlns:a14="http://schemas.microsoft.com/office/drawing/2010/main">
+                <a14:hiddenEffects xmlns:a14="http://schemas.microsoft.com/office/drawing/2010/main" xmlns="">
                   <a:effectLst>
                     <a:outerShdw dist="35921" dir="2700000" algn="ctr" rotWithShape="0">
                       <a:schemeClr val="bg2"/>
@@ -8478,12 +8478,12 @@
             <a:effectLst/>
             <a:extLst>
               <a:ext uri="{909E8E84-426E-40dd-AFC4-6F175D3DCCD1}">
-                <a14:hiddenFill xmlns="" xmlns:a14="http://schemas.microsoft.com/office/drawing/2010/main">
+                <a14:hiddenFill xmlns:a14="http://schemas.microsoft.com/office/drawing/2010/main" xmlns="">
                   <a:noFill/>
                 </a14:hiddenFill>
               </a:ext>
               <a:ext uri="{AF507438-7753-43e0-B8FC-AC1667EBCBE1}">
-                <a14:hiddenEffects xmlns="" xmlns:a14="http://schemas.microsoft.com/office/drawing/2010/main">
+                <a14:hiddenEffects xmlns:a14="http://schemas.microsoft.com/office/drawing/2010/main" xmlns="">
                   <a:effectLst>
                     <a:outerShdw dist="35921" dir="2700000" algn="ctr" rotWithShape="0">
                       <a:schemeClr val="bg2"/>
@@ -8595,14 +8595,14 @@
               <a:effectLst/>
               <a:extLst>
                 <a:ext uri="{909E8E84-426E-40dd-AFC4-6F175D3DCCD1}">
-                  <a14:hiddenFill xmlns="" xmlns:a14="http://schemas.microsoft.com/office/drawing/2010/main">
+                  <a14:hiddenFill xmlns:a14="http://schemas.microsoft.com/office/drawing/2010/main" xmlns="">
                     <a:solidFill>
                       <a:srgbClr val="FFFF00"/>
                     </a:solidFill>
                   </a14:hiddenFill>
                 </a:ext>
                 <a:ext uri="{AF507438-7753-43e0-B8FC-AC1667EBCBE1}">
-                  <a14:hiddenEffects xmlns="" xmlns:a14="http://schemas.microsoft.com/office/drawing/2010/main">
+                  <a14:hiddenEffects xmlns:a14="http://schemas.microsoft.com/office/drawing/2010/main" xmlns="">
                     <a:effectLst>
                       <a:outerShdw dist="35921" dir="2700000" algn="ctr" rotWithShape="0">
                         <a:schemeClr val="bg2"/>
@@ -8698,14 +8698,14 @@
               <a:effectLst/>
               <a:extLst>
                 <a:ext uri="{909E8E84-426E-40dd-AFC4-6F175D3DCCD1}">
-                  <a14:hiddenFill xmlns="" xmlns:a14="http://schemas.microsoft.com/office/drawing/2010/main">
+                  <a14:hiddenFill xmlns:a14="http://schemas.microsoft.com/office/drawing/2010/main" xmlns="">
                     <a:solidFill>
                       <a:srgbClr val="FFFF00"/>
                     </a:solidFill>
                   </a14:hiddenFill>
                 </a:ext>
                 <a:ext uri="{AF507438-7753-43e0-B8FC-AC1667EBCBE1}">
-                  <a14:hiddenEffects xmlns="" xmlns:a14="http://schemas.microsoft.com/office/drawing/2010/main">
+                  <a14:hiddenEffects xmlns:a14="http://schemas.microsoft.com/office/drawing/2010/main" xmlns="">
                     <a:effectLst>
                       <a:outerShdw dist="35921" dir="2700000" algn="ctr" rotWithShape="0">
                         <a:schemeClr val="bg2"/>
@@ -8752,12 +8752,12 @@
             <a:effectLst/>
             <a:extLst>
               <a:ext uri="{909E8E84-426E-40dd-AFC4-6F175D3DCCD1}">
-                <a14:hiddenFill xmlns="" xmlns:a14="http://schemas.microsoft.com/office/drawing/2010/main">
+                <a14:hiddenFill xmlns:a14="http://schemas.microsoft.com/office/drawing/2010/main" xmlns="">
                   <a:noFill/>
                 </a14:hiddenFill>
               </a:ext>
               <a:ext uri="{AF507438-7753-43e0-B8FC-AC1667EBCBE1}">
-                <a14:hiddenEffects xmlns="" xmlns:a14="http://schemas.microsoft.com/office/drawing/2010/main">
+                <a14:hiddenEffects xmlns:a14="http://schemas.microsoft.com/office/drawing/2010/main" xmlns="">
                   <a:effectLst>
                     <a:outerShdw dist="35921" dir="2700000" algn="ctr" rotWithShape="0">
                       <a:schemeClr val="bg2"/>
@@ -8803,12 +8803,12 @@
             <a:effectLst/>
             <a:extLst>
               <a:ext uri="{909E8E84-426E-40dd-AFC4-6F175D3DCCD1}">
-                <a14:hiddenFill xmlns="" xmlns:a14="http://schemas.microsoft.com/office/drawing/2010/main">
+                <a14:hiddenFill xmlns:a14="http://schemas.microsoft.com/office/drawing/2010/main" xmlns="">
                   <a:noFill/>
                 </a14:hiddenFill>
               </a:ext>
               <a:ext uri="{AF507438-7753-43e0-B8FC-AC1667EBCBE1}">
-                <a14:hiddenEffects xmlns="" xmlns:a14="http://schemas.microsoft.com/office/drawing/2010/main">
+                <a14:hiddenEffects xmlns:a14="http://schemas.microsoft.com/office/drawing/2010/main" xmlns="">
                   <a:effectLst>
                     <a:outerShdw dist="35921" dir="2700000" algn="ctr" rotWithShape="0">
                       <a:schemeClr val="bg2"/>
@@ -8854,12 +8854,12 @@
             <a:effectLst/>
             <a:extLst>
               <a:ext uri="{909E8E84-426E-40dd-AFC4-6F175D3DCCD1}">
-                <a14:hiddenFill xmlns="" xmlns:a14="http://schemas.microsoft.com/office/drawing/2010/main">
+                <a14:hiddenFill xmlns:a14="http://schemas.microsoft.com/office/drawing/2010/main" xmlns="">
                   <a:noFill/>
                 </a14:hiddenFill>
               </a:ext>
               <a:ext uri="{AF507438-7753-43e0-B8FC-AC1667EBCBE1}">
-                <a14:hiddenEffects xmlns="" xmlns:a14="http://schemas.microsoft.com/office/drawing/2010/main">
+                <a14:hiddenEffects xmlns:a14="http://schemas.microsoft.com/office/drawing/2010/main" xmlns="">
                   <a:effectLst>
                     <a:outerShdw dist="35921" dir="2700000" algn="ctr" rotWithShape="0">
                       <a:schemeClr val="bg2"/>
@@ -8905,12 +8905,12 @@
             <a:effectLst/>
             <a:extLst>
               <a:ext uri="{909E8E84-426E-40dd-AFC4-6F175D3DCCD1}">
-                <a14:hiddenFill xmlns="" xmlns:a14="http://schemas.microsoft.com/office/drawing/2010/main">
+                <a14:hiddenFill xmlns:a14="http://schemas.microsoft.com/office/drawing/2010/main" xmlns="">
                   <a:noFill/>
                 </a14:hiddenFill>
               </a:ext>
               <a:ext uri="{AF507438-7753-43e0-B8FC-AC1667EBCBE1}">
-                <a14:hiddenEffects xmlns="" xmlns:a14="http://schemas.microsoft.com/office/drawing/2010/main">
+                <a14:hiddenEffects xmlns:a14="http://schemas.microsoft.com/office/drawing/2010/main" xmlns="">
                   <a:effectLst>
                     <a:outerShdw dist="35921" dir="2700000" algn="ctr" rotWithShape="0">
                       <a:schemeClr val="bg2"/>
@@ -8956,12 +8956,12 @@
             <a:effectLst/>
             <a:extLst>
               <a:ext uri="{909E8E84-426E-40dd-AFC4-6F175D3DCCD1}">
-                <a14:hiddenFill xmlns="" xmlns:a14="http://schemas.microsoft.com/office/drawing/2010/main">
+                <a14:hiddenFill xmlns:a14="http://schemas.microsoft.com/office/drawing/2010/main" xmlns="">
                   <a:noFill/>
                 </a14:hiddenFill>
               </a:ext>
               <a:ext uri="{AF507438-7753-43e0-B8FC-AC1667EBCBE1}">
-                <a14:hiddenEffects xmlns="" xmlns:a14="http://schemas.microsoft.com/office/drawing/2010/main">
+                <a14:hiddenEffects xmlns:a14="http://schemas.microsoft.com/office/drawing/2010/main" xmlns="">
                   <a:effectLst>
                     <a:outerShdw dist="35921" dir="2700000" algn="ctr" rotWithShape="0">
                       <a:schemeClr val="bg2"/>
@@ -9007,12 +9007,12 @@
             <a:effectLst/>
             <a:extLst>
               <a:ext uri="{909E8E84-426E-40dd-AFC4-6F175D3DCCD1}">
-                <a14:hiddenFill xmlns="" xmlns:a14="http://schemas.microsoft.com/office/drawing/2010/main">
+                <a14:hiddenFill xmlns:a14="http://schemas.microsoft.com/office/drawing/2010/main" xmlns="">
                   <a:noFill/>
                 </a14:hiddenFill>
               </a:ext>
               <a:ext uri="{AF507438-7753-43e0-B8FC-AC1667EBCBE1}">
-                <a14:hiddenEffects xmlns="" xmlns:a14="http://schemas.microsoft.com/office/drawing/2010/main">
+                <a14:hiddenEffects xmlns:a14="http://schemas.microsoft.com/office/drawing/2010/main" xmlns="">
                   <a:effectLst>
                     <a:outerShdw dist="35921" dir="2700000" algn="ctr" rotWithShape="0">
                       <a:schemeClr val="bg2"/>
@@ -9124,14 +9124,14 @@
               <a:effectLst/>
               <a:extLst>
                 <a:ext uri="{909E8E84-426E-40dd-AFC4-6F175D3DCCD1}">
-                  <a14:hiddenFill xmlns="" xmlns:a14="http://schemas.microsoft.com/office/drawing/2010/main">
+                  <a14:hiddenFill xmlns:a14="http://schemas.microsoft.com/office/drawing/2010/main" xmlns="">
                     <a:solidFill>
                       <a:srgbClr val="FFFF00"/>
                     </a:solidFill>
                   </a14:hiddenFill>
                 </a:ext>
                 <a:ext uri="{AF507438-7753-43e0-B8FC-AC1667EBCBE1}">
-                  <a14:hiddenEffects xmlns="" xmlns:a14="http://schemas.microsoft.com/office/drawing/2010/main">
+                  <a14:hiddenEffects xmlns:a14="http://schemas.microsoft.com/office/drawing/2010/main" xmlns="">
                     <a:effectLst>
                       <a:outerShdw dist="35921" dir="2700000" algn="ctr" rotWithShape="0">
                         <a:schemeClr val="bg2"/>
@@ -9227,14 +9227,14 @@
               <a:effectLst/>
               <a:extLst>
                 <a:ext uri="{909E8E84-426E-40dd-AFC4-6F175D3DCCD1}">
-                  <a14:hiddenFill xmlns="" xmlns:a14="http://schemas.microsoft.com/office/drawing/2010/main">
+                  <a14:hiddenFill xmlns:a14="http://schemas.microsoft.com/office/drawing/2010/main" xmlns="">
                     <a:solidFill>
                       <a:srgbClr val="FFFF00"/>
                     </a:solidFill>
                   </a14:hiddenFill>
                 </a:ext>
                 <a:ext uri="{AF507438-7753-43e0-B8FC-AC1667EBCBE1}">
-                  <a14:hiddenEffects xmlns="" xmlns:a14="http://schemas.microsoft.com/office/drawing/2010/main">
+                  <a14:hiddenEffects xmlns:a14="http://schemas.microsoft.com/office/drawing/2010/main" xmlns="">
                     <a:effectLst>
                       <a:outerShdw dist="35921" dir="2700000" algn="ctr" rotWithShape="0">
                         <a:schemeClr val="bg2"/>
@@ -9281,12 +9281,12 @@
             <a:effectLst/>
             <a:extLst>
               <a:ext uri="{909E8E84-426E-40dd-AFC4-6F175D3DCCD1}">
-                <a14:hiddenFill xmlns="" xmlns:a14="http://schemas.microsoft.com/office/drawing/2010/main">
+                <a14:hiddenFill xmlns:a14="http://schemas.microsoft.com/office/drawing/2010/main" xmlns="">
                   <a:noFill/>
                 </a14:hiddenFill>
               </a:ext>
               <a:ext uri="{AF507438-7753-43e0-B8FC-AC1667EBCBE1}">
-                <a14:hiddenEffects xmlns="" xmlns:a14="http://schemas.microsoft.com/office/drawing/2010/main">
+                <a14:hiddenEffects xmlns:a14="http://schemas.microsoft.com/office/drawing/2010/main" xmlns="">
                   <a:effectLst>
                     <a:outerShdw dist="35921" dir="2700000" algn="ctr" rotWithShape="0">
                       <a:schemeClr val="bg2"/>
@@ -9398,14 +9398,14 @@
               <a:effectLst/>
               <a:extLst>
                 <a:ext uri="{909E8E84-426E-40dd-AFC4-6F175D3DCCD1}">
-                  <a14:hiddenFill xmlns="" xmlns:a14="http://schemas.microsoft.com/office/drawing/2010/main">
+                  <a14:hiddenFill xmlns:a14="http://schemas.microsoft.com/office/drawing/2010/main" xmlns="">
                     <a:solidFill>
                       <a:srgbClr val="FFFF00"/>
                     </a:solidFill>
                   </a14:hiddenFill>
                 </a:ext>
                 <a:ext uri="{AF507438-7753-43e0-B8FC-AC1667EBCBE1}">
-                  <a14:hiddenEffects xmlns="" xmlns:a14="http://schemas.microsoft.com/office/drawing/2010/main">
+                  <a14:hiddenEffects xmlns:a14="http://schemas.microsoft.com/office/drawing/2010/main" xmlns="">
                     <a:effectLst>
                       <a:outerShdw dist="35921" dir="2700000" algn="ctr" rotWithShape="0">
                         <a:schemeClr val="bg2"/>
@@ -9501,14 +9501,14 @@
               <a:effectLst/>
               <a:extLst>
                 <a:ext uri="{909E8E84-426E-40dd-AFC4-6F175D3DCCD1}">
-                  <a14:hiddenFill xmlns="" xmlns:a14="http://schemas.microsoft.com/office/drawing/2010/main">
+                  <a14:hiddenFill xmlns:a14="http://schemas.microsoft.com/office/drawing/2010/main" xmlns="">
                     <a:solidFill>
                       <a:srgbClr val="FFFF00"/>
                     </a:solidFill>
                   </a14:hiddenFill>
                 </a:ext>
                 <a:ext uri="{AF507438-7753-43e0-B8FC-AC1667EBCBE1}">
-                  <a14:hiddenEffects xmlns="" xmlns:a14="http://schemas.microsoft.com/office/drawing/2010/main">
+                  <a14:hiddenEffects xmlns:a14="http://schemas.microsoft.com/office/drawing/2010/main" xmlns="">
                     <a:effectLst>
                       <a:outerShdw dist="35921" dir="2700000" algn="ctr" rotWithShape="0">
                         <a:schemeClr val="bg2"/>
@@ -10925,14 +10925,14 @@
           <a:effectLst/>
           <a:extLst>
             <a:ext uri="{909E8E84-426E-40dd-AFC4-6F175D3DCCD1}">
-              <a14:hiddenFill xmlns="" xmlns:a14="http://schemas.microsoft.com/office/drawing/2010/main">
+              <a14:hiddenFill xmlns:a14="http://schemas.microsoft.com/office/drawing/2010/main" xmlns="">
                 <a:solidFill>
                   <a:schemeClr val="accent1"/>
                 </a:solidFill>
               </a14:hiddenFill>
             </a:ext>
             <a:ext uri="{91240B29-F687-4f45-9708-019B960494DF}">
-              <a14:hiddenLine xmlns="" xmlns:a14="http://schemas.microsoft.com/office/drawing/2010/main" w="9525">
+              <a14:hiddenLine xmlns:a14="http://schemas.microsoft.com/office/drawing/2010/main" xmlns="" w="9525">
                 <a:solidFill>
                   <a:schemeClr val="tx1"/>
                 </a:solidFill>
@@ -10942,7 +10942,7 @@
               </a14:hiddenLine>
             </a:ext>
             <a:ext uri="{AF507438-7753-43e0-B8FC-AC1667EBCBE1}">
-              <a14:hiddenEffects xmlns="" xmlns:a14="http://schemas.microsoft.com/office/drawing/2010/main">
+              <a14:hiddenEffects xmlns:a14="http://schemas.microsoft.com/office/drawing/2010/main" xmlns="">
                 <a:effectLst>
                   <a:outerShdw dist="35921" dir="2700000" algn="ctr" rotWithShape="0">
                     <a:schemeClr val="bg2"/>
@@ -11571,9 +11571,30 @@
                 <a:effectLst/>
                 <a:latin typeface="Times New Roman" panose="02020603050405020304" pitchFamily="18" charset="0"/>
                 <a:cs typeface="Times New Roman" panose="02020603050405020304" pitchFamily="18" charset="0"/>
-                <a:hlinkClick r:id="rId3"/>
               </a:rPr>
-              <a:t>https://www.cs.tsinghua.edu.cn/csen/</a:t>
+              <a:t>https://</a:t>
+            </a:r>
+            <a:r>
+              <a:rPr lang="en-US" altLang="zh-CN" sz="2000" b="0" i="0" u="none" strike="noStrike" dirty="0" err="1">
+                <a:solidFill>
+                  <a:srgbClr val="4183C4"/>
+                </a:solidFill>
+                <a:effectLst/>
+                <a:latin typeface="Times New Roman" panose="02020603050405020304" pitchFamily="18" charset="0"/>
+                <a:cs typeface="Times New Roman" panose="02020603050405020304" pitchFamily="18" charset="0"/>
+              </a:rPr>
+              <a:t>chenyangzhao.vercel.app</a:t>
+            </a:r>
+            <a:r>
+              <a:rPr lang="en-US" altLang="zh-CN" sz="2000" b="0" i="0" u="none" strike="noStrike" dirty="0">
+                <a:solidFill>
+                  <a:srgbClr val="4183C4"/>
+                </a:solidFill>
+                <a:effectLst/>
+                <a:latin typeface="Times New Roman" panose="02020603050405020304" pitchFamily="18" charset="0"/>
+                <a:cs typeface="Times New Roman" panose="02020603050405020304" pitchFamily="18" charset="0"/>
+              </a:rPr>
+              <a:t>/about</a:t>
             </a:r>
             <a:endParaRPr lang="en-US" altLang="zh-CN" sz="2000" b="0" i="0" u="none" strike="noStrike" dirty="0">
               <a:solidFill>

</xml_diff>